<commit_message>
Some advances in Cajamar section
</commit_message>
<xml_diff>
--- a/doc/D2.1_AMIDSTModelingFramework/figures/CajaMarModelsBucket.pptx
+++ b/doc/D2.1_AMIDSTModelingFramework/figures/CajaMarModelsBucket.pptx
@@ -4711,9 +4711,9 @@
           <p:nvPr/>
         </p:nvCxnSpPr>
         <p:spPr>
-          <a:xfrm>
-            <a:off x="4420421" y="2123902"/>
-            <a:ext cx="0" cy="725633"/>
+          <a:xfrm flipH="1">
+            <a:off x="1863488" y="2123902"/>
+            <a:ext cx="2556933" cy="725633"/>
           </a:xfrm>
           <a:prstGeom prst="straightConnector1">
             <a:avLst/>
@@ -4745,7 +4745,7 @@
         </p:nvSpPr>
         <p:spPr>
           <a:xfrm>
-            <a:off x="3806588" y="2849535"/>
+            <a:off x="1249655" y="2849535"/>
             <a:ext cx="1227666" cy="410224"/>
           </a:xfrm>
           <a:prstGeom prst="roundRect">
@@ -4795,7 +4795,7 @@
                   <a:srgbClr val="000000"/>
                 </a:solidFill>
               </a:rPr>
-              <a:t>Predictors</a:t>
+              <a:t>Sociodemographic predictors</a:t>
             </a:r>
             <a:endParaRPr lang="en-US" sz="1050" dirty="0" smtClean="0">
               <a:solidFill>
@@ -4864,6 +4864,93 @@
               <a:t>Defaulter</a:t>
             </a:r>
             <a:endParaRPr lang="en-US" sz="1200" dirty="0">
+              <a:solidFill>
+                <a:srgbClr val="000000"/>
+              </a:solidFill>
+            </a:endParaRPr>
+          </a:p>
+        </p:txBody>
+      </p:sp>
+      <p:sp>
+        <p:nvSpPr>
+          <p:cNvPr id="10" name="Rounded Rectangle 5"/>
+          <p:cNvSpPr/>
+          <p:nvPr/>
+        </p:nvSpPr>
+        <p:spPr>
+          <a:xfrm>
+            <a:off x="3119364" y="2811937"/>
+            <a:ext cx="1190990" cy="642464"/>
+          </a:xfrm>
+          <a:prstGeom prst="roundRect">
+            <a:avLst/>
+          </a:prstGeom>
+          <a:solidFill>
+            <a:schemeClr val="accent1"/>
+          </a:solidFill>
+          <a:ln>
+            <a:solidFill>
+              <a:schemeClr val="tx1"/>
+            </a:solidFill>
+          </a:ln>
+        </p:spPr>
+        <p:style>
+          <a:lnRef idx="2">
+            <a:schemeClr val="accent3">
+              <a:shade val="50000"/>
+            </a:schemeClr>
+          </a:lnRef>
+          <a:fillRef idx="1">
+            <a:schemeClr val="accent3"/>
+          </a:fillRef>
+          <a:effectRef idx="0">
+            <a:schemeClr val="accent3"/>
+          </a:effectRef>
+          <a:fontRef idx="minor">
+            <a:schemeClr val="lt1"/>
+          </a:fontRef>
+        </p:style>
+        <p:txBody>
+          <a:bodyPr rtlCol="0" anchor="ctr"/>
+          <a:lstStyle/>
+          <a:p>
+            <a:pPr algn="ctr"/>
+            <a:endParaRPr lang="en-US" sz="1050" dirty="0" smtClean="0">
+              <a:solidFill>
+                <a:srgbClr val="000000"/>
+              </a:solidFill>
+            </a:endParaRPr>
+          </a:p>
+          <a:p>
+            <a:pPr algn="ctr"/>
+            <a:r>
+              <a:rPr lang="en-US" sz="1050" dirty="0" smtClean="0">
+                <a:solidFill>
+                  <a:srgbClr val="000000"/>
+                </a:solidFill>
+              </a:rPr>
+              <a:t>Reduced number of predictors </a:t>
+            </a:r>
+          </a:p>
+          <a:p>
+            <a:pPr algn="ctr"/>
+            <a:r>
+              <a:rPr lang="en-US" sz="1050" dirty="0" smtClean="0">
+                <a:solidFill>
+                  <a:srgbClr val="000000"/>
+                </a:solidFill>
+              </a:rPr>
+              <a:t>-180 days</a:t>
+            </a:r>
+            <a:endParaRPr lang="en-US" sz="1050" dirty="0" smtClean="0">
+              <a:solidFill>
+                <a:srgbClr val="000000"/>
+              </a:solidFill>
+            </a:endParaRPr>
+          </a:p>
+          <a:p>
+            <a:pPr algn="ctr"/>
+            <a:endParaRPr lang="en-US" sz="1050" dirty="0">
               <a:solidFill>
                 <a:srgbClr val="000000"/>
               </a:solidFill>
@@ -7431,42 +7518,6 @@
       </p:cxnSp>
       <p:cxnSp>
         <p:nvCxnSpPr>
-          <p:cNvPr id="49" name="Straight Arrow Connector 48"/>
-          <p:cNvCxnSpPr>
-            <a:stCxn id="6" idx="4"/>
-            <a:endCxn id="50" idx="0"/>
-          </p:cNvCxnSpPr>
-          <p:nvPr/>
-        </p:nvCxnSpPr>
-        <p:spPr>
-          <a:xfrm flipH="1">
-            <a:off x="1889029" y="2496435"/>
-            <a:ext cx="1371696" cy="1124541"/>
-          </a:xfrm>
-          <a:prstGeom prst="straightConnector1">
-            <a:avLst/>
-          </a:prstGeom>
-          <a:ln>
-            <a:tailEnd type="arrow"/>
-          </a:ln>
-        </p:spPr>
-        <p:style>
-          <a:lnRef idx="2">
-            <a:schemeClr val="accent1"/>
-          </a:lnRef>
-          <a:fillRef idx="0">
-            <a:schemeClr val="accent1"/>
-          </a:fillRef>
-          <a:effectRef idx="1">
-            <a:schemeClr val="accent1"/>
-          </a:effectRef>
-          <a:fontRef idx="minor">
-            <a:schemeClr val="tx1"/>
-          </a:fontRef>
-        </p:style>
-      </p:cxnSp>
-      <p:cxnSp>
-        <p:nvCxnSpPr>
           <p:cNvPr id="37" name="Straight Arrow Connector 36"/>
           <p:cNvCxnSpPr>
             <a:stCxn id="36" idx="7"/>
@@ -8539,83 +8590,6 @@
           </a:p>
         </p:txBody>
       </p:sp>
-      <p:sp>
-        <p:nvSpPr>
-          <p:cNvPr id="50" name="Oval 49"/>
-          <p:cNvSpPr/>
-          <p:nvPr/>
-        </p:nvSpPr>
-        <p:spPr>
-          <a:xfrm>
-            <a:off x="1419129" y="3620976"/>
-            <a:ext cx="939800" cy="495253"/>
-          </a:xfrm>
-          <a:prstGeom prst="ellipse">
-            <a:avLst/>
-          </a:prstGeom>
-          <a:solidFill>
-            <a:srgbClr val="4F81BD"/>
-          </a:solidFill>
-          <a:ln>
-            <a:solidFill>
-              <a:srgbClr val="000000"/>
-            </a:solidFill>
-            <a:prstDash val="solid"/>
-          </a:ln>
-        </p:spPr>
-        <p:style>
-          <a:lnRef idx="2">
-            <a:schemeClr val="accent3">
-              <a:shade val="50000"/>
-            </a:schemeClr>
-          </a:lnRef>
-          <a:fillRef idx="1">
-            <a:schemeClr val="accent3"/>
-          </a:fillRef>
-          <a:effectRef idx="0">
-            <a:schemeClr val="accent3"/>
-          </a:effectRef>
-          <a:fontRef idx="minor">
-            <a:schemeClr val="lt1"/>
-          </a:fontRef>
-        </p:style>
-        <p:txBody>
-          <a:bodyPr rtlCol="0" anchor="ctr"/>
-          <a:lstStyle/>
-          <a:p>
-            <a:pPr algn="ctr"/>
-            <a:endParaRPr lang="en-US" sz="1000" dirty="0">
-              <a:solidFill>
-                <a:srgbClr val="000000"/>
-              </a:solidFill>
-            </a:endParaRPr>
-          </a:p>
-        </p:txBody>
-      </p:sp>
-      <p:pic>
-        <p:nvPicPr>
-          <p:cNvPr id="20" name="Picture 19"/>
-          <p:cNvPicPr>
-            <a:picLocks noChangeAspect="1"/>
-          </p:cNvPicPr>
-          <p:nvPr/>
-        </p:nvPicPr>
-        <p:blipFill>
-          <a:blip r:embed="rId10"/>
-          <a:stretch>
-            <a:fillRect/>
-          </a:stretch>
-        </p:blipFill>
-        <p:spPr>
-          <a:xfrm>
-            <a:off x="1742556" y="3748085"/>
-            <a:ext cx="248918" cy="257215"/>
-          </a:xfrm>
-          <a:prstGeom prst="rect">
-            <a:avLst/>
-          </a:prstGeom>
-        </p:spPr>
-      </p:pic>
       <p:pic>
         <p:nvPicPr>
           <p:cNvPr id="51" name="Picture 50"/>
@@ -8625,7 +8599,7 @@
           <p:nvPr/>
         </p:nvPicPr>
         <p:blipFill>
-          <a:blip r:embed="rId11"/>
+          <a:blip r:embed="rId10"/>
           <a:stretch>
             <a:fillRect/>
           </a:stretch>

</xml_diff>

<commit_message>
More changes in Cajamar section
</commit_message>
<xml_diff>
--- a/doc/D2.1_AMIDSTModelingFramework/figures/CajaMarModelsBucket.pptx
+++ b/doc/D2.1_AMIDSTModelingFramework/figures/CajaMarModelsBucket.pptx
@@ -298,7 +298,7 @@
           <a:p>
             <a:fld id="{08C0AF01-9055-0547-953E-72B2160BBA35}" type="datetimeFigureOut">
               <a:rPr lang="en-US" smtClean="0"/>
-              <a:t>10/09/14</a:t>
+              <a:t>16/09/14</a:t>
             </a:fld>
             <a:endParaRPr lang="en-US"/>
           </a:p>
@@ -468,7 +468,7 @@
           <a:p>
             <a:fld id="{08C0AF01-9055-0547-953E-72B2160BBA35}" type="datetimeFigureOut">
               <a:rPr lang="en-US" smtClean="0"/>
-              <a:t>10/09/14</a:t>
+              <a:t>16/09/14</a:t>
             </a:fld>
             <a:endParaRPr lang="en-US"/>
           </a:p>
@@ -648,7 +648,7 @@
           <a:p>
             <a:fld id="{08C0AF01-9055-0547-953E-72B2160BBA35}" type="datetimeFigureOut">
               <a:rPr lang="en-US" smtClean="0"/>
-              <a:t>10/09/14</a:t>
+              <a:t>16/09/14</a:t>
             </a:fld>
             <a:endParaRPr lang="en-US"/>
           </a:p>
@@ -818,7 +818,7 @@
           <a:p>
             <a:fld id="{08C0AF01-9055-0547-953E-72B2160BBA35}" type="datetimeFigureOut">
               <a:rPr lang="en-US" smtClean="0"/>
-              <a:t>10/09/14</a:t>
+              <a:t>16/09/14</a:t>
             </a:fld>
             <a:endParaRPr lang="en-US"/>
           </a:p>
@@ -1064,7 +1064,7 @@
           <a:p>
             <a:fld id="{08C0AF01-9055-0547-953E-72B2160BBA35}" type="datetimeFigureOut">
               <a:rPr lang="en-US" smtClean="0"/>
-              <a:t>10/09/14</a:t>
+              <a:t>16/09/14</a:t>
             </a:fld>
             <a:endParaRPr lang="en-US"/>
           </a:p>
@@ -1352,7 +1352,7 @@
           <a:p>
             <a:fld id="{08C0AF01-9055-0547-953E-72B2160BBA35}" type="datetimeFigureOut">
               <a:rPr lang="en-US" smtClean="0"/>
-              <a:t>10/09/14</a:t>
+              <a:t>16/09/14</a:t>
             </a:fld>
             <a:endParaRPr lang="en-US"/>
           </a:p>
@@ -1774,7 +1774,7 @@
           <a:p>
             <a:fld id="{08C0AF01-9055-0547-953E-72B2160BBA35}" type="datetimeFigureOut">
               <a:rPr lang="en-US" smtClean="0"/>
-              <a:t>10/09/14</a:t>
+              <a:t>16/09/14</a:t>
             </a:fld>
             <a:endParaRPr lang="en-US"/>
           </a:p>
@@ -1892,7 +1892,7 @@
           <a:p>
             <a:fld id="{08C0AF01-9055-0547-953E-72B2160BBA35}" type="datetimeFigureOut">
               <a:rPr lang="en-US" smtClean="0"/>
-              <a:t>10/09/14</a:t>
+              <a:t>16/09/14</a:t>
             </a:fld>
             <a:endParaRPr lang="en-US"/>
           </a:p>
@@ -1987,7 +1987,7 @@
           <a:p>
             <a:fld id="{08C0AF01-9055-0547-953E-72B2160BBA35}" type="datetimeFigureOut">
               <a:rPr lang="en-US" smtClean="0"/>
-              <a:t>10/09/14</a:t>
+              <a:t>16/09/14</a:t>
             </a:fld>
             <a:endParaRPr lang="en-US"/>
           </a:p>
@@ -2264,7 +2264,7 @@
           <a:p>
             <a:fld id="{08C0AF01-9055-0547-953E-72B2160BBA35}" type="datetimeFigureOut">
               <a:rPr lang="en-US" smtClean="0"/>
-              <a:t>10/09/14</a:t>
+              <a:t>16/09/14</a:t>
             </a:fld>
             <a:endParaRPr lang="en-US"/>
           </a:p>
@@ -2517,7 +2517,7 @@
           <a:p>
             <a:fld id="{08C0AF01-9055-0547-953E-72B2160BBA35}" type="datetimeFigureOut">
               <a:rPr lang="en-US" smtClean="0"/>
-              <a:t>10/09/14</a:t>
+              <a:t>16/09/14</a:t>
             </a:fld>
             <a:endParaRPr lang="en-US"/>
           </a:p>
@@ -2730,7 +2730,7 @@
           <a:p>
             <a:fld id="{08C0AF01-9055-0547-953E-72B2160BBA35}" type="datetimeFigureOut">
               <a:rPr lang="en-US" smtClean="0"/>
-              <a:t>10/09/14</a:t>
+              <a:t>16/09/14</a:t>
             </a:fld>
             <a:endParaRPr lang="en-US"/>
           </a:p>
@@ -3116,8 +3116,8 @@
         </p:nvCxnSpPr>
         <p:spPr>
           <a:xfrm flipH="1">
-            <a:off x="4210744" y="2123902"/>
-            <a:ext cx="209677" cy="1064299"/>
+            <a:off x="1507069" y="2123902"/>
+            <a:ext cx="2789054" cy="1081507"/>
           </a:xfrm>
           <a:prstGeom prst="straightConnector1">
             <a:avLst/>
@@ -3149,8 +3149,8 @@
         </p:nvSpPr>
         <p:spPr>
           <a:xfrm>
-            <a:off x="3596911" y="3188201"/>
-            <a:ext cx="1227666" cy="410224"/>
+            <a:off x="973669" y="3205409"/>
+            <a:ext cx="1066800" cy="410224"/>
           </a:xfrm>
           <a:prstGeom prst="roundRect">
             <a:avLst/>
@@ -3197,7 +3197,39 @@
                   <a:srgbClr val="000000"/>
                 </a:solidFill>
               </a:rPr>
-              <a:t>Financial activity -180 days</a:t>
+              <a:t>Variable set </a:t>
+            </a:r>
+            <a:r>
+              <a:rPr lang="en-US" sz="1050" b="1" dirty="0" smtClean="0">
+                <a:solidFill>
+                  <a:srgbClr val="000000"/>
+                </a:solidFill>
+              </a:rPr>
+              <a:t>X</a:t>
+            </a:r>
+            <a:r>
+              <a:rPr lang="en-US" sz="1050" dirty="0" smtClean="0">
+                <a:solidFill>
+                  <a:srgbClr val="000000"/>
+                </a:solidFill>
+              </a:rPr>
+              <a:t> </a:t>
+            </a:r>
+            <a:r>
+              <a:rPr lang="en-US" sz="1050" dirty="0" smtClean="0">
+                <a:solidFill>
+                  <a:srgbClr val="000000"/>
+                </a:solidFill>
+              </a:rPr>
+              <a:t>-</a:t>
+            </a:r>
+            <a:r>
+              <a:rPr lang="en-US" sz="1050" dirty="0" smtClean="0">
+                <a:solidFill>
+                  <a:srgbClr val="000000"/>
+                </a:solidFill>
+              </a:rPr>
+              <a:t>180 days</a:t>
             </a:r>
           </a:p>
           <a:p>
@@ -3218,7 +3250,7 @@
         </p:nvSpPr>
         <p:spPr>
           <a:xfrm>
-            <a:off x="4824577" y="3191812"/>
+            <a:off x="4807643" y="3191812"/>
             <a:ext cx="344039" cy="369332"/>
           </a:xfrm>
           <a:prstGeom prst="rect">
@@ -3248,7 +3280,7 @@
         </p:nvSpPr>
         <p:spPr>
           <a:xfrm>
-            <a:off x="3855398" y="1628649"/>
+            <a:off x="3731100" y="1628649"/>
             <a:ext cx="1130046" cy="495253"/>
           </a:xfrm>
           <a:prstGeom prst="ellipse">
@@ -3306,8 +3338,8 @@
         </p:nvSpPr>
         <p:spPr>
           <a:xfrm>
-            <a:off x="1050463" y="3178141"/>
-            <a:ext cx="922271" cy="420284"/>
+            <a:off x="3767668" y="3209262"/>
+            <a:ext cx="1056910" cy="420284"/>
           </a:xfrm>
           <a:prstGeom prst="roundRect">
             <a:avLst/>
@@ -3346,8 +3378,37 @@
                   <a:srgbClr val="000000"/>
                 </a:solidFill>
               </a:rPr>
-              <a:t>Payments </a:t>
-            </a:r>
+              <a:t>Variable </a:t>
+            </a:r>
+            <a:r>
+              <a:rPr lang="en-US" sz="1050" dirty="0">
+                <a:solidFill>
+                  <a:srgbClr val="000000"/>
+                </a:solidFill>
+              </a:rPr>
+              <a:t>set </a:t>
+            </a:r>
+            <a:r>
+              <a:rPr lang="en-US" sz="1050" b="1" dirty="0" smtClean="0">
+                <a:solidFill>
+                  <a:srgbClr val="000000"/>
+                </a:solidFill>
+              </a:rPr>
+              <a:t>Y</a:t>
+            </a:r>
+            <a:r>
+              <a:rPr lang="en-US" sz="1050" dirty="0" smtClean="0">
+                <a:solidFill>
+                  <a:srgbClr val="000000"/>
+                </a:solidFill>
+              </a:rPr>
+              <a:t> </a:t>
+            </a:r>
+            <a:endParaRPr lang="en-US" sz="1050" dirty="0" smtClean="0">
+              <a:solidFill>
+                <a:srgbClr val="000000"/>
+              </a:solidFill>
+            </a:endParaRPr>
           </a:p>
           <a:p>
             <a:pPr algn="ctr"/>
@@ -3377,9 +3438,9 @@
           <p:nvPr/>
         </p:nvCxnSpPr>
         <p:spPr>
-          <a:xfrm>
-            <a:off x="4420421" y="2123902"/>
-            <a:ext cx="1362028" cy="1051615"/>
+          <a:xfrm flipH="1">
+            <a:off x="2919450" y="2123902"/>
+            <a:ext cx="1376673" cy="1076893"/>
           </a:xfrm>
           <a:prstGeom prst="straightConnector1">
             <a:avLst/>
@@ -3411,8 +3472,8 @@
         </p:nvSpPr>
         <p:spPr>
           <a:xfrm>
-            <a:off x="5168616" y="3175517"/>
-            <a:ext cx="1227666" cy="410224"/>
+            <a:off x="2370664" y="3200795"/>
+            <a:ext cx="1097572" cy="410224"/>
           </a:xfrm>
           <a:prstGeom prst="roundRect">
             <a:avLst/>
@@ -3454,12 +3515,52 @@
           <a:p>
             <a:pPr algn="ctr"/>
             <a:r>
+              <a:rPr lang="en-US" sz="1050" dirty="0">
+                <a:solidFill>
+                  <a:srgbClr val="000000"/>
+                </a:solidFill>
+              </a:rPr>
+              <a:t>Variable set </a:t>
+            </a:r>
+            <a:r>
+              <a:rPr lang="en-US" sz="1050" b="1" dirty="0">
+                <a:solidFill>
+                  <a:srgbClr val="000000"/>
+                </a:solidFill>
+              </a:rPr>
+              <a:t>X</a:t>
+            </a:r>
+            <a:r>
+              <a:rPr lang="en-US" sz="1050" dirty="0">
+                <a:solidFill>
+                  <a:srgbClr val="000000"/>
+                </a:solidFill>
+              </a:rPr>
+              <a:t> </a:t>
+            </a:r>
+            <a:endParaRPr lang="en-US" sz="1050" dirty="0" smtClean="0">
+              <a:solidFill>
+                <a:srgbClr val="000000"/>
+              </a:solidFill>
+            </a:endParaRPr>
+          </a:p>
+          <a:p>
+            <a:pPr algn="ctr"/>
+            <a:r>
               <a:rPr lang="en-US" sz="1050" dirty="0" smtClean="0">
                 <a:solidFill>
                   <a:srgbClr val="000000"/>
                 </a:solidFill>
               </a:rPr>
-              <a:t>Financial activity -1 day</a:t>
+              <a:t> </a:t>
+            </a:r>
+            <a:r>
+              <a:rPr lang="en-US" sz="1050" dirty="0" smtClean="0">
+                <a:solidFill>
+                  <a:srgbClr val="000000"/>
+                </a:solidFill>
+              </a:rPr>
+              <a:t>-1 day</a:t>
             </a:r>
           </a:p>
           <a:p>
@@ -3474,14 +3575,152 @@
       </p:sp>
       <p:sp>
         <p:nvSpPr>
-          <p:cNvPr id="79" name="Rounded Rectangle 5"/>
+          <p:cNvPr id="80" name="TextBox 14"/>
+          <p:cNvSpPr txBox="1"/>
+          <p:nvPr/>
+        </p:nvSpPr>
+        <p:spPr>
+          <a:xfrm>
+            <a:off x="2032003" y="3145866"/>
+            <a:ext cx="344039" cy="369332"/>
+          </a:xfrm>
+          <a:prstGeom prst="rect">
+            <a:avLst/>
+          </a:prstGeom>
+          <a:noFill/>
+        </p:spPr>
+        <p:txBody>
+          <a:bodyPr wrap="none" rtlCol="0">
+            <a:spAutoFit/>
+          </a:bodyPr>
+          <a:lstStyle/>
+          <a:p>
+            <a:r>
+              <a:rPr lang="en-US" dirty="0" smtClean="0"/>
+              <a:t>…</a:t>
+            </a:r>
+            <a:endParaRPr lang="en-US" dirty="0"/>
+          </a:p>
+        </p:txBody>
+      </p:sp>
+      <p:cxnSp>
+        <p:nvCxnSpPr>
+          <p:cNvPr id="85" name="Straight Arrow Connector 4"/>
+          <p:cNvCxnSpPr>
+            <a:stCxn id="4" idx="4"/>
+            <a:endCxn id="84" idx="0"/>
+          </p:cNvCxnSpPr>
+          <p:nvPr/>
+        </p:nvCxnSpPr>
+        <p:spPr>
+          <a:xfrm>
+            <a:off x="4296123" y="2123902"/>
+            <a:ext cx="2731508" cy="1088501"/>
+          </a:xfrm>
+          <a:prstGeom prst="straightConnector1">
+            <a:avLst/>
+          </a:prstGeom>
+          <a:ln>
+            <a:tailEnd type="arrow"/>
+          </a:ln>
+        </p:spPr>
+        <p:style>
+          <a:lnRef idx="2">
+            <a:schemeClr val="accent1"/>
+          </a:lnRef>
+          <a:fillRef idx="0">
+            <a:schemeClr val="accent1"/>
+          </a:fillRef>
+          <a:effectRef idx="1">
+            <a:schemeClr val="accent1"/>
+          </a:effectRef>
+          <a:fontRef idx="minor">
+            <a:schemeClr val="tx1"/>
+          </a:fontRef>
+        </p:style>
+      </p:cxnSp>
+      <p:cxnSp>
+        <p:nvCxnSpPr>
+          <p:cNvPr id="92" name="Straight Arrow Connector 4"/>
+          <p:cNvCxnSpPr>
+            <a:stCxn id="4" idx="4"/>
+            <a:endCxn id="29" idx="0"/>
+          </p:cNvCxnSpPr>
+          <p:nvPr/>
+        </p:nvCxnSpPr>
+        <p:spPr>
+          <a:xfrm>
+            <a:off x="4296123" y="2123902"/>
+            <a:ext cx="1375964" cy="1097363"/>
+          </a:xfrm>
+          <a:prstGeom prst="straightConnector1">
+            <a:avLst/>
+          </a:prstGeom>
+          <a:ln>
+            <a:tailEnd type="arrow"/>
+          </a:ln>
+        </p:spPr>
+        <p:style>
+          <a:lnRef idx="2">
+            <a:schemeClr val="accent1"/>
+          </a:lnRef>
+          <a:fillRef idx="0">
+            <a:schemeClr val="accent1"/>
+          </a:fillRef>
+          <a:effectRef idx="1">
+            <a:schemeClr val="accent1"/>
+          </a:effectRef>
+          <a:fontRef idx="minor">
+            <a:schemeClr val="tx1"/>
+          </a:fontRef>
+        </p:style>
+      </p:cxnSp>
+      <p:cxnSp>
+        <p:nvCxnSpPr>
+          <p:cNvPr id="97" name="Straight Arrow Connector 4"/>
+          <p:cNvCxnSpPr>
+            <a:stCxn id="4" idx="4"/>
+            <a:endCxn id="48" idx="0"/>
+          </p:cNvCxnSpPr>
+          <p:nvPr/>
+        </p:nvCxnSpPr>
+        <p:spPr>
+          <a:xfrm>
+            <a:off x="4296123" y="2123902"/>
+            <a:ext cx="0" cy="1085360"/>
+          </a:xfrm>
+          <a:prstGeom prst="straightConnector1">
+            <a:avLst/>
+          </a:prstGeom>
+          <a:ln>
+            <a:tailEnd type="arrow"/>
+          </a:ln>
+        </p:spPr>
+        <p:style>
+          <a:lnRef idx="2">
+            <a:schemeClr val="accent1"/>
+          </a:lnRef>
+          <a:fillRef idx="0">
+            <a:schemeClr val="accent1"/>
+          </a:fillRef>
+          <a:effectRef idx="1">
+            <a:schemeClr val="accent1"/>
+          </a:effectRef>
+          <a:fontRef idx="minor">
+            <a:schemeClr val="tx1"/>
+          </a:fontRef>
+        </p:style>
+      </p:cxnSp>
+      <p:sp>
+        <p:nvSpPr>
+          <p:cNvPr id="29" name="Rounded Rectangle 5"/>
           <p:cNvSpPr/>
           <p:nvPr/>
         </p:nvSpPr>
         <p:spPr>
           <a:xfrm>
-            <a:off x="2303529" y="3175517"/>
-            <a:ext cx="905337" cy="420284"/>
+            <a:off x="5143632" y="3221265"/>
+            <a:ext cx="1056910" cy="420284"/>
           </a:xfrm>
           <a:prstGeom prst="roundRect">
             <a:avLst/>
@@ -3520,8 +3759,37 @@
                   <a:srgbClr val="000000"/>
                 </a:solidFill>
               </a:rPr>
-              <a:t>Payments </a:t>
-            </a:r>
+              <a:t>Variable </a:t>
+            </a:r>
+            <a:r>
+              <a:rPr lang="en-US" sz="1050" dirty="0">
+                <a:solidFill>
+                  <a:srgbClr val="000000"/>
+                </a:solidFill>
+              </a:rPr>
+              <a:t>set </a:t>
+            </a:r>
+            <a:r>
+              <a:rPr lang="en-US" sz="1050" b="1" dirty="0" smtClean="0">
+                <a:solidFill>
+                  <a:srgbClr val="000000"/>
+                </a:solidFill>
+              </a:rPr>
+              <a:t>Y</a:t>
+            </a:r>
+            <a:r>
+              <a:rPr lang="en-US" sz="1050" dirty="0" smtClean="0">
+                <a:solidFill>
+                  <a:srgbClr val="000000"/>
+                </a:solidFill>
+              </a:rPr>
+              <a:t> </a:t>
+            </a:r>
+            <a:endParaRPr lang="en-US" sz="1050" dirty="0" smtClean="0">
+              <a:solidFill>
+                <a:srgbClr val="000000"/>
+              </a:solidFill>
+            </a:endParaRPr>
           </a:p>
           <a:p>
             <a:pPr algn="ctr"/>
@@ -3543,43 +3811,13 @@
       </p:sp>
       <p:sp>
         <p:nvSpPr>
-          <p:cNvPr id="80" name="TextBox 14"/>
-          <p:cNvSpPr txBox="1"/>
-          <p:nvPr/>
-        </p:nvSpPr>
-        <p:spPr>
-          <a:xfrm>
-            <a:off x="1972734" y="3188201"/>
-            <a:ext cx="344039" cy="369332"/>
-          </a:xfrm>
-          <a:prstGeom prst="rect">
-            <a:avLst/>
-          </a:prstGeom>
-          <a:noFill/>
-        </p:spPr>
-        <p:txBody>
-          <a:bodyPr wrap="none" rtlCol="0">
-            <a:spAutoFit/>
-          </a:bodyPr>
-          <a:lstStyle/>
-          <a:p>
-            <a:r>
-              <a:rPr lang="en-US" dirty="0" smtClean="0"/>
-              <a:t>…</a:t>
-            </a:r>
-            <a:endParaRPr lang="en-US" dirty="0"/>
-          </a:p>
-        </p:txBody>
-      </p:sp>
-      <p:sp>
-        <p:nvSpPr>
           <p:cNvPr id="84" name="Rounded Rectangle 5"/>
           <p:cNvSpPr/>
           <p:nvPr/>
         </p:nvSpPr>
         <p:spPr>
           <a:xfrm>
-            <a:off x="6782395" y="3178141"/>
+            <a:off x="6409862" y="3212403"/>
             <a:ext cx="1235538" cy="420284"/>
           </a:xfrm>
           <a:prstGeom prst="roundRect">
@@ -3619,119 +3857,24 @@
                   <a:srgbClr val="000000"/>
                 </a:solidFill>
               </a:rPr>
-              <a:t>Sociodemography</a:t>
-            </a:r>
-          </a:p>
-        </p:txBody>
-      </p:sp>
-      <p:cxnSp>
-        <p:nvCxnSpPr>
-          <p:cNvPr id="85" name="Straight Arrow Connector 4"/>
-          <p:cNvCxnSpPr>
-            <a:stCxn id="4" idx="4"/>
-            <a:endCxn id="84" idx="0"/>
-          </p:cNvCxnSpPr>
-          <p:nvPr/>
-        </p:nvCxnSpPr>
-        <p:spPr>
-          <a:xfrm>
-            <a:off x="4420421" y="2123902"/>
-            <a:ext cx="2979743" cy="1054239"/>
-          </a:xfrm>
-          <a:prstGeom prst="straightConnector1">
-            <a:avLst/>
-          </a:prstGeom>
-          <a:ln>
-            <a:tailEnd type="arrow"/>
-          </a:ln>
-        </p:spPr>
-        <p:style>
-          <a:lnRef idx="2">
-            <a:schemeClr val="accent1"/>
-          </a:lnRef>
-          <a:fillRef idx="0">
-            <a:schemeClr val="accent1"/>
-          </a:fillRef>
-          <a:effectRef idx="1">
-            <a:schemeClr val="accent1"/>
-          </a:effectRef>
-          <a:fontRef idx="minor">
-            <a:schemeClr val="tx1"/>
-          </a:fontRef>
-        </p:style>
-      </p:cxnSp>
-      <p:cxnSp>
-        <p:nvCxnSpPr>
-          <p:cNvPr id="92" name="Straight Arrow Connector 4"/>
-          <p:cNvCxnSpPr>
-            <a:stCxn id="4" idx="4"/>
-            <a:endCxn id="79" idx="0"/>
-          </p:cNvCxnSpPr>
-          <p:nvPr/>
-        </p:nvCxnSpPr>
-        <p:spPr>
-          <a:xfrm flipH="1">
-            <a:off x="2756198" y="2123902"/>
-            <a:ext cx="1664223" cy="1051615"/>
-          </a:xfrm>
-          <a:prstGeom prst="straightConnector1">
-            <a:avLst/>
-          </a:prstGeom>
-          <a:ln>
-            <a:tailEnd type="arrow"/>
-          </a:ln>
-        </p:spPr>
-        <p:style>
-          <a:lnRef idx="2">
-            <a:schemeClr val="accent1"/>
-          </a:lnRef>
-          <a:fillRef idx="0">
-            <a:schemeClr val="accent1"/>
-          </a:fillRef>
-          <a:effectRef idx="1">
-            <a:schemeClr val="accent1"/>
-          </a:effectRef>
-          <a:fontRef idx="minor">
-            <a:schemeClr val="tx1"/>
-          </a:fontRef>
-        </p:style>
-      </p:cxnSp>
-      <p:cxnSp>
-        <p:nvCxnSpPr>
-          <p:cNvPr id="97" name="Straight Arrow Connector 4"/>
-          <p:cNvCxnSpPr>
-            <a:stCxn id="4" idx="4"/>
-            <a:endCxn id="48" idx="0"/>
-          </p:cNvCxnSpPr>
-          <p:nvPr/>
-        </p:nvCxnSpPr>
-        <p:spPr>
-          <a:xfrm flipH="1">
-            <a:off x="1511599" y="2123902"/>
-            <a:ext cx="2908822" cy="1054239"/>
-          </a:xfrm>
-          <a:prstGeom prst="straightConnector1">
-            <a:avLst/>
-          </a:prstGeom>
-          <a:ln>
-            <a:tailEnd type="arrow"/>
-          </a:ln>
-        </p:spPr>
-        <p:style>
-          <a:lnRef idx="2">
-            <a:schemeClr val="accent1"/>
-          </a:lnRef>
-          <a:fillRef idx="0">
-            <a:schemeClr val="accent1"/>
-          </a:fillRef>
-          <a:effectRef idx="1">
-            <a:schemeClr val="accent1"/>
-          </a:effectRef>
-          <a:fontRef idx="minor">
-            <a:schemeClr val="tx1"/>
-          </a:fontRef>
-        </p:style>
-      </p:cxnSp>
+              <a:t>Variable set </a:t>
+            </a:r>
+            <a:r>
+              <a:rPr lang="en-US" sz="1050" b="1" dirty="0" smtClean="0">
+                <a:solidFill>
+                  <a:srgbClr val="000000"/>
+                </a:solidFill>
+              </a:rPr>
+              <a:t>Z</a:t>
+            </a:r>
+            <a:endParaRPr lang="en-US" sz="1050" b="1" dirty="0" smtClean="0">
+              <a:solidFill>
+                <a:srgbClr val="000000"/>
+              </a:solidFill>
+            </a:endParaRPr>
+          </a:p>
+        </p:txBody>
+      </p:sp>
     </p:spTree>
     <p:extLst>
       <p:ext uri="{BB962C8B-B14F-4D97-AF65-F5344CB8AC3E}">
@@ -4133,8 +4276,8 @@
         </p:nvCxnSpPr>
         <p:spPr>
           <a:xfrm flipV="1">
-            <a:off x="973667" y="3513667"/>
-            <a:ext cx="8136469" cy="36000"/>
+            <a:off x="457200" y="3513667"/>
+            <a:ext cx="7543800" cy="36000"/>
           </a:xfrm>
           <a:prstGeom prst="straightConnector1">
             <a:avLst/>
@@ -4197,7 +4340,7 @@
         </p:nvCxnSpPr>
         <p:spPr>
           <a:xfrm>
-            <a:off x="2760131" y="3454398"/>
+            <a:off x="3869265" y="3437465"/>
             <a:ext cx="2" cy="194732"/>
           </a:xfrm>
           <a:prstGeom prst="line">
@@ -4227,8 +4370,8 @@
         </p:nvSpPr>
         <p:spPr>
           <a:xfrm rot="5400000">
-            <a:off x="4140198" y="1312334"/>
-            <a:ext cx="414869" cy="3175002"/>
+            <a:off x="4800599" y="1964272"/>
+            <a:ext cx="203198" cy="2065866"/>
           </a:xfrm>
           <a:prstGeom prst="leftBrace">
             <a:avLst/>
@@ -4259,7 +4402,11 @@
           <a:lstStyle/>
           <a:p>
             <a:pPr algn="ctr"/>
-            <a:endParaRPr lang="en-US"/>
+            <a:r>
+              <a:rPr lang="en-US" dirty="0" smtClean="0"/>
+              <a:t> </a:t>
+            </a:r>
+            <a:endParaRPr lang="en-US" dirty="0"/>
           </a:p>
         </p:txBody>
       </p:sp>
@@ -4271,7 +4418,7 @@
         </p:nvSpPr>
         <p:spPr>
           <a:xfrm>
-            <a:off x="3600745" y="2180339"/>
+            <a:off x="4168012" y="2230735"/>
             <a:ext cx="1499028" cy="461665"/>
           </a:xfrm>
           <a:prstGeom prst="rect">
@@ -4315,58 +4462,14 @@
       </p:sp>
       <p:sp>
         <p:nvSpPr>
-          <p:cNvPr id="15" name="Left Brace 14"/>
-          <p:cNvSpPr/>
-          <p:nvPr/>
-        </p:nvSpPr>
-        <p:spPr>
-          <a:xfrm rot="5400000">
-            <a:off x="1786465" y="2133603"/>
-            <a:ext cx="414869" cy="1532464"/>
-          </a:xfrm>
-          <a:prstGeom prst="leftBrace">
-            <a:avLst/>
-          </a:prstGeom>
-          <a:noFill/>
-          <a:ln>
-            <a:solidFill>
-              <a:schemeClr val="accent2"/>
-            </a:solidFill>
-          </a:ln>
-        </p:spPr>
-        <p:style>
-          <a:lnRef idx="2">
-            <a:schemeClr val="accent1"/>
-          </a:lnRef>
-          <a:fillRef idx="0">
-            <a:schemeClr val="accent1"/>
-          </a:fillRef>
-          <a:effectRef idx="1">
-            <a:schemeClr val="accent1"/>
-          </a:effectRef>
-          <a:fontRef idx="minor">
-            <a:schemeClr val="tx1"/>
-          </a:fontRef>
-        </p:style>
-        <p:txBody>
-          <a:bodyPr rtlCol="0" anchor="ctr"/>
-          <a:lstStyle/>
-          <a:p>
-            <a:pPr algn="ctr"/>
-            <a:endParaRPr lang="en-US"/>
-          </a:p>
-        </p:txBody>
-      </p:sp>
-      <p:sp>
-        <p:nvSpPr>
           <p:cNvPr id="16" name="TextBox 15"/>
           <p:cNvSpPr txBox="1"/>
           <p:nvPr/>
         </p:nvSpPr>
         <p:spPr>
           <a:xfrm>
-            <a:off x="1307677" y="1927940"/>
-            <a:ext cx="1406680" cy="646331"/>
+            <a:off x="3013504" y="1776915"/>
+            <a:ext cx="1154508" cy="646331"/>
           </a:xfrm>
           <a:prstGeom prst="rect">
             <a:avLst/>
@@ -4388,20 +4491,67 @@
                   </a:schemeClr>
                 </a:solidFill>
               </a:rPr>
-              <a:t>Financial activity </a:t>
-            </a:r>
-          </a:p>
-          <a:p>
-            <a:pPr algn="ctr"/>
-            <a:r>
-              <a:rPr lang="en-US" sz="1200" dirty="0" smtClean="0">
+              <a:t>Variable set </a:t>
+            </a:r>
+            <a:r>
+              <a:rPr lang="en-US" sz="1200" b="1" dirty="0" smtClean="0">
                 <a:solidFill>
                   <a:schemeClr val="accent2">
                     <a:lumMod val="75000"/>
                   </a:schemeClr>
                 </a:solidFill>
               </a:rPr>
-              <a:t>Payment behaviour </a:t>
+              <a:t>X</a:t>
+            </a:r>
+            <a:endParaRPr lang="en-US" sz="1200" b="1" dirty="0" smtClean="0">
+              <a:solidFill>
+                <a:schemeClr val="accent2">
+                  <a:lumMod val="75000"/>
+                </a:schemeClr>
+              </a:solidFill>
+            </a:endParaRPr>
+          </a:p>
+          <a:p>
+            <a:pPr algn="ctr"/>
+            <a:r>
+              <a:rPr lang="en-US" sz="1200" i="1" dirty="0">
+                <a:solidFill>
+                  <a:schemeClr val="accent2">
+                    <a:lumMod val="75000"/>
+                  </a:schemeClr>
+                </a:solidFill>
+              </a:rPr>
+              <a:t>k</a:t>
+            </a:r>
+            <a:r>
+              <a:rPr lang="en-US" sz="1200" i="1" dirty="0" smtClean="0">
+                <a:solidFill>
+                  <a:schemeClr val="accent2">
+                    <a:lumMod val="75000"/>
+                  </a:schemeClr>
+                </a:solidFill>
+              </a:rPr>
+              <a:t> – 180 days</a:t>
+            </a:r>
+            <a:endParaRPr lang="en-US" sz="1200" i="1" dirty="0">
+              <a:solidFill>
+                <a:schemeClr val="accent2">
+                  <a:lumMod val="75000"/>
+                </a:schemeClr>
+              </a:solidFill>
+            </a:endParaRPr>
+          </a:p>
+          <a:p>
+            <a:pPr algn="ctr"/>
+            <a:r>
+              <a:rPr lang="en-US" sz="1200" dirty="0" smtClean="0">
+                <a:solidFill>
+                  <a:schemeClr val="accent2">
+                    <a:lumMod val="75000"/>
+                  </a:schemeClr>
+                </a:solidFill>
+              </a:rPr>
+              <a:t>(TRAINING SET) </a:t>
             </a:r>
             <a:endParaRPr lang="en-US" sz="1200" dirty="0">
               <a:solidFill>
@@ -4411,70 +4561,6 @@
               </a:solidFill>
             </a:endParaRPr>
           </a:p>
-          <a:p>
-            <a:pPr algn="ctr"/>
-            <a:r>
-              <a:rPr lang="en-US" sz="1200" dirty="0" smtClean="0">
-                <a:solidFill>
-                  <a:schemeClr val="accent2">
-                    <a:lumMod val="75000"/>
-                  </a:schemeClr>
-                </a:solidFill>
-              </a:rPr>
-              <a:t>(TRAINING SET) </a:t>
-            </a:r>
-            <a:endParaRPr lang="en-US" sz="1200" dirty="0">
-              <a:solidFill>
-                <a:schemeClr val="accent2">
-                  <a:lumMod val="75000"/>
-                </a:schemeClr>
-              </a:solidFill>
-            </a:endParaRPr>
-          </a:p>
-        </p:txBody>
-      </p:sp>
-      <p:sp>
-        <p:nvSpPr>
-          <p:cNvPr id="17" name="Left Brace 16"/>
-          <p:cNvSpPr/>
-          <p:nvPr/>
-        </p:nvSpPr>
-        <p:spPr>
-          <a:xfrm rot="16200000">
-            <a:off x="4961467" y="3522145"/>
-            <a:ext cx="414869" cy="1532464"/>
-          </a:xfrm>
-          <a:prstGeom prst="leftBrace">
-            <a:avLst/>
-          </a:prstGeom>
-          <a:noFill/>
-          <a:ln>
-            <a:solidFill>
-              <a:schemeClr val="accent3"/>
-            </a:solidFill>
-          </a:ln>
-        </p:spPr>
-        <p:style>
-          <a:lnRef idx="2">
-            <a:schemeClr val="accent1"/>
-          </a:lnRef>
-          <a:fillRef idx="0">
-            <a:schemeClr val="accent1"/>
-          </a:fillRef>
-          <a:effectRef idx="1">
-            <a:schemeClr val="accent1"/>
-          </a:effectRef>
-          <a:fontRef idx="minor">
-            <a:schemeClr val="tx1"/>
-          </a:fontRef>
-        </p:style>
-        <p:txBody>
-          <a:bodyPr rtlCol="0" anchor="ctr"/>
-          <a:lstStyle/>
-          <a:p>
-            <a:pPr algn="ctr"/>
-            <a:endParaRPr lang="en-US"/>
-          </a:p>
         </p:txBody>
       </p:sp>
       <p:sp>
@@ -4485,8 +4571,8 @@
         </p:nvSpPr>
         <p:spPr>
           <a:xfrm>
-            <a:off x="4471579" y="4522236"/>
-            <a:ext cx="1406680" cy="646331"/>
+            <a:off x="4985531" y="4822469"/>
+            <a:ext cx="1387369" cy="646331"/>
           </a:xfrm>
           <a:prstGeom prst="rect">
             <a:avLst/>
@@ -4506,19 +4592,40 @@
                   <a:srgbClr val="008000"/>
                 </a:solidFill>
               </a:rPr>
-              <a:t>Financial activity</a:t>
+              <a:t>Variable set </a:t>
+            </a:r>
+            <a:r>
+              <a:rPr lang="en-US" sz="1200" b="1" dirty="0" smtClean="0">
+                <a:solidFill>
+                  <a:srgbClr val="008000"/>
+                </a:solidFill>
+              </a:rPr>
+              <a:t>X </a:t>
             </a:r>
           </a:p>
           <a:p>
             <a:pPr algn="ctr"/>
             <a:r>
-              <a:rPr lang="en-US" sz="1200" dirty="0" smtClean="0">
+              <a:rPr lang="en-US" sz="1200" i="1" dirty="0" smtClean="0">
                 <a:solidFill>
                   <a:srgbClr val="008000"/>
                 </a:solidFill>
               </a:rPr>
-              <a:t>Payment behaviour</a:t>
-            </a:r>
+              <a:t>t - </a:t>
+            </a:r>
+            <a:r>
+              <a:rPr lang="en-US" sz="1200" i="1" dirty="0" smtClean="0">
+                <a:solidFill>
+                  <a:srgbClr val="008000"/>
+                </a:solidFill>
+              </a:rPr>
+              <a:t>180 days</a:t>
+            </a:r>
+            <a:endParaRPr lang="en-US" sz="1200" i="1" dirty="0" smtClean="0">
+              <a:solidFill>
+                <a:srgbClr val="008000"/>
+              </a:solidFill>
+            </a:endParaRPr>
           </a:p>
           <a:p>
             <a:pPr algn="ctr"/>
@@ -4592,7 +4699,7 @@
         </p:nvSpPr>
         <p:spPr>
           <a:xfrm>
-            <a:off x="2406815" y="3615262"/>
+            <a:off x="3498016" y="3632197"/>
             <a:ext cx="742498" cy="369332"/>
           </a:xfrm>
           <a:prstGeom prst="rect">
@@ -4638,7 +4745,7 @@
         </p:nvSpPr>
         <p:spPr>
           <a:xfrm>
-            <a:off x="3954559" y="3093529"/>
+            <a:off x="4437159" y="3068133"/>
             <a:ext cx="854508" cy="369332"/>
           </a:xfrm>
           <a:prstGeom prst="rect">
@@ -4671,15 +4778,13 @@
       <p:cxnSp>
         <p:nvCxnSpPr>
           <p:cNvPr id="25" name="Straight Arrow Connector 24"/>
-          <p:cNvCxnSpPr>
-            <a:stCxn id="23" idx="3"/>
-          </p:cNvCxnSpPr>
+          <p:cNvCxnSpPr/>
           <p:nvPr/>
         </p:nvCxnSpPr>
         <p:spPr>
           <a:xfrm>
-            <a:off x="4809067" y="3278195"/>
-            <a:ext cx="1126067" cy="0"/>
+            <a:off x="5291667" y="3278199"/>
+            <a:ext cx="643467" cy="8463"/>
           </a:xfrm>
           <a:prstGeom prst="straightConnector1">
             <a:avLst/>
@@ -4706,15 +4811,13 @@
       <p:cxnSp>
         <p:nvCxnSpPr>
           <p:cNvPr id="29" name="Straight Arrow Connector 28"/>
-          <p:cNvCxnSpPr>
-            <a:stCxn id="23" idx="1"/>
-          </p:cNvCxnSpPr>
+          <p:cNvCxnSpPr/>
           <p:nvPr/>
         </p:nvCxnSpPr>
         <p:spPr>
-          <a:xfrm flipH="1">
-            <a:off x="2760131" y="3278195"/>
-            <a:ext cx="1194428" cy="13741"/>
+          <a:xfrm flipH="1" flipV="1">
+            <a:off x="3869265" y="3269732"/>
+            <a:ext cx="567894" cy="8468"/>
           </a:xfrm>
           <a:prstGeom prst="straightConnector1">
             <a:avLst/>
@@ -4746,8 +4849,8 @@
         </p:nvSpPr>
         <p:spPr>
           <a:xfrm rot="16200000">
-            <a:off x="7320213" y="2707499"/>
-            <a:ext cx="414869" cy="3164979"/>
+            <a:off x="6859601" y="3071792"/>
+            <a:ext cx="216931" cy="2065870"/>
           </a:xfrm>
           <a:prstGeom prst="leftBrace">
             <a:avLst/>
@@ -4790,7 +4893,7 @@
         </p:nvSpPr>
         <p:spPr>
           <a:xfrm>
-            <a:off x="6461185" y="4527737"/>
+            <a:off x="5962092" y="4264273"/>
             <a:ext cx="2121093" cy="461665"/>
           </a:xfrm>
           <a:prstGeom prst="rect">
@@ -4832,15 +4935,215 @@
           </a:p>
         </p:txBody>
       </p:sp>
-      <p:sp>
-        <p:nvSpPr>
-          <p:cNvPr id="39" name="TextBox 38"/>
+      <p:cxnSp>
+        <p:nvCxnSpPr>
+          <p:cNvPr id="43" name="Straight Connector 42"/>
+          <p:cNvCxnSpPr/>
+          <p:nvPr/>
+        </p:nvCxnSpPr>
+        <p:spPr>
+          <a:xfrm>
+            <a:off x="8001000" y="3416301"/>
+            <a:ext cx="0" cy="194732"/>
+          </a:xfrm>
+          <a:prstGeom prst="line">
+            <a:avLst/>
+          </a:prstGeom>
+        </p:spPr>
+        <p:style>
+          <a:lnRef idx="2">
+            <a:schemeClr val="accent1"/>
+          </a:lnRef>
+          <a:fillRef idx="0">
+            <a:schemeClr val="accent1"/>
+          </a:fillRef>
+          <a:effectRef idx="1">
+            <a:schemeClr val="accent1"/>
+          </a:effectRef>
+          <a:fontRef idx="minor">
+            <a:schemeClr val="tx1"/>
+          </a:fontRef>
+        </p:style>
+      </p:cxnSp>
+      <p:sp>
+        <p:nvSpPr>
+          <p:cNvPr id="24" name="Left Brace 16"/>
+          <p:cNvSpPr/>
+          <p:nvPr/>
+        </p:nvSpPr>
+        <p:spPr>
+          <a:xfrm rot="16200000">
+            <a:off x="4298952" y="2755402"/>
+            <a:ext cx="207434" cy="3064937"/>
+          </a:xfrm>
+          <a:prstGeom prst="leftBrace">
+            <a:avLst/>
+          </a:prstGeom>
+          <a:noFill/>
+          <a:ln>
+            <a:solidFill>
+              <a:schemeClr val="accent3"/>
+            </a:solidFill>
+          </a:ln>
+        </p:spPr>
+        <p:style>
+          <a:lnRef idx="2">
+            <a:schemeClr val="accent1"/>
+          </a:lnRef>
+          <a:fillRef idx="0">
+            <a:schemeClr val="accent1"/>
+          </a:fillRef>
+          <a:effectRef idx="1">
+            <a:schemeClr val="accent1"/>
+          </a:effectRef>
+          <a:fontRef idx="minor">
+            <a:schemeClr val="tx1"/>
+          </a:fontRef>
+        </p:style>
+        <p:txBody>
+          <a:bodyPr rtlCol="0" anchor="ctr"/>
+          <a:lstStyle/>
+          <a:p>
+            <a:pPr algn="ctr"/>
+            <a:endParaRPr lang="en-US"/>
+          </a:p>
+        </p:txBody>
+      </p:sp>
+      <p:sp>
+        <p:nvSpPr>
+          <p:cNvPr id="27" name="Left Brace 16"/>
+          <p:cNvSpPr/>
+          <p:nvPr/>
+        </p:nvSpPr>
+        <p:spPr>
+          <a:xfrm rot="16200000">
+            <a:off x="5574902" y="4444674"/>
+            <a:ext cx="205556" cy="568824"/>
+          </a:xfrm>
+          <a:prstGeom prst="leftBrace">
+            <a:avLst/>
+          </a:prstGeom>
+          <a:noFill/>
+          <a:ln>
+            <a:solidFill>
+              <a:schemeClr val="accent3"/>
+            </a:solidFill>
+          </a:ln>
+        </p:spPr>
+        <p:style>
+          <a:lnRef idx="2">
+            <a:schemeClr val="accent1"/>
+          </a:lnRef>
+          <a:fillRef idx="0">
+            <a:schemeClr val="accent1"/>
+          </a:fillRef>
+          <a:effectRef idx="1">
+            <a:schemeClr val="accent1"/>
+          </a:effectRef>
+          <a:fontRef idx="minor">
+            <a:schemeClr val="tx1"/>
+          </a:fontRef>
+        </p:style>
+        <p:txBody>
+          <a:bodyPr rtlCol="0" anchor="ctr"/>
+          <a:lstStyle/>
+          <a:p>
+            <a:pPr algn="ctr"/>
+            <a:endParaRPr lang="en-US"/>
+          </a:p>
+        </p:txBody>
+      </p:sp>
+      <p:sp>
+        <p:nvSpPr>
+          <p:cNvPr id="28" name="TextBox 17"/>
           <p:cNvSpPr txBox="1"/>
           <p:nvPr/>
         </p:nvSpPr>
         <p:spPr>
           <a:xfrm>
-            <a:off x="7129561" y="3085066"/>
+            <a:off x="3691831" y="4381693"/>
+            <a:ext cx="1405202" cy="646331"/>
+          </a:xfrm>
+          <a:prstGeom prst="rect">
+            <a:avLst/>
+          </a:prstGeom>
+          <a:noFill/>
+        </p:spPr>
+        <p:txBody>
+          <a:bodyPr wrap="none" rtlCol="0">
+            <a:spAutoFit/>
+          </a:bodyPr>
+          <a:lstStyle/>
+          <a:p>
+            <a:pPr algn="ctr"/>
+            <a:r>
+              <a:rPr lang="en-US" sz="1200" dirty="0" smtClean="0">
+                <a:solidFill>
+                  <a:srgbClr val="008000"/>
+                </a:solidFill>
+              </a:rPr>
+              <a:t>Variable set </a:t>
+            </a:r>
+            <a:r>
+              <a:rPr lang="en-US" sz="1200" b="1" dirty="0">
+                <a:solidFill>
+                  <a:srgbClr val="008000"/>
+                </a:solidFill>
+              </a:rPr>
+              <a:t>Y</a:t>
+            </a:r>
+            <a:r>
+              <a:rPr lang="en-US" sz="1200" b="1" dirty="0" smtClean="0">
+                <a:solidFill>
+                  <a:srgbClr val="008000"/>
+                </a:solidFill>
+              </a:rPr>
+              <a:t> </a:t>
+            </a:r>
+          </a:p>
+          <a:p>
+            <a:pPr algn="ctr"/>
+            <a:r>
+              <a:rPr lang="en-US" sz="1200" i="1" dirty="0" smtClean="0">
+                <a:solidFill>
+                  <a:srgbClr val="008000"/>
+                </a:solidFill>
+              </a:rPr>
+              <a:t> t – 6 semesters</a:t>
+            </a:r>
+            <a:endParaRPr lang="en-US" sz="1200" i="1" dirty="0" smtClean="0">
+              <a:solidFill>
+                <a:srgbClr val="008000"/>
+              </a:solidFill>
+            </a:endParaRPr>
+          </a:p>
+          <a:p>
+            <a:pPr algn="ctr"/>
+            <a:r>
+              <a:rPr lang="en-US" sz="1200" dirty="0" smtClean="0">
+                <a:solidFill>
+                  <a:srgbClr val="008000"/>
+                </a:solidFill>
+              </a:rPr>
+              <a:t> (EVALUATION SET) </a:t>
+            </a:r>
+            <a:endParaRPr lang="en-US" sz="1200" dirty="0">
+              <a:solidFill>
+                <a:srgbClr val="008000"/>
+              </a:solidFill>
+            </a:endParaRPr>
+          </a:p>
+        </p:txBody>
+      </p:sp>
+      <p:sp>
+        <p:nvSpPr>
+          <p:cNvPr id="32" name="TextBox 22"/>
+          <p:cNvSpPr txBox="1"/>
+          <p:nvPr/>
+        </p:nvSpPr>
+        <p:spPr>
+          <a:xfrm>
+            <a:off x="6503025" y="3090902"/>
             <a:ext cx="854508" cy="369332"/>
           </a:xfrm>
           <a:prstGeom prst="rect">
@@ -4872,16 +5175,14 @@
       </p:sp>
       <p:cxnSp>
         <p:nvCxnSpPr>
-          <p:cNvPr id="40" name="Straight Arrow Connector 39"/>
-          <p:cNvCxnSpPr>
-            <a:stCxn id="39" idx="3"/>
-          </p:cNvCxnSpPr>
+          <p:cNvPr id="33" name="Straight Arrow Connector 24"/>
+          <p:cNvCxnSpPr/>
           <p:nvPr/>
         </p:nvCxnSpPr>
         <p:spPr>
           <a:xfrm>
-            <a:off x="7984069" y="3269732"/>
-            <a:ext cx="1126067" cy="0"/>
+            <a:off x="7357533" y="3300968"/>
+            <a:ext cx="643467" cy="1"/>
           </a:xfrm>
           <a:prstGeom prst="straightConnector1">
             <a:avLst/>
@@ -4907,16 +5208,14 @@
       </p:cxnSp>
       <p:cxnSp>
         <p:nvCxnSpPr>
-          <p:cNvPr id="41" name="Straight Arrow Connector 40"/>
-          <p:cNvCxnSpPr>
-            <a:stCxn id="39" idx="1"/>
-          </p:cNvCxnSpPr>
+          <p:cNvPr id="44" name="Straight Arrow Connector 28"/>
+          <p:cNvCxnSpPr/>
           <p:nvPr/>
         </p:nvCxnSpPr>
         <p:spPr>
-          <a:xfrm flipH="1">
-            <a:off x="5935133" y="3269732"/>
-            <a:ext cx="1194428" cy="13741"/>
+          <a:xfrm flipH="1" flipV="1">
+            <a:off x="5935138" y="3294103"/>
+            <a:ext cx="567894" cy="0"/>
           </a:xfrm>
           <a:prstGeom prst="straightConnector1">
             <a:avLst/>
@@ -4940,20 +5239,26 @@
           </a:fontRef>
         </p:style>
       </p:cxnSp>
-      <p:cxnSp>
-        <p:nvCxnSpPr>
-          <p:cNvPr id="43" name="Straight Connector 42"/>
-          <p:cNvCxnSpPr/>
-          <p:nvPr/>
-        </p:nvCxnSpPr>
-        <p:spPr>
-          <a:xfrm>
-            <a:off x="9110136" y="3420530"/>
-            <a:ext cx="0" cy="194732"/>
-          </a:xfrm>
-          <a:prstGeom prst="line">
-            <a:avLst/>
-          </a:prstGeom>
+      <p:sp>
+        <p:nvSpPr>
+          <p:cNvPr id="45" name="Left Brace 9"/>
+          <p:cNvSpPr/>
+          <p:nvPr/>
+        </p:nvSpPr>
+        <p:spPr>
+          <a:xfrm rot="5400000">
+            <a:off x="3483253" y="2204794"/>
+            <a:ext cx="203200" cy="568824"/>
+          </a:xfrm>
+          <a:prstGeom prst="leftBrace">
+            <a:avLst/>
+          </a:prstGeom>
+          <a:noFill/>
+          <a:ln>
+            <a:solidFill>
+              <a:schemeClr val="accent2"/>
+            </a:solidFill>
+          </a:ln>
         </p:spPr>
         <p:style>
           <a:lnRef idx="2">
@@ -4969,7 +5274,170 @@
             <a:schemeClr val="tx1"/>
           </a:fontRef>
         </p:style>
-      </p:cxnSp>
+        <p:txBody>
+          <a:bodyPr rtlCol="0" anchor="ctr"/>
+          <a:lstStyle/>
+          <a:p>
+            <a:pPr algn="ctr"/>
+            <a:r>
+              <a:rPr lang="en-US" dirty="0" smtClean="0"/>
+              <a:t> </a:t>
+            </a:r>
+            <a:endParaRPr lang="en-US" dirty="0"/>
+          </a:p>
+        </p:txBody>
+      </p:sp>
+      <p:sp>
+        <p:nvSpPr>
+          <p:cNvPr id="46" name="Left Brace 9"/>
+          <p:cNvSpPr/>
+          <p:nvPr/>
+        </p:nvSpPr>
+        <p:spPr>
+          <a:xfrm rot="5400000">
+            <a:off x="2202151" y="1228492"/>
+            <a:ext cx="242334" cy="3091893"/>
+          </a:xfrm>
+          <a:prstGeom prst="leftBrace">
+            <a:avLst/>
+          </a:prstGeom>
+          <a:noFill/>
+          <a:ln>
+            <a:solidFill>
+              <a:schemeClr val="accent2"/>
+            </a:solidFill>
+          </a:ln>
+        </p:spPr>
+        <p:style>
+          <a:lnRef idx="2">
+            <a:schemeClr val="accent1"/>
+          </a:lnRef>
+          <a:fillRef idx="0">
+            <a:schemeClr val="accent1"/>
+          </a:fillRef>
+          <a:effectRef idx="1">
+            <a:schemeClr val="accent1"/>
+          </a:effectRef>
+          <a:fontRef idx="minor">
+            <a:schemeClr val="tx1"/>
+          </a:fontRef>
+        </p:style>
+        <p:txBody>
+          <a:bodyPr rtlCol="0" anchor="ctr"/>
+          <a:lstStyle/>
+          <a:p>
+            <a:pPr algn="ctr"/>
+            <a:r>
+              <a:rPr lang="en-US" dirty="0" smtClean="0"/>
+              <a:t> </a:t>
+            </a:r>
+            <a:endParaRPr lang="en-US" dirty="0"/>
+          </a:p>
+        </p:txBody>
+      </p:sp>
+      <p:sp>
+        <p:nvSpPr>
+          <p:cNvPr id="47" name="TextBox 15"/>
+          <p:cNvSpPr txBox="1"/>
+          <p:nvPr/>
+        </p:nvSpPr>
+        <p:spPr>
+          <a:xfrm>
+            <a:off x="1715692" y="1907569"/>
+            <a:ext cx="1154508" cy="646331"/>
+          </a:xfrm>
+          <a:prstGeom prst="rect">
+            <a:avLst/>
+          </a:prstGeom>
+          <a:noFill/>
+        </p:spPr>
+        <p:txBody>
+          <a:bodyPr wrap="none" rtlCol="0">
+            <a:spAutoFit/>
+          </a:bodyPr>
+          <a:lstStyle/>
+          <a:p>
+            <a:pPr algn="ctr"/>
+            <a:r>
+              <a:rPr lang="en-US" sz="1200" dirty="0" smtClean="0">
+                <a:solidFill>
+                  <a:schemeClr val="accent2">
+                    <a:lumMod val="75000"/>
+                  </a:schemeClr>
+                </a:solidFill>
+              </a:rPr>
+              <a:t>Variable set </a:t>
+            </a:r>
+            <a:r>
+              <a:rPr lang="en-US" sz="1200" b="1" dirty="0" smtClean="0">
+                <a:solidFill>
+                  <a:schemeClr val="accent2">
+                    <a:lumMod val="75000"/>
+                  </a:schemeClr>
+                </a:solidFill>
+              </a:rPr>
+              <a:t>Y</a:t>
+            </a:r>
+            <a:r>
+              <a:rPr lang="en-US" sz="1200" dirty="0" smtClean="0">
+                <a:solidFill>
+                  <a:schemeClr val="accent2">
+                    <a:lumMod val="75000"/>
+                  </a:schemeClr>
+                </a:solidFill>
+              </a:rPr>
+              <a:t> </a:t>
+            </a:r>
+            <a:endParaRPr lang="en-US" sz="1200" b="1" dirty="0" smtClean="0">
+              <a:solidFill>
+                <a:schemeClr val="accent2">
+                  <a:lumMod val="75000"/>
+                </a:schemeClr>
+              </a:solidFill>
+            </a:endParaRPr>
+          </a:p>
+          <a:p>
+            <a:pPr algn="ctr"/>
+            <a:r>
+              <a:rPr lang="en-US" sz="1200" i="1" dirty="0" smtClean="0">
+                <a:solidFill>
+                  <a:schemeClr val="accent2">
+                    <a:lumMod val="75000"/>
+                  </a:schemeClr>
+                </a:solidFill>
+              </a:rPr>
+              <a:t>t – 6 semesters</a:t>
+            </a:r>
+            <a:endParaRPr lang="en-US" sz="1200" i="1" dirty="0">
+              <a:solidFill>
+                <a:schemeClr val="accent2">
+                  <a:lumMod val="75000"/>
+                </a:schemeClr>
+              </a:solidFill>
+            </a:endParaRPr>
+          </a:p>
+          <a:p>
+            <a:pPr algn="ctr"/>
+            <a:r>
+              <a:rPr lang="en-US" sz="1200" dirty="0" smtClean="0">
+                <a:solidFill>
+                  <a:schemeClr val="accent2">
+                    <a:lumMod val="75000"/>
+                  </a:schemeClr>
+                </a:solidFill>
+              </a:rPr>
+              <a:t>(TRAINING SET) </a:t>
+            </a:r>
+            <a:endParaRPr lang="en-US" sz="1200" dirty="0">
+              <a:solidFill>
+                <a:schemeClr val="accent2">
+                  <a:lumMod val="75000"/>
+                </a:schemeClr>
+              </a:solidFill>
+            </a:endParaRPr>
+          </a:p>
+        </p:txBody>
+      </p:sp>
     </p:spTree>
     <p:extLst>
       <p:ext uri="{BB962C8B-B14F-4D97-AF65-F5344CB8AC3E}">
@@ -5769,14 +6237,15 @@
         <p:nvCxnSpPr>
           <p:cNvPr id="26" name="Straight Arrow Connector 25"/>
           <p:cNvCxnSpPr>
-            <a:endCxn id="25" idx="1"/>
+            <a:stCxn id="19" idx="3"/>
+            <a:endCxn id="22" idx="1"/>
           </p:cNvCxnSpPr>
           <p:nvPr/>
         </p:nvCxnSpPr>
         <p:spPr>
-          <a:xfrm flipV="1">
-            <a:off x="3745655" y="3330015"/>
-            <a:ext cx="674539" cy="4644"/>
+          <a:xfrm>
+            <a:off x="3873500" y="3367414"/>
+            <a:ext cx="361825" cy="0"/>
           </a:xfrm>
           <a:prstGeom prst="straightConnector1">
             <a:avLst/>
@@ -5805,7 +6274,6 @@
           <p:cNvPr id="4" name="Straight Arrow Connector 3"/>
           <p:cNvCxnSpPr>
             <a:stCxn id="9" idx="4"/>
-            <a:endCxn id="5" idx="0"/>
           </p:cNvCxnSpPr>
           <p:nvPr/>
         </p:nvCxnSpPr>
@@ -5836,25 +6304,88 @@
           </a:fontRef>
         </p:style>
       </p:cxnSp>
-      <p:sp>
-        <p:nvSpPr>
-          <p:cNvPr id="5" name="Rounded Rectangle 4"/>
+      <p:cxnSp>
+        <p:nvCxnSpPr>
+          <p:cNvPr id="7" name="Straight Arrow Connector 6"/>
+          <p:cNvCxnSpPr/>
+          <p:nvPr/>
+        </p:nvCxnSpPr>
+        <p:spPr>
+          <a:xfrm>
+            <a:off x="7609291" y="2501079"/>
+            <a:ext cx="0" cy="656214"/>
+          </a:xfrm>
+          <a:prstGeom prst="straightConnector1">
+            <a:avLst/>
+          </a:prstGeom>
+          <a:ln>
+            <a:tailEnd type="arrow"/>
+          </a:ln>
+        </p:spPr>
+        <p:style>
+          <a:lnRef idx="2">
+            <a:schemeClr val="accent1"/>
+          </a:lnRef>
+          <a:fillRef idx="0">
+            <a:schemeClr val="accent1"/>
+          </a:fillRef>
+          <a:effectRef idx="1">
+            <a:schemeClr val="accent1"/>
+          </a:effectRef>
+          <a:fontRef idx="minor">
+            <a:schemeClr val="tx1"/>
+          </a:fontRef>
+        </p:style>
+      </p:cxnSp>
+      <p:sp>
+        <p:nvSpPr>
+          <p:cNvPr id="8" name="TextBox 7"/>
+          <p:cNvSpPr txBox="1"/>
+          <p:nvPr/>
+        </p:nvSpPr>
+        <p:spPr>
+          <a:xfrm>
+            <a:off x="6016083" y="3138049"/>
+            <a:ext cx="402311" cy="369332"/>
+          </a:xfrm>
+          <a:prstGeom prst="rect">
+            <a:avLst/>
+          </a:prstGeom>
+          <a:noFill/>
+        </p:spPr>
+        <p:txBody>
+          <a:bodyPr wrap="none" rtlCol="0">
+            <a:spAutoFit/>
+          </a:bodyPr>
+          <a:lstStyle/>
+          <a:p>
+            <a:r>
+              <a:rPr lang="en-US" dirty="0" smtClean="0"/>
+              <a:t>….</a:t>
+            </a:r>
+            <a:endParaRPr lang="en-US" dirty="0"/>
+          </a:p>
+        </p:txBody>
+      </p:sp>
+      <p:sp>
+        <p:nvSpPr>
+          <p:cNvPr id="9" name="Oval 8"/>
           <p:cNvSpPr/>
           <p:nvPr/>
         </p:nvSpPr>
         <p:spPr>
           <a:xfrm>
-            <a:off x="3048594" y="3152649"/>
-            <a:ext cx="697061" cy="354732"/>
-          </a:xfrm>
-          <a:prstGeom prst="roundRect">
-            <a:avLst/>
-          </a:prstGeom>
-          <a:noFill/>
+            <a:off x="2933700" y="2001182"/>
+            <a:ext cx="939800" cy="495253"/>
+          </a:xfrm>
+          <a:prstGeom prst="ellipse">
+            <a:avLst/>
+          </a:prstGeom>
           <a:ln>
             <a:solidFill>
-              <a:schemeClr val="tx1"/>
+              <a:srgbClr val="000000"/>
             </a:solidFill>
+            <a:prstDash val="solid"/>
           </a:ln>
         </p:spPr>
         <p:style>
@@ -5879,14 +6410,14 @@
           <a:p>
             <a:pPr algn="ctr"/>
             <a:r>
-              <a:rPr lang="en-US" sz="1050" dirty="0" smtClean="0">
+              <a:rPr lang="en-US" sz="1000" dirty="0" smtClean="0">
                 <a:solidFill>
                   <a:srgbClr val="000000"/>
                 </a:solidFill>
               </a:rPr>
-              <a:t>Day -180</a:t>
-            </a:r>
-            <a:endParaRPr lang="en-US" sz="1050" dirty="0">
+              <a:t>Defaulter -180</a:t>
+            </a:r>
+            <a:endParaRPr lang="en-US" sz="1000" dirty="0">
               <a:solidFill>
                 <a:srgbClr val="000000"/>
               </a:solidFill>
@@ -5894,25 +6425,58 @@
           </a:p>
         </p:txBody>
       </p:sp>
-      <p:sp>
-        <p:nvSpPr>
-          <p:cNvPr id="6" name="Rounded Rectangle 5"/>
+      <p:cxnSp>
+        <p:nvCxnSpPr>
+          <p:cNvPr id="24" name="Straight Arrow Connector 23"/>
+          <p:cNvCxnSpPr/>
+          <p:nvPr/>
+        </p:nvCxnSpPr>
+        <p:spPr>
+          <a:xfrm flipH="1">
+            <a:off x="4768725" y="2496435"/>
+            <a:ext cx="6475" cy="656214"/>
+          </a:xfrm>
+          <a:prstGeom prst="straightConnector1">
+            <a:avLst/>
+          </a:prstGeom>
+          <a:ln>
+            <a:tailEnd type="arrow"/>
+          </a:ln>
+        </p:spPr>
+        <p:style>
+          <a:lnRef idx="2">
+            <a:schemeClr val="accent1"/>
+          </a:lnRef>
+          <a:fillRef idx="0">
+            <a:schemeClr val="accent1"/>
+          </a:fillRef>
+          <a:effectRef idx="1">
+            <a:schemeClr val="accent1"/>
+          </a:effectRef>
+          <a:fontRef idx="minor">
+            <a:schemeClr val="tx1"/>
+          </a:fontRef>
+        </p:style>
+      </p:cxnSp>
+      <p:sp>
+        <p:nvSpPr>
+          <p:cNvPr id="20" name="Oval 19"/>
           <p:cNvSpPr/>
           <p:nvPr/>
         </p:nvSpPr>
         <p:spPr>
           <a:xfrm>
-            <a:off x="7260760" y="3157293"/>
-            <a:ext cx="697061" cy="354732"/>
-          </a:xfrm>
-          <a:prstGeom prst="roundRect">
-            <a:avLst/>
-          </a:prstGeom>
-          <a:noFill/>
+            <a:off x="4292600" y="2001182"/>
+            <a:ext cx="939800" cy="495253"/>
+          </a:xfrm>
+          <a:prstGeom prst="ellipse">
+            <a:avLst/>
+          </a:prstGeom>
           <a:ln>
             <a:solidFill>
-              <a:schemeClr val="tx1"/>
+              <a:srgbClr val="000000"/>
             </a:solidFill>
+            <a:prstDash val="solid"/>
           </a:ln>
         </p:spPr>
         <p:style>
@@ -5937,28 +6501,31 @@
           <a:p>
             <a:pPr algn="ctr"/>
             <a:r>
-              <a:rPr lang="en-US" sz="1050" dirty="0" smtClean="0">
+              <a:rPr lang="en-US" sz="1000" dirty="0" smtClean="0">
                 <a:solidFill>
                   <a:srgbClr val="000000"/>
                 </a:solidFill>
               </a:rPr>
-              <a:t>Day -1</a:t>
-            </a:r>
+              <a:t>Defaulter -179</a:t>
+            </a:r>
+            <a:endParaRPr lang="en-US" sz="1000" dirty="0">
+              <a:solidFill>
+                <a:srgbClr val="000000"/>
+              </a:solidFill>
+            </a:endParaRPr>
           </a:p>
         </p:txBody>
       </p:sp>
       <p:cxnSp>
         <p:nvCxnSpPr>
-          <p:cNvPr id="7" name="Straight Arrow Connector 6"/>
-          <p:cNvCxnSpPr>
-            <a:endCxn id="6" idx="0"/>
-          </p:cNvCxnSpPr>
+          <p:cNvPr id="28" name="Straight Arrow Connector 27"/>
+          <p:cNvCxnSpPr/>
           <p:nvPr/>
         </p:nvCxnSpPr>
         <p:spPr>
           <a:xfrm>
-            <a:off x="7609291" y="2501079"/>
-            <a:ext cx="0" cy="656214"/>
+            <a:off x="5232400" y="2243368"/>
+            <a:ext cx="419100" cy="0"/>
           </a:xfrm>
           <a:prstGeom prst="straightConnector1">
             <a:avLst/>
@@ -5984,13 +6551,13 @@
       </p:cxnSp>
       <p:sp>
         <p:nvSpPr>
-          <p:cNvPr id="8" name="TextBox 7"/>
+          <p:cNvPr id="30" name="TextBox 29"/>
           <p:cNvSpPr txBox="1"/>
           <p:nvPr/>
         </p:nvSpPr>
         <p:spPr>
           <a:xfrm>
-            <a:off x="6016083" y="3138049"/>
+            <a:off x="6016083" y="2001182"/>
             <a:ext cx="402311" cy="369332"/>
           </a:xfrm>
           <a:prstGeom prst="rect">
@@ -6012,15 +6579,50 @@
           </a:p>
         </p:txBody>
       </p:sp>
-      <p:sp>
-        <p:nvSpPr>
-          <p:cNvPr id="9" name="Oval 8"/>
+      <p:cxnSp>
+        <p:nvCxnSpPr>
+          <p:cNvPr id="32" name="Straight Arrow Connector 31"/>
+          <p:cNvCxnSpPr>
+            <a:endCxn id="33" idx="2"/>
+          </p:cNvCxnSpPr>
+          <p:nvPr/>
+        </p:nvCxnSpPr>
+        <p:spPr>
+          <a:xfrm>
+            <a:off x="6720291" y="2243368"/>
+            <a:ext cx="419100" cy="0"/>
+          </a:xfrm>
+          <a:prstGeom prst="straightConnector1">
+            <a:avLst/>
+          </a:prstGeom>
+          <a:ln>
+            <a:tailEnd type="arrow"/>
+          </a:ln>
+        </p:spPr>
+        <p:style>
+          <a:lnRef idx="2">
+            <a:schemeClr val="accent1"/>
+          </a:lnRef>
+          <a:fillRef idx="0">
+            <a:schemeClr val="accent1"/>
+          </a:fillRef>
+          <a:effectRef idx="1">
+            <a:schemeClr val="accent1"/>
+          </a:effectRef>
+          <a:fontRef idx="minor">
+            <a:schemeClr val="tx1"/>
+          </a:fontRef>
+        </p:style>
+      </p:cxnSp>
+      <p:sp>
+        <p:nvSpPr>
+          <p:cNvPr id="33" name="Oval 32"/>
           <p:cNvSpPr/>
           <p:nvPr/>
         </p:nvSpPr>
         <p:spPr>
           <a:xfrm>
-            <a:off x="2933700" y="2001182"/>
+            <a:off x="7139391" y="1995741"/>
             <a:ext cx="939800" cy="495253"/>
           </a:xfrm>
           <a:prstGeom prst="ellipse">
@@ -6060,7 +6662,7 @@
                   <a:srgbClr val="000000"/>
                 </a:solidFill>
               </a:rPr>
-              <a:t>Defaulter -180</a:t>
+              <a:t>Defaulter -1</a:t>
             </a:r>
             <a:endParaRPr lang="en-US" sz="1000" dirty="0">
               <a:solidFill>
@@ -6070,51 +6672,16 @@
           </a:p>
         </p:txBody>
       </p:sp>
-      <p:cxnSp>
-        <p:nvCxnSpPr>
-          <p:cNvPr id="24" name="Straight Arrow Connector 23"/>
-          <p:cNvCxnSpPr>
-            <a:endCxn id="25" idx="0"/>
-          </p:cNvCxnSpPr>
-          <p:nvPr/>
-        </p:nvCxnSpPr>
-        <p:spPr>
-          <a:xfrm flipH="1">
-            <a:off x="4768725" y="2496435"/>
-            <a:ext cx="6475" cy="656214"/>
-          </a:xfrm>
-          <a:prstGeom prst="straightConnector1">
-            <a:avLst/>
-          </a:prstGeom>
-          <a:ln>
-            <a:tailEnd type="arrow"/>
-          </a:ln>
-        </p:spPr>
-        <p:style>
-          <a:lnRef idx="2">
-            <a:schemeClr val="accent1"/>
-          </a:lnRef>
-          <a:fillRef idx="0">
-            <a:schemeClr val="accent1"/>
-          </a:fillRef>
-          <a:effectRef idx="1">
-            <a:schemeClr val="accent1"/>
-          </a:effectRef>
-          <a:fontRef idx="minor">
-            <a:schemeClr val="tx1"/>
-          </a:fontRef>
-        </p:style>
-      </p:cxnSp>
-      <p:sp>
-        <p:nvSpPr>
-          <p:cNvPr id="25" name="Rounded Rectangle 24"/>
+      <p:sp>
+        <p:nvSpPr>
+          <p:cNvPr id="19" name="Rounded Rectangle 5"/>
           <p:cNvSpPr/>
           <p:nvPr/>
         </p:nvSpPr>
         <p:spPr>
           <a:xfrm>
-            <a:off x="4420194" y="3152649"/>
-            <a:ext cx="697061" cy="354732"/>
+            <a:off x="2806700" y="3162302"/>
+            <a:ext cx="1066800" cy="410224"/>
           </a:xfrm>
           <a:prstGeom prst="roundRect">
             <a:avLst/>
@@ -6147,14 +6714,57 @@
           <a:lstStyle/>
           <a:p>
             <a:pPr algn="ctr"/>
+            <a:endParaRPr lang="en-US" sz="1050" dirty="0" smtClean="0">
+              <a:solidFill>
+                <a:srgbClr val="000000"/>
+              </a:solidFill>
+            </a:endParaRPr>
+          </a:p>
+          <a:p>
+            <a:pPr algn="ctr"/>
             <a:r>
               <a:rPr lang="en-US" sz="1050" dirty="0" smtClean="0">
                 <a:solidFill>
                   <a:srgbClr val="000000"/>
                 </a:solidFill>
               </a:rPr>
-              <a:t>Day -179</a:t>
-            </a:r>
+              <a:t>Variable set </a:t>
+            </a:r>
+            <a:r>
+              <a:rPr lang="en-US" sz="1050" b="1" dirty="0" smtClean="0">
+                <a:solidFill>
+                  <a:srgbClr val="000000"/>
+                </a:solidFill>
+              </a:rPr>
+              <a:t>X</a:t>
+            </a:r>
+            <a:r>
+              <a:rPr lang="en-US" sz="1050" dirty="0" smtClean="0">
+                <a:solidFill>
+                  <a:srgbClr val="000000"/>
+                </a:solidFill>
+              </a:rPr>
+              <a:t> </a:t>
+            </a:r>
+            <a:r>
+              <a:rPr lang="en-US" sz="1050" dirty="0" smtClean="0">
+                <a:solidFill>
+                  <a:srgbClr val="000000"/>
+                </a:solidFill>
+              </a:rPr>
+              <a:t>-</a:t>
+            </a:r>
+            <a:r>
+              <a:rPr lang="en-US" sz="1050" dirty="0" smtClean="0">
+                <a:solidFill>
+                  <a:srgbClr val="000000"/>
+                </a:solidFill>
+              </a:rPr>
+              <a:t>180 days</a:t>
+            </a:r>
+          </a:p>
+          <a:p>
+            <a:pPr algn="ctr"/>
             <a:endParaRPr lang="en-US" sz="1050" dirty="0">
               <a:solidFill>
                 <a:srgbClr val="000000"/>
@@ -6165,23 +6775,23 @@
       </p:sp>
       <p:sp>
         <p:nvSpPr>
-          <p:cNvPr id="20" name="Oval 19"/>
+          <p:cNvPr id="22" name="Rounded Rectangle 5"/>
           <p:cNvSpPr/>
           <p:nvPr/>
         </p:nvSpPr>
         <p:spPr>
           <a:xfrm>
-            <a:off x="4292600" y="2001182"/>
-            <a:ext cx="939800" cy="495253"/>
-          </a:xfrm>
-          <a:prstGeom prst="ellipse">
-            <a:avLst/>
-          </a:prstGeom>
+            <a:off x="4235325" y="3162302"/>
+            <a:ext cx="1066800" cy="410224"/>
+          </a:xfrm>
+          <a:prstGeom prst="roundRect">
+            <a:avLst/>
+          </a:prstGeom>
+          <a:noFill/>
           <a:ln>
             <a:solidFill>
-              <a:srgbClr val="000000"/>
+              <a:schemeClr val="tx1"/>
             </a:solidFill>
-            <a:prstDash val="solid"/>
           </a:ln>
         </p:spPr>
         <p:style>
@@ -6205,32 +6815,77 @@
           <a:lstStyle/>
           <a:p>
             <a:pPr algn="ctr"/>
-            <a:r>
-              <a:rPr lang="en-US" sz="1000" dirty="0" smtClean="0">
-                <a:solidFill>
-                  <a:srgbClr val="000000"/>
-                </a:solidFill>
-              </a:rPr>
-              <a:t>Defaulter -179</a:t>
-            </a:r>
-            <a:endParaRPr lang="en-US" sz="1000" dirty="0">
+            <a:endParaRPr lang="en-US" sz="1050" dirty="0" smtClean="0">
               <a:solidFill>
                 <a:srgbClr val="000000"/>
               </a:solidFill>
             </a:endParaRPr>
           </a:p>
+          <a:p>
+            <a:pPr algn="ctr"/>
+            <a:r>
+              <a:rPr lang="en-US" sz="1050" dirty="0" smtClean="0">
+                <a:solidFill>
+                  <a:srgbClr val="000000"/>
+                </a:solidFill>
+              </a:rPr>
+              <a:t>Variable set </a:t>
+            </a:r>
+            <a:r>
+              <a:rPr lang="en-US" sz="1050" b="1" dirty="0" smtClean="0">
+                <a:solidFill>
+                  <a:srgbClr val="000000"/>
+                </a:solidFill>
+              </a:rPr>
+              <a:t>X</a:t>
+            </a:r>
+            <a:r>
+              <a:rPr lang="en-US" sz="1050" dirty="0" smtClean="0">
+                <a:solidFill>
+                  <a:srgbClr val="000000"/>
+                </a:solidFill>
+              </a:rPr>
+              <a:t> </a:t>
+            </a:r>
+            <a:r>
+              <a:rPr lang="en-US" sz="1050" dirty="0" smtClean="0">
+                <a:solidFill>
+                  <a:srgbClr val="000000"/>
+                </a:solidFill>
+              </a:rPr>
+              <a:t>-179 </a:t>
+            </a:r>
+            <a:r>
+              <a:rPr lang="en-US" sz="1050" dirty="0" smtClean="0">
+                <a:solidFill>
+                  <a:srgbClr val="000000"/>
+                </a:solidFill>
+              </a:rPr>
+              <a:t>days</a:t>
+            </a:r>
+          </a:p>
+          <a:p>
+            <a:pPr algn="ctr"/>
+            <a:endParaRPr lang="en-US" sz="1050" dirty="0">
+              <a:solidFill>
+                <a:srgbClr val="000000"/>
+              </a:solidFill>
+            </a:endParaRPr>
+          </a:p>
         </p:txBody>
       </p:sp>
       <p:cxnSp>
         <p:nvCxnSpPr>
-          <p:cNvPr id="28" name="Straight Arrow Connector 27"/>
-          <p:cNvCxnSpPr/>
+          <p:cNvPr id="27" name="Straight Arrow Connector 25"/>
+          <p:cNvCxnSpPr>
+            <a:stCxn id="22" idx="3"/>
+          </p:cNvCxnSpPr>
           <p:nvPr/>
         </p:nvCxnSpPr>
         <p:spPr>
           <a:xfrm>
-            <a:off x="5232400" y="2243368"/>
-            <a:ext cx="419100" cy="0"/>
+            <a:off x="5302125" y="3367414"/>
+            <a:ext cx="361825" cy="0"/>
           </a:xfrm>
           <a:prstGeom prst="straightConnector1">
             <a:avLst/>
@@ -6256,14 +6911,16 @@
       </p:cxnSp>
       <p:cxnSp>
         <p:nvCxnSpPr>
-          <p:cNvPr id="29" name="Straight Arrow Connector 28"/>
-          <p:cNvCxnSpPr/>
+          <p:cNvPr id="34" name="Straight Arrow Connector 25"/>
+          <p:cNvCxnSpPr>
+            <a:endCxn id="23" idx="1"/>
+          </p:cNvCxnSpPr>
           <p:nvPr/>
         </p:nvCxnSpPr>
         <p:spPr>
-          <a:xfrm flipV="1">
-            <a:off x="5125644" y="3319930"/>
-            <a:ext cx="674539" cy="4644"/>
+          <a:xfrm>
+            <a:off x="6777566" y="3367414"/>
+            <a:ext cx="361825" cy="0"/>
           </a:xfrm>
           <a:prstGeom prst="straightConnector1">
             <a:avLst/>
@@ -6289,121 +6946,23 @@
       </p:cxnSp>
       <p:sp>
         <p:nvSpPr>
-          <p:cNvPr id="30" name="TextBox 29"/>
-          <p:cNvSpPr txBox="1"/>
-          <p:nvPr/>
-        </p:nvSpPr>
-        <p:spPr>
-          <a:xfrm>
-            <a:off x="6016083" y="2001182"/>
-            <a:ext cx="402311" cy="369332"/>
-          </a:xfrm>
-          <a:prstGeom prst="rect">
+          <p:cNvPr id="23" name="Rounded Rectangle 5"/>
+          <p:cNvSpPr/>
+          <p:nvPr/>
+        </p:nvSpPr>
+        <p:spPr>
+          <a:xfrm>
+            <a:off x="7139391" y="3162302"/>
+            <a:ext cx="1066800" cy="410224"/>
+          </a:xfrm>
+          <a:prstGeom prst="roundRect">
             <a:avLst/>
           </a:prstGeom>
           <a:noFill/>
-        </p:spPr>
-        <p:txBody>
-          <a:bodyPr wrap="none" rtlCol="0">
-            <a:spAutoFit/>
-          </a:bodyPr>
-          <a:lstStyle/>
-          <a:p>
-            <a:r>
-              <a:rPr lang="en-US" dirty="0" smtClean="0"/>
-              <a:t>….</a:t>
-            </a:r>
-            <a:endParaRPr lang="en-US" dirty="0"/>
-          </a:p>
-        </p:txBody>
-      </p:sp>
-      <p:cxnSp>
-        <p:nvCxnSpPr>
-          <p:cNvPr id="31" name="Straight Arrow Connector 30"/>
-          <p:cNvCxnSpPr/>
-          <p:nvPr/>
-        </p:nvCxnSpPr>
-        <p:spPr>
-          <a:xfrm flipV="1">
-            <a:off x="6586221" y="3315286"/>
-            <a:ext cx="674539" cy="4644"/>
-          </a:xfrm>
-          <a:prstGeom prst="straightConnector1">
-            <a:avLst/>
-          </a:prstGeom>
-          <a:ln>
-            <a:tailEnd type="arrow"/>
-          </a:ln>
-        </p:spPr>
-        <p:style>
-          <a:lnRef idx="2">
-            <a:schemeClr val="accent1"/>
-          </a:lnRef>
-          <a:fillRef idx="0">
-            <a:schemeClr val="accent1"/>
-          </a:fillRef>
-          <a:effectRef idx="1">
-            <a:schemeClr val="accent1"/>
-          </a:effectRef>
-          <a:fontRef idx="minor">
-            <a:schemeClr val="tx1"/>
-          </a:fontRef>
-        </p:style>
-      </p:cxnSp>
-      <p:cxnSp>
-        <p:nvCxnSpPr>
-          <p:cNvPr id="32" name="Straight Arrow Connector 31"/>
-          <p:cNvCxnSpPr>
-            <a:endCxn id="33" idx="2"/>
-          </p:cNvCxnSpPr>
-          <p:nvPr/>
-        </p:nvCxnSpPr>
-        <p:spPr>
-          <a:xfrm>
-            <a:off x="6720291" y="2243368"/>
-            <a:ext cx="419100" cy="0"/>
-          </a:xfrm>
-          <a:prstGeom prst="straightConnector1">
-            <a:avLst/>
-          </a:prstGeom>
-          <a:ln>
-            <a:tailEnd type="arrow"/>
-          </a:ln>
-        </p:spPr>
-        <p:style>
-          <a:lnRef idx="2">
-            <a:schemeClr val="accent1"/>
-          </a:lnRef>
-          <a:fillRef idx="0">
-            <a:schemeClr val="accent1"/>
-          </a:fillRef>
-          <a:effectRef idx="1">
-            <a:schemeClr val="accent1"/>
-          </a:effectRef>
-          <a:fontRef idx="minor">
-            <a:schemeClr val="tx1"/>
-          </a:fontRef>
-        </p:style>
-      </p:cxnSp>
-      <p:sp>
-        <p:nvSpPr>
-          <p:cNvPr id="33" name="Oval 32"/>
-          <p:cNvSpPr/>
-          <p:nvPr/>
-        </p:nvSpPr>
-        <p:spPr>
-          <a:xfrm>
-            <a:off x="7139391" y="1995741"/>
-            <a:ext cx="939800" cy="495253"/>
-          </a:xfrm>
-          <a:prstGeom prst="ellipse">
-            <a:avLst/>
-          </a:prstGeom>
           <a:ln>
             <a:solidFill>
-              <a:srgbClr val="000000"/>
+              <a:schemeClr val="tx1"/>
             </a:solidFill>
-            <a:prstDash val="solid"/>
           </a:ln>
         </p:spPr>
         <p:style>
@@ -6427,15 +6986,55 @@
           <a:lstStyle/>
           <a:p>
             <a:pPr algn="ctr"/>
-            <a:r>
-              <a:rPr lang="en-US" sz="1000" dirty="0" smtClean="0">
+            <a:endParaRPr lang="en-US" sz="1050" dirty="0" smtClean="0">
+              <a:solidFill>
+                <a:srgbClr val="000000"/>
+              </a:solidFill>
+            </a:endParaRPr>
+          </a:p>
+          <a:p>
+            <a:pPr algn="ctr"/>
+            <a:r>
+              <a:rPr lang="en-US" sz="1050" dirty="0" smtClean="0">
                 <a:solidFill>
                   <a:srgbClr val="000000"/>
                 </a:solidFill>
               </a:rPr>
-              <a:t>Defaulter -1</a:t>
-            </a:r>
-            <a:endParaRPr lang="en-US" sz="1000" dirty="0">
+              <a:t>Variable set </a:t>
+            </a:r>
+            <a:r>
+              <a:rPr lang="en-US" sz="1050" b="1" dirty="0" smtClean="0">
+                <a:solidFill>
+                  <a:srgbClr val="000000"/>
+                </a:solidFill>
+              </a:rPr>
+              <a:t>X</a:t>
+            </a:r>
+            <a:r>
+              <a:rPr lang="en-US" sz="1050" dirty="0" smtClean="0">
+                <a:solidFill>
+                  <a:srgbClr val="000000"/>
+                </a:solidFill>
+              </a:rPr>
+              <a:t> -1 </a:t>
+            </a:r>
+            <a:r>
+              <a:rPr lang="en-US" sz="1050" dirty="0" smtClean="0">
+                <a:solidFill>
+                  <a:srgbClr val="000000"/>
+                </a:solidFill>
+              </a:rPr>
+              <a:t>day</a:t>
+            </a:r>
+            <a:endParaRPr lang="en-US" sz="1050" dirty="0" smtClean="0">
+              <a:solidFill>
+                <a:srgbClr val="000000"/>
+              </a:solidFill>
+            </a:endParaRPr>
+          </a:p>
+          <a:p>
+            <a:pPr algn="ctr"/>
+            <a:endParaRPr lang="en-US" sz="1050" dirty="0">
               <a:solidFill>
                 <a:srgbClr val="000000"/>
               </a:solidFill>

</xml_diff>

<commit_message>
Revert "More changes in Cajamar section"
This reverts commit 1565c6001dbffe52fd3a5cff8c9d4288185e62df.
</commit_message>
<xml_diff>
--- a/doc/D2.1_AMIDSTModelingFramework/figures/CajaMarModelsBucket.pptx
+++ b/doc/D2.1_AMIDSTModelingFramework/figures/CajaMarModelsBucket.pptx
@@ -298,7 +298,7 @@
           <a:p>
             <a:fld id="{08C0AF01-9055-0547-953E-72B2160BBA35}" type="datetimeFigureOut">
               <a:rPr lang="en-US" smtClean="0"/>
-              <a:t>16/09/14</a:t>
+              <a:t>10/09/14</a:t>
             </a:fld>
             <a:endParaRPr lang="en-US"/>
           </a:p>
@@ -468,7 +468,7 @@
           <a:p>
             <a:fld id="{08C0AF01-9055-0547-953E-72B2160BBA35}" type="datetimeFigureOut">
               <a:rPr lang="en-US" smtClean="0"/>
-              <a:t>16/09/14</a:t>
+              <a:t>10/09/14</a:t>
             </a:fld>
             <a:endParaRPr lang="en-US"/>
           </a:p>
@@ -648,7 +648,7 @@
           <a:p>
             <a:fld id="{08C0AF01-9055-0547-953E-72B2160BBA35}" type="datetimeFigureOut">
               <a:rPr lang="en-US" smtClean="0"/>
-              <a:t>16/09/14</a:t>
+              <a:t>10/09/14</a:t>
             </a:fld>
             <a:endParaRPr lang="en-US"/>
           </a:p>
@@ -818,7 +818,7 @@
           <a:p>
             <a:fld id="{08C0AF01-9055-0547-953E-72B2160BBA35}" type="datetimeFigureOut">
               <a:rPr lang="en-US" smtClean="0"/>
-              <a:t>16/09/14</a:t>
+              <a:t>10/09/14</a:t>
             </a:fld>
             <a:endParaRPr lang="en-US"/>
           </a:p>
@@ -1064,7 +1064,7 @@
           <a:p>
             <a:fld id="{08C0AF01-9055-0547-953E-72B2160BBA35}" type="datetimeFigureOut">
               <a:rPr lang="en-US" smtClean="0"/>
-              <a:t>16/09/14</a:t>
+              <a:t>10/09/14</a:t>
             </a:fld>
             <a:endParaRPr lang="en-US"/>
           </a:p>
@@ -1352,7 +1352,7 @@
           <a:p>
             <a:fld id="{08C0AF01-9055-0547-953E-72B2160BBA35}" type="datetimeFigureOut">
               <a:rPr lang="en-US" smtClean="0"/>
-              <a:t>16/09/14</a:t>
+              <a:t>10/09/14</a:t>
             </a:fld>
             <a:endParaRPr lang="en-US"/>
           </a:p>
@@ -1774,7 +1774,7 @@
           <a:p>
             <a:fld id="{08C0AF01-9055-0547-953E-72B2160BBA35}" type="datetimeFigureOut">
               <a:rPr lang="en-US" smtClean="0"/>
-              <a:t>16/09/14</a:t>
+              <a:t>10/09/14</a:t>
             </a:fld>
             <a:endParaRPr lang="en-US"/>
           </a:p>
@@ -1892,7 +1892,7 @@
           <a:p>
             <a:fld id="{08C0AF01-9055-0547-953E-72B2160BBA35}" type="datetimeFigureOut">
               <a:rPr lang="en-US" smtClean="0"/>
-              <a:t>16/09/14</a:t>
+              <a:t>10/09/14</a:t>
             </a:fld>
             <a:endParaRPr lang="en-US"/>
           </a:p>
@@ -1987,7 +1987,7 @@
           <a:p>
             <a:fld id="{08C0AF01-9055-0547-953E-72B2160BBA35}" type="datetimeFigureOut">
               <a:rPr lang="en-US" smtClean="0"/>
-              <a:t>16/09/14</a:t>
+              <a:t>10/09/14</a:t>
             </a:fld>
             <a:endParaRPr lang="en-US"/>
           </a:p>
@@ -2264,7 +2264,7 @@
           <a:p>
             <a:fld id="{08C0AF01-9055-0547-953E-72B2160BBA35}" type="datetimeFigureOut">
               <a:rPr lang="en-US" smtClean="0"/>
-              <a:t>16/09/14</a:t>
+              <a:t>10/09/14</a:t>
             </a:fld>
             <a:endParaRPr lang="en-US"/>
           </a:p>
@@ -2517,7 +2517,7 @@
           <a:p>
             <a:fld id="{08C0AF01-9055-0547-953E-72B2160BBA35}" type="datetimeFigureOut">
               <a:rPr lang="en-US" smtClean="0"/>
-              <a:t>16/09/14</a:t>
+              <a:t>10/09/14</a:t>
             </a:fld>
             <a:endParaRPr lang="en-US"/>
           </a:p>
@@ -2730,7 +2730,7 @@
           <a:p>
             <a:fld id="{08C0AF01-9055-0547-953E-72B2160BBA35}" type="datetimeFigureOut">
               <a:rPr lang="en-US" smtClean="0"/>
-              <a:t>16/09/14</a:t>
+              <a:t>10/09/14</a:t>
             </a:fld>
             <a:endParaRPr lang="en-US"/>
           </a:p>
@@ -3116,8 +3116,8 @@
         </p:nvCxnSpPr>
         <p:spPr>
           <a:xfrm flipH="1">
-            <a:off x="1507069" y="2123902"/>
-            <a:ext cx="2789054" cy="1081507"/>
+            <a:off x="4210744" y="2123902"/>
+            <a:ext cx="209677" cy="1064299"/>
           </a:xfrm>
           <a:prstGeom prst="straightConnector1">
             <a:avLst/>
@@ -3149,8 +3149,8 @@
         </p:nvSpPr>
         <p:spPr>
           <a:xfrm>
-            <a:off x="973669" y="3205409"/>
-            <a:ext cx="1066800" cy="410224"/>
+            <a:off x="3596911" y="3188201"/>
+            <a:ext cx="1227666" cy="410224"/>
           </a:xfrm>
           <a:prstGeom prst="roundRect">
             <a:avLst/>
@@ -3197,39 +3197,7 @@
                   <a:srgbClr val="000000"/>
                 </a:solidFill>
               </a:rPr>
-              <a:t>Variable set </a:t>
-            </a:r>
-            <a:r>
-              <a:rPr lang="en-US" sz="1050" b="1" dirty="0" smtClean="0">
-                <a:solidFill>
-                  <a:srgbClr val="000000"/>
-                </a:solidFill>
-              </a:rPr>
-              <a:t>X</a:t>
-            </a:r>
-            <a:r>
-              <a:rPr lang="en-US" sz="1050" dirty="0" smtClean="0">
-                <a:solidFill>
-                  <a:srgbClr val="000000"/>
-                </a:solidFill>
-              </a:rPr>
-              <a:t> </a:t>
-            </a:r>
-            <a:r>
-              <a:rPr lang="en-US" sz="1050" dirty="0" smtClean="0">
-                <a:solidFill>
-                  <a:srgbClr val="000000"/>
-                </a:solidFill>
-              </a:rPr>
-              <a:t>-</a:t>
-            </a:r>
-            <a:r>
-              <a:rPr lang="en-US" sz="1050" dirty="0" smtClean="0">
-                <a:solidFill>
-                  <a:srgbClr val="000000"/>
-                </a:solidFill>
-              </a:rPr>
-              <a:t>180 days</a:t>
+              <a:t>Financial activity -180 days</a:t>
             </a:r>
           </a:p>
           <a:p>
@@ -3250,7 +3218,7 @@
         </p:nvSpPr>
         <p:spPr>
           <a:xfrm>
-            <a:off x="4807643" y="3191812"/>
+            <a:off x="4824577" y="3191812"/>
             <a:ext cx="344039" cy="369332"/>
           </a:xfrm>
           <a:prstGeom prst="rect">
@@ -3280,7 +3248,7 @@
         </p:nvSpPr>
         <p:spPr>
           <a:xfrm>
-            <a:off x="3731100" y="1628649"/>
+            <a:off x="3855398" y="1628649"/>
             <a:ext cx="1130046" cy="495253"/>
           </a:xfrm>
           <a:prstGeom prst="ellipse">
@@ -3338,8 +3306,8 @@
         </p:nvSpPr>
         <p:spPr>
           <a:xfrm>
-            <a:off x="3767668" y="3209262"/>
-            <a:ext cx="1056910" cy="420284"/>
+            <a:off x="1050463" y="3178141"/>
+            <a:ext cx="922271" cy="420284"/>
           </a:xfrm>
           <a:prstGeom prst="roundRect">
             <a:avLst/>
@@ -3378,37 +3346,8 @@
                   <a:srgbClr val="000000"/>
                 </a:solidFill>
               </a:rPr>
-              <a:t>Variable </a:t>
-            </a:r>
-            <a:r>
-              <a:rPr lang="en-US" sz="1050" dirty="0">
-                <a:solidFill>
-                  <a:srgbClr val="000000"/>
-                </a:solidFill>
-              </a:rPr>
-              <a:t>set </a:t>
-            </a:r>
-            <a:r>
-              <a:rPr lang="en-US" sz="1050" b="1" dirty="0" smtClean="0">
-                <a:solidFill>
-                  <a:srgbClr val="000000"/>
-                </a:solidFill>
-              </a:rPr>
-              <a:t>Y</a:t>
-            </a:r>
-            <a:r>
-              <a:rPr lang="en-US" sz="1050" dirty="0" smtClean="0">
-                <a:solidFill>
-                  <a:srgbClr val="000000"/>
-                </a:solidFill>
-              </a:rPr>
-              <a:t> </a:t>
-            </a:r>
-            <a:endParaRPr lang="en-US" sz="1050" dirty="0" smtClean="0">
-              <a:solidFill>
-                <a:srgbClr val="000000"/>
-              </a:solidFill>
-            </a:endParaRPr>
+              <a:t>Payments </a:t>
+            </a:r>
           </a:p>
           <a:p>
             <a:pPr algn="ctr"/>
@@ -3438,9 +3377,9 @@
           <p:nvPr/>
         </p:nvCxnSpPr>
         <p:spPr>
-          <a:xfrm flipH="1">
-            <a:off x="2919450" y="2123902"/>
-            <a:ext cx="1376673" cy="1076893"/>
+          <a:xfrm>
+            <a:off x="4420421" y="2123902"/>
+            <a:ext cx="1362028" cy="1051615"/>
           </a:xfrm>
           <a:prstGeom prst="straightConnector1">
             <a:avLst/>
@@ -3472,8 +3411,8 @@
         </p:nvSpPr>
         <p:spPr>
           <a:xfrm>
-            <a:off x="2370664" y="3200795"/>
-            <a:ext cx="1097572" cy="410224"/>
+            <a:off x="5168616" y="3175517"/>
+            <a:ext cx="1227666" cy="410224"/>
           </a:xfrm>
           <a:prstGeom prst="roundRect">
             <a:avLst/>
@@ -3515,52 +3454,12 @@
           <a:p>
             <a:pPr algn="ctr"/>
             <a:r>
-              <a:rPr lang="en-US" sz="1050" dirty="0">
-                <a:solidFill>
-                  <a:srgbClr val="000000"/>
-                </a:solidFill>
-              </a:rPr>
-              <a:t>Variable set </a:t>
-            </a:r>
-            <a:r>
-              <a:rPr lang="en-US" sz="1050" b="1" dirty="0">
-                <a:solidFill>
-                  <a:srgbClr val="000000"/>
-                </a:solidFill>
-              </a:rPr>
-              <a:t>X</a:t>
-            </a:r>
-            <a:r>
-              <a:rPr lang="en-US" sz="1050" dirty="0">
-                <a:solidFill>
-                  <a:srgbClr val="000000"/>
-                </a:solidFill>
-              </a:rPr>
-              <a:t> </a:t>
-            </a:r>
-            <a:endParaRPr lang="en-US" sz="1050" dirty="0" smtClean="0">
-              <a:solidFill>
-                <a:srgbClr val="000000"/>
-              </a:solidFill>
-            </a:endParaRPr>
-          </a:p>
-          <a:p>
-            <a:pPr algn="ctr"/>
-            <a:r>
               <a:rPr lang="en-US" sz="1050" dirty="0" smtClean="0">
                 <a:solidFill>
                   <a:srgbClr val="000000"/>
                 </a:solidFill>
               </a:rPr>
-              <a:t> </a:t>
-            </a:r>
-            <a:r>
-              <a:rPr lang="en-US" sz="1050" dirty="0" smtClean="0">
-                <a:solidFill>
-                  <a:srgbClr val="000000"/>
-                </a:solidFill>
-              </a:rPr>
-              <a:t>-1 day</a:t>
+              <a:t>Financial activity -1 day</a:t>
             </a:r>
           </a:p>
           <a:p>
@@ -3575,152 +3474,14 @@
       </p:sp>
       <p:sp>
         <p:nvSpPr>
-          <p:cNvPr id="80" name="TextBox 14"/>
-          <p:cNvSpPr txBox="1"/>
-          <p:nvPr/>
-        </p:nvSpPr>
-        <p:spPr>
-          <a:xfrm>
-            <a:off x="2032003" y="3145866"/>
-            <a:ext cx="344039" cy="369332"/>
-          </a:xfrm>
-          <a:prstGeom prst="rect">
-            <a:avLst/>
-          </a:prstGeom>
-          <a:noFill/>
-        </p:spPr>
-        <p:txBody>
-          <a:bodyPr wrap="none" rtlCol="0">
-            <a:spAutoFit/>
-          </a:bodyPr>
-          <a:lstStyle/>
-          <a:p>
-            <a:r>
-              <a:rPr lang="en-US" dirty="0" smtClean="0"/>
-              <a:t>…</a:t>
-            </a:r>
-            <a:endParaRPr lang="en-US" dirty="0"/>
-          </a:p>
-        </p:txBody>
-      </p:sp>
-      <p:cxnSp>
-        <p:nvCxnSpPr>
-          <p:cNvPr id="85" name="Straight Arrow Connector 4"/>
-          <p:cNvCxnSpPr>
-            <a:stCxn id="4" idx="4"/>
-            <a:endCxn id="84" idx="0"/>
-          </p:cNvCxnSpPr>
-          <p:nvPr/>
-        </p:nvCxnSpPr>
-        <p:spPr>
-          <a:xfrm>
-            <a:off x="4296123" y="2123902"/>
-            <a:ext cx="2731508" cy="1088501"/>
-          </a:xfrm>
-          <a:prstGeom prst="straightConnector1">
-            <a:avLst/>
-          </a:prstGeom>
-          <a:ln>
-            <a:tailEnd type="arrow"/>
-          </a:ln>
-        </p:spPr>
-        <p:style>
-          <a:lnRef idx="2">
-            <a:schemeClr val="accent1"/>
-          </a:lnRef>
-          <a:fillRef idx="0">
-            <a:schemeClr val="accent1"/>
-          </a:fillRef>
-          <a:effectRef idx="1">
-            <a:schemeClr val="accent1"/>
-          </a:effectRef>
-          <a:fontRef idx="minor">
-            <a:schemeClr val="tx1"/>
-          </a:fontRef>
-        </p:style>
-      </p:cxnSp>
-      <p:cxnSp>
-        <p:nvCxnSpPr>
-          <p:cNvPr id="92" name="Straight Arrow Connector 4"/>
-          <p:cNvCxnSpPr>
-            <a:stCxn id="4" idx="4"/>
-            <a:endCxn id="29" idx="0"/>
-          </p:cNvCxnSpPr>
-          <p:nvPr/>
-        </p:nvCxnSpPr>
-        <p:spPr>
-          <a:xfrm>
-            <a:off x="4296123" y="2123902"/>
-            <a:ext cx="1375964" cy="1097363"/>
-          </a:xfrm>
-          <a:prstGeom prst="straightConnector1">
-            <a:avLst/>
-          </a:prstGeom>
-          <a:ln>
-            <a:tailEnd type="arrow"/>
-          </a:ln>
-        </p:spPr>
-        <p:style>
-          <a:lnRef idx="2">
-            <a:schemeClr val="accent1"/>
-          </a:lnRef>
-          <a:fillRef idx="0">
-            <a:schemeClr val="accent1"/>
-          </a:fillRef>
-          <a:effectRef idx="1">
-            <a:schemeClr val="accent1"/>
-          </a:effectRef>
-          <a:fontRef idx="minor">
-            <a:schemeClr val="tx1"/>
-          </a:fontRef>
-        </p:style>
-      </p:cxnSp>
-      <p:cxnSp>
-        <p:nvCxnSpPr>
-          <p:cNvPr id="97" name="Straight Arrow Connector 4"/>
-          <p:cNvCxnSpPr>
-            <a:stCxn id="4" idx="4"/>
-            <a:endCxn id="48" idx="0"/>
-          </p:cNvCxnSpPr>
-          <p:nvPr/>
-        </p:nvCxnSpPr>
-        <p:spPr>
-          <a:xfrm>
-            <a:off x="4296123" y="2123902"/>
-            <a:ext cx="0" cy="1085360"/>
-          </a:xfrm>
-          <a:prstGeom prst="straightConnector1">
-            <a:avLst/>
-          </a:prstGeom>
-          <a:ln>
-            <a:tailEnd type="arrow"/>
-          </a:ln>
-        </p:spPr>
-        <p:style>
-          <a:lnRef idx="2">
-            <a:schemeClr val="accent1"/>
-          </a:lnRef>
-          <a:fillRef idx="0">
-            <a:schemeClr val="accent1"/>
-          </a:fillRef>
-          <a:effectRef idx="1">
-            <a:schemeClr val="accent1"/>
-          </a:effectRef>
-          <a:fontRef idx="minor">
-            <a:schemeClr val="tx1"/>
-          </a:fontRef>
-        </p:style>
-      </p:cxnSp>
-      <p:sp>
-        <p:nvSpPr>
-          <p:cNvPr id="29" name="Rounded Rectangle 5"/>
+          <p:cNvPr id="79" name="Rounded Rectangle 5"/>
           <p:cNvSpPr/>
           <p:nvPr/>
         </p:nvSpPr>
         <p:spPr>
           <a:xfrm>
-            <a:off x="5143632" y="3221265"/>
-            <a:ext cx="1056910" cy="420284"/>
+            <a:off x="2303529" y="3175517"/>
+            <a:ext cx="905337" cy="420284"/>
           </a:xfrm>
           <a:prstGeom prst="roundRect">
             <a:avLst/>
@@ -3759,37 +3520,8 @@
                   <a:srgbClr val="000000"/>
                 </a:solidFill>
               </a:rPr>
-              <a:t>Variable </a:t>
-            </a:r>
-            <a:r>
-              <a:rPr lang="en-US" sz="1050" dirty="0">
-                <a:solidFill>
-                  <a:srgbClr val="000000"/>
-                </a:solidFill>
-              </a:rPr>
-              <a:t>set </a:t>
-            </a:r>
-            <a:r>
-              <a:rPr lang="en-US" sz="1050" b="1" dirty="0" smtClean="0">
-                <a:solidFill>
-                  <a:srgbClr val="000000"/>
-                </a:solidFill>
-              </a:rPr>
-              <a:t>Y</a:t>
-            </a:r>
-            <a:r>
-              <a:rPr lang="en-US" sz="1050" dirty="0" smtClean="0">
-                <a:solidFill>
-                  <a:srgbClr val="000000"/>
-                </a:solidFill>
-              </a:rPr>
-              <a:t> </a:t>
-            </a:r>
-            <a:endParaRPr lang="en-US" sz="1050" dirty="0" smtClean="0">
-              <a:solidFill>
-                <a:srgbClr val="000000"/>
-              </a:solidFill>
-            </a:endParaRPr>
+              <a:t>Payments </a:t>
+            </a:r>
           </a:p>
           <a:p>
             <a:pPr algn="ctr"/>
@@ -3811,13 +3543,43 @@
       </p:sp>
       <p:sp>
         <p:nvSpPr>
+          <p:cNvPr id="80" name="TextBox 14"/>
+          <p:cNvSpPr txBox="1"/>
+          <p:nvPr/>
+        </p:nvSpPr>
+        <p:spPr>
+          <a:xfrm>
+            <a:off x="1972734" y="3188201"/>
+            <a:ext cx="344039" cy="369332"/>
+          </a:xfrm>
+          <a:prstGeom prst="rect">
+            <a:avLst/>
+          </a:prstGeom>
+          <a:noFill/>
+        </p:spPr>
+        <p:txBody>
+          <a:bodyPr wrap="none" rtlCol="0">
+            <a:spAutoFit/>
+          </a:bodyPr>
+          <a:lstStyle/>
+          <a:p>
+            <a:r>
+              <a:rPr lang="en-US" dirty="0" smtClean="0"/>
+              <a:t>…</a:t>
+            </a:r>
+            <a:endParaRPr lang="en-US" dirty="0"/>
+          </a:p>
+        </p:txBody>
+      </p:sp>
+      <p:sp>
+        <p:nvSpPr>
           <p:cNvPr id="84" name="Rounded Rectangle 5"/>
           <p:cNvSpPr/>
           <p:nvPr/>
         </p:nvSpPr>
         <p:spPr>
           <a:xfrm>
-            <a:off x="6409862" y="3212403"/>
+            <a:off x="6782395" y="3178141"/>
             <a:ext cx="1235538" cy="420284"/>
           </a:xfrm>
           <a:prstGeom prst="roundRect">
@@ -3857,24 +3619,119 @@
                   <a:srgbClr val="000000"/>
                 </a:solidFill>
               </a:rPr>
-              <a:t>Variable set </a:t>
-            </a:r>
-            <a:r>
-              <a:rPr lang="en-US" sz="1050" b="1" dirty="0" smtClean="0">
-                <a:solidFill>
-                  <a:srgbClr val="000000"/>
-                </a:solidFill>
-              </a:rPr>
-              <a:t>Z</a:t>
-            </a:r>
-            <a:endParaRPr lang="en-US" sz="1050" b="1" dirty="0" smtClean="0">
-              <a:solidFill>
-                <a:srgbClr val="000000"/>
-              </a:solidFill>
-            </a:endParaRPr>
-          </a:p>
-        </p:txBody>
-      </p:sp>
+              <a:t>Sociodemography</a:t>
+            </a:r>
+          </a:p>
+        </p:txBody>
+      </p:sp>
+      <p:cxnSp>
+        <p:nvCxnSpPr>
+          <p:cNvPr id="85" name="Straight Arrow Connector 4"/>
+          <p:cNvCxnSpPr>
+            <a:stCxn id="4" idx="4"/>
+            <a:endCxn id="84" idx="0"/>
+          </p:cNvCxnSpPr>
+          <p:nvPr/>
+        </p:nvCxnSpPr>
+        <p:spPr>
+          <a:xfrm>
+            <a:off x="4420421" y="2123902"/>
+            <a:ext cx="2979743" cy="1054239"/>
+          </a:xfrm>
+          <a:prstGeom prst="straightConnector1">
+            <a:avLst/>
+          </a:prstGeom>
+          <a:ln>
+            <a:tailEnd type="arrow"/>
+          </a:ln>
+        </p:spPr>
+        <p:style>
+          <a:lnRef idx="2">
+            <a:schemeClr val="accent1"/>
+          </a:lnRef>
+          <a:fillRef idx="0">
+            <a:schemeClr val="accent1"/>
+          </a:fillRef>
+          <a:effectRef idx="1">
+            <a:schemeClr val="accent1"/>
+          </a:effectRef>
+          <a:fontRef idx="minor">
+            <a:schemeClr val="tx1"/>
+          </a:fontRef>
+        </p:style>
+      </p:cxnSp>
+      <p:cxnSp>
+        <p:nvCxnSpPr>
+          <p:cNvPr id="92" name="Straight Arrow Connector 4"/>
+          <p:cNvCxnSpPr>
+            <a:stCxn id="4" idx="4"/>
+            <a:endCxn id="79" idx="0"/>
+          </p:cNvCxnSpPr>
+          <p:nvPr/>
+        </p:nvCxnSpPr>
+        <p:spPr>
+          <a:xfrm flipH="1">
+            <a:off x="2756198" y="2123902"/>
+            <a:ext cx="1664223" cy="1051615"/>
+          </a:xfrm>
+          <a:prstGeom prst="straightConnector1">
+            <a:avLst/>
+          </a:prstGeom>
+          <a:ln>
+            <a:tailEnd type="arrow"/>
+          </a:ln>
+        </p:spPr>
+        <p:style>
+          <a:lnRef idx="2">
+            <a:schemeClr val="accent1"/>
+          </a:lnRef>
+          <a:fillRef idx="0">
+            <a:schemeClr val="accent1"/>
+          </a:fillRef>
+          <a:effectRef idx="1">
+            <a:schemeClr val="accent1"/>
+          </a:effectRef>
+          <a:fontRef idx="minor">
+            <a:schemeClr val="tx1"/>
+          </a:fontRef>
+        </p:style>
+      </p:cxnSp>
+      <p:cxnSp>
+        <p:nvCxnSpPr>
+          <p:cNvPr id="97" name="Straight Arrow Connector 4"/>
+          <p:cNvCxnSpPr>
+            <a:stCxn id="4" idx="4"/>
+            <a:endCxn id="48" idx="0"/>
+          </p:cNvCxnSpPr>
+          <p:nvPr/>
+        </p:nvCxnSpPr>
+        <p:spPr>
+          <a:xfrm flipH="1">
+            <a:off x="1511599" y="2123902"/>
+            <a:ext cx="2908822" cy="1054239"/>
+          </a:xfrm>
+          <a:prstGeom prst="straightConnector1">
+            <a:avLst/>
+          </a:prstGeom>
+          <a:ln>
+            <a:tailEnd type="arrow"/>
+          </a:ln>
+        </p:spPr>
+        <p:style>
+          <a:lnRef idx="2">
+            <a:schemeClr val="accent1"/>
+          </a:lnRef>
+          <a:fillRef idx="0">
+            <a:schemeClr val="accent1"/>
+          </a:fillRef>
+          <a:effectRef idx="1">
+            <a:schemeClr val="accent1"/>
+          </a:effectRef>
+          <a:fontRef idx="minor">
+            <a:schemeClr val="tx1"/>
+          </a:fontRef>
+        </p:style>
+      </p:cxnSp>
     </p:spTree>
     <p:extLst>
       <p:ext uri="{BB962C8B-B14F-4D97-AF65-F5344CB8AC3E}">
@@ -4276,8 +4133,8 @@
         </p:nvCxnSpPr>
         <p:spPr>
           <a:xfrm flipV="1">
-            <a:off x="457200" y="3513667"/>
-            <a:ext cx="7543800" cy="36000"/>
+            <a:off x="973667" y="3513667"/>
+            <a:ext cx="8136469" cy="36000"/>
           </a:xfrm>
           <a:prstGeom prst="straightConnector1">
             <a:avLst/>
@@ -4340,7 +4197,7 @@
         </p:nvCxnSpPr>
         <p:spPr>
           <a:xfrm>
-            <a:off x="3869265" y="3437465"/>
+            <a:off x="2760131" y="3454398"/>
             <a:ext cx="2" cy="194732"/>
           </a:xfrm>
           <a:prstGeom prst="line">
@@ -4370,8 +4227,8 @@
         </p:nvSpPr>
         <p:spPr>
           <a:xfrm rot="5400000">
-            <a:off x="4800599" y="1964272"/>
-            <a:ext cx="203198" cy="2065866"/>
+            <a:off x="4140198" y="1312334"/>
+            <a:ext cx="414869" cy="3175002"/>
           </a:xfrm>
           <a:prstGeom prst="leftBrace">
             <a:avLst/>
@@ -4402,11 +4259,7 @@
           <a:lstStyle/>
           <a:p>
             <a:pPr algn="ctr"/>
-            <a:r>
-              <a:rPr lang="en-US" dirty="0" smtClean="0"/>
-              <a:t> </a:t>
-            </a:r>
-            <a:endParaRPr lang="en-US" dirty="0"/>
+            <a:endParaRPr lang="en-US"/>
           </a:p>
         </p:txBody>
       </p:sp>
@@ -4418,7 +4271,7 @@
         </p:nvSpPr>
         <p:spPr>
           <a:xfrm>
-            <a:off x="4168012" y="2230735"/>
+            <a:off x="3600745" y="2180339"/>
             <a:ext cx="1499028" cy="461665"/>
           </a:xfrm>
           <a:prstGeom prst="rect">
@@ -4462,14 +4315,58 @@
       </p:sp>
       <p:sp>
         <p:nvSpPr>
+          <p:cNvPr id="15" name="Left Brace 14"/>
+          <p:cNvSpPr/>
+          <p:nvPr/>
+        </p:nvSpPr>
+        <p:spPr>
+          <a:xfrm rot="5400000">
+            <a:off x="1786465" y="2133603"/>
+            <a:ext cx="414869" cy="1532464"/>
+          </a:xfrm>
+          <a:prstGeom prst="leftBrace">
+            <a:avLst/>
+          </a:prstGeom>
+          <a:noFill/>
+          <a:ln>
+            <a:solidFill>
+              <a:schemeClr val="accent2"/>
+            </a:solidFill>
+          </a:ln>
+        </p:spPr>
+        <p:style>
+          <a:lnRef idx="2">
+            <a:schemeClr val="accent1"/>
+          </a:lnRef>
+          <a:fillRef idx="0">
+            <a:schemeClr val="accent1"/>
+          </a:fillRef>
+          <a:effectRef idx="1">
+            <a:schemeClr val="accent1"/>
+          </a:effectRef>
+          <a:fontRef idx="minor">
+            <a:schemeClr val="tx1"/>
+          </a:fontRef>
+        </p:style>
+        <p:txBody>
+          <a:bodyPr rtlCol="0" anchor="ctr"/>
+          <a:lstStyle/>
+          <a:p>
+            <a:pPr algn="ctr"/>
+            <a:endParaRPr lang="en-US"/>
+          </a:p>
+        </p:txBody>
+      </p:sp>
+      <p:sp>
+        <p:nvSpPr>
           <p:cNvPr id="16" name="TextBox 15"/>
           <p:cNvSpPr txBox="1"/>
           <p:nvPr/>
         </p:nvSpPr>
         <p:spPr>
           <a:xfrm>
-            <a:off x="3013504" y="1776915"/>
-            <a:ext cx="1154508" cy="646331"/>
+            <a:off x="1307677" y="1927940"/>
+            <a:ext cx="1406680" cy="646331"/>
           </a:xfrm>
           <a:prstGeom prst="rect">
             <a:avLst/>
@@ -4491,49 +4388,22 @@
                   </a:schemeClr>
                 </a:solidFill>
               </a:rPr>
-              <a:t>Variable set </a:t>
-            </a:r>
-            <a:r>
-              <a:rPr lang="en-US" sz="1200" b="1" dirty="0" smtClean="0">
+              <a:t>Financial activity </a:t>
+            </a:r>
+          </a:p>
+          <a:p>
+            <a:pPr algn="ctr"/>
+            <a:r>
+              <a:rPr lang="en-US" sz="1200" dirty="0" smtClean="0">
                 <a:solidFill>
                   <a:schemeClr val="accent2">
                     <a:lumMod val="75000"/>
                   </a:schemeClr>
                 </a:solidFill>
               </a:rPr>
-              <a:t>X</a:t>
-            </a:r>
-            <a:endParaRPr lang="en-US" sz="1200" b="1" dirty="0" smtClean="0">
-              <a:solidFill>
-                <a:schemeClr val="accent2">
-                  <a:lumMod val="75000"/>
-                </a:schemeClr>
-              </a:solidFill>
-            </a:endParaRPr>
-          </a:p>
-          <a:p>
-            <a:pPr algn="ctr"/>
-            <a:r>
-              <a:rPr lang="en-US" sz="1200" i="1" dirty="0">
-                <a:solidFill>
-                  <a:schemeClr val="accent2">
-                    <a:lumMod val="75000"/>
-                  </a:schemeClr>
-                </a:solidFill>
-              </a:rPr>
-              <a:t>k</a:t>
-            </a:r>
-            <a:r>
-              <a:rPr lang="en-US" sz="1200" i="1" dirty="0" smtClean="0">
-                <a:solidFill>
-                  <a:schemeClr val="accent2">
-                    <a:lumMod val="75000"/>
-                  </a:schemeClr>
-                </a:solidFill>
-              </a:rPr>
-              <a:t> – 180 days</a:t>
-            </a:r>
-            <a:endParaRPr lang="en-US" sz="1200" i="1" dirty="0">
+              <a:t>Payment behaviour </a:t>
+            </a:r>
+            <a:endParaRPr lang="en-US" sz="1200" dirty="0">
               <a:solidFill>
                 <a:schemeClr val="accent2">
                   <a:lumMod val="75000"/>
@@ -4565,14 +4435,58 @@
       </p:sp>
       <p:sp>
         <p:nvSpPr>
+          <p:cNvPr id="17" name="Left Brace 16"/>
+          <p:cNvSpPr/>
+          <p:nvPr/>
+        </p:nvSpPr>
+        <p:spPr>
+          <a:xfrm rot="16200000">
+            <a:off x="4961467" y="3522145"/>
+            <a:ext cx="414869" cy="1532464"/>
+          </a:xfrm>
+          <a:prstGeom prst="leftBrace">
+            <a:avLst/>
+          </a:prstGeom>
+          <a:noFill/>
+          <a:ln>
+            <a:solidFill>
+              <a:schemeClr val="accent3"/>
+            </a:solidFill>
+          </a:ln>
+        </p:spPr>
+        <p:style>
+          <a:lnRef idx="2">
+            <a:schemeClr val="accent1"/>
+          </a:lnRef>
+          <a:fillRef idx="0">
+            <a:schemeClr val="accent1"/>
+          </a:fillRef>
+          <a:effectRef idx="1">
+            <a:schemeClr val="accent1"/>
+          </a:effectRef>
+          <a:fontRef idx="minor">
+            <a:schemeClr val="tx1"/>
+          </a:fontRef>
+        </p:style>
+        <p:txBody>
+          <a:bodyPr rtlCol="0" anchor="ctr"/>
+          <a:lstStyle/>
+          <a:p>
+            <a:pPr algn="ctr"/>
+            <a:endParaRPr lang="en-US"/>
+          </a:p>
+        </p:txBody>
+      </p:sp>
+      <p:sp>
+        <p:nvSpPr>
           <p:cNvPr id="18" name="TextBox 17"/>
           <p:cNvSpPr txBox="1"/>
           <p:nvPr/>
         </p:nvSpPr>
         <p:spPr>
           <a:xfrm>
-            <a:off x="4985531" y="4822469"/>
-            <a:ext cx="1387369" cy="646331"/>
+            <a:off x="4471579" y="4522236"/>
+            <a:ext cx="1406680" cy="646331"/>
           </a:xfrm>
           <a:prstGeom prst="rect">
             <a:avLst/>
@@ -4592,40 +4506,19 @@
                   <a:srgbClr val="008000"/>
                 </a:solidFill>
               </a:rPr>
-              <a:t>Variable set </a:t>
-            </a:r>
-            <a:r>
-              <a:rPr lang="en-US" sz="1200" b="1" dirty="0" smtClean="0">
+              <a:t>Financial activity</a:t>
+            </a:r>
+          </a:p>
+          <a:p>
+            <a:pPr algn="ctr"/>
+            <a:r>
+              <a:rPr lang="en-US" sz="1200" dirty="0" smtClean="0">
                 <a:solidFill>
                   <a:srgbClr val="008000"/>
                 </a:solidFill>
               </a:rPr>
-              <a:t>X </a:t>
-            </a:r>
-          </a:p>
-          <a:p>
-            <a:pPr algn="ctr"/>
-            <a:r>
-              <a:rPr lang="en-US" sz="1200" i="1" dirty="0" smtClean="0">
-                <a:solidFill>
-                  <a:srgbClr val="008000"/>
-                </a:solidFill>
-              </a:rPr>
-              <a:t>t - </a:t>
-            </a:r>
-            <a:r>
-              <a:rPr lang="en-US" sz="1200" i="1" dirty="0" smtClean="0">
-                <a:solidFill>
-                  <a:srgbClr val="008000"/>
-                </a:solidFill>
-              </a:rPr>
-              <a:t>180 days</a:t>
-            </a:r>
-            <a:endParaRPr lang="en-US" sz="1200" i="1" dirty="0" smtClean="0">
-              <a:solidFill>
-                <a:srgbClr val="008000"/>
-              </a:solidFill>
-            </a:endParaRPr>
+              <a:t>Payment behaviour</a:t>
+            </a:r>
           </a:p>
           <a:p>
             <a:pPr algn="ctr"/>
@@ -4699,7 +4592,7 @@
         </p:nvSpPr>
         <p:spPr>
           <a:xfrm>
-            <a:off x="3498016" y="3632197"/>
+            <a:off x="2406815" y="3615262"/>
             <a:ext cx="742498" cy="369332"/>
           </a:xfrm>
           <a:prstGeom prst="rect">
@@ -4745,7 +4638,7 @@
         </p:nvSpPr>
         <p:spPr>
           <a:xfrm>
-            <a:off x="4437159" y="3068133"/>
+            <a:off x="3954559" y="3093529"/>
             <a:ext cx="854508" cy="369332"/>
           </a:xfrm>
           <a:prstGeom prst="rect">
@@ -4778,13 +4671,15 @@
       <p:cxnSp>
         <p:nvCxnSpPr>
           <p:cNvPr id="25" name="Straight Arrow Connector 24"/>
-          <p:cNvCxnSpPr/>
+          <p:cNvCxnSpPr>
+            <a:stCxn id="23" idx="3"/>
+          </p:cNvCxnSpPr>
           <p:nvPr/>
         </p:nvCxnSpPr>
         <p:spPr>
           <a:xfrm>
-            <a:off x="5291667" y="3278199"/>
-            <a:ext cx="643467" cy="8463"/>
+            <a:off x="4809067" y="3278195"/>
+            <a:ext cx="1126067" cy="0"/>
           </a:xfrm>
           <a:prstGeom prst="straightConnector1">
             <a:avLst/>
@@ -4811,13 +4706,15 @@
       <p:cxnSp>
         <p:nvCxnSpPr>
           <p:cNvPr id="29" name="Straight Arrow Connector 28"/>
-          <p:cNvCxnSpPr/>
+          <p:cNvCxnSpPr>
+            <a:stCxn id="23" idx="1"/>
+          </p:cNvCxnSpPr>
           <p:nvPr/>
         </p:nvCxnSpPr>
         <p:spPr>
-          <a:xfrm flipH="1" flipV="1">
-            <a:off x="3869265" y="3269732"/>
-            <a:ext cx="567894" cy="8468"/>
+          <a:xfrm flipH="1">
+            <a:off x="2760131" y="3278195"/>
+            <a:ext cx="1194428" cy="13741"/>
           </a:xfrm>
           <a:prstGeom prst="straightConnector1">
             <a:avLst/>
@@ -4849,8 +4746,8 @@
         </p:nvSpPr>
         <p:spPr>
           <a:xfrm rot="16200000">
-            <a:off x="6859601" y="3071792"/>
-            <a:ext cx="216931" cy="2065870"/>
+            <a:off x="7320213" y="2707499"/>
+            <a:ext cx="414869" cy="3164979"/>
           </a:xfrm>
           <a:prstGeom prst="leftBrace">
             <a:avLst/>
@@ -4893,7 +4790,7 @@
         </p:nvSpPr>
         <p:spPr>
           <a:xfrm>
-            <a:off x="5962092" y="4264273"/>
+            <a:off x="6461185" y="4527737"/>
             <a:ext cx="2121093" cy="461665"/>
           </a:xfrm>
           <a:prstGeom prst="rect">
@@ -4935,215 +4832,15 @@
           </a:p>
         </p:txBody>
       </p:sp>
-      <p:cxnSp>
-        <p:nvCxnSpPr>
-          <p:cNvPr id="43" name="Straight Connector 42"/>
-          <p:cNvCxnSpPr/>
-          <p:nvPr/>
-        </p:nvCxnSpPr>
-        <p:spPr>
-          <a:xfrm>
-            <a:off x="8001000" y="3416301"/>
-            <a:ext cx="0" cy="194732"/>
-          </a:xfrm>
-          <a:prstGeom prst="line">
-            <a:avLst/>
-          </a:prstGeom>
-        </p:spPr>
-        <p:style>
-          <a:lnRef idx="2">
-            <a:schemeClr val="accent1"/>
-          </a:lnRef>
-          <a:fillRef idx="0">
-            <a:schemeClr val="accent1"/>
-          </a:fillRef>
-          <a:effectRef idx="1">
-            <a:schemeClr val="accent1"/>
-          </a:effectRef>
-          <a:fontRef idx="minor">
-            <a:schemeClr val="tx1"/>
-          </a:fontRef>
-        </p:style>
-      </p:cxnSp>
-      <p:sp>
-        <p:nvSpPr>
-          <p:cNvPr id="24" name="Left Brace 16"/>
-          <p:cNvSpPr/>
-          <p:nvPr/>
-        </p:nvSpPr>
-        <p:spPr>
-          <a:xfrm rot="16200000">
-            <a:off x="4298952" y="2755402"/>
-            <a:ext cx="207434" cy="3064937"/>
-          </a:xfrm>
-          <a:prstGeom prst="leftBrace">
-            <a:avLst/>
-          </a:prstGeom>
-          <a:noFill/>
-          <a:ln>
-            <a:solidFill>
-              <a:schemeClr val="accent3"/>
-            </a:solidFill>
-          </a:ln>
-        </p:spPr>
-        <p:style>
-          <a:lnRef idx="2">
-            <a:schemeClr val="accent1"/>
-          </a:lnRef>
-          <a:fillRef idx="0">
-            <a:schemeClr val="accent1"/>
-          </a:fillRef>
-          <a:effectRef idx="1">
-            <a:schemeClr val="accent1"/>
-          </a:effectRef>
-          <a:fontRef idx="minor">
-            <a:schemeClr val="tx1"/>
-          </a:fontRef>
-        </p:style>
-        <p:txBody>
-          <a:bodyPr rtlCol="0" anchor="ctr"/>
-          <a:lstStyle/>
-          <a:p>
-            <a:pPr algn="ctr"/>
-            <a:endParaRPr lang="en-US"/>
-          </a:p>
-        </p:txBody>
-      </p:sp>
-      <p:sp>
-        <p:nvSpPr>
-          <p:cNvPr id="27" name="Left Brace 16"/>
-          <p:cNvSpPr/>
-          <p:nvPr/>
-        </p:nvSpPr>
-        <p:spPr>
-          <a:xfrm rot="16200000">
-            <a:off x="5574902" y="4444674"/>
-            <a:ext cx="205556" cy="568824"/>
-          </a:xfrm>
-          <a:prstGeom prst="leftBrace">
-            <a:avLst/>
-          </a:prstGeom>
-          <a:noFill/>
-          <a:ln>
-            <a:solidFill>
-              <a:schemeClr val="accent3"/>
-            </a:solidFill>
-          </a:ln>
-        </p:spPr>
-        <p:style>
-          <a:lnRef idx="2">
-            <a:schemeClr val="accent1"/>
-          </a:lnRef>
-          <a:fillRef idx="0">
-            <a:schemeClr val="accent1"/>
-          </a:fillRef>
-          <a:effectRef idx="1">
-            <a:schemeClr val="accent1"/>
-          </a:effectRef>
-          <a:fontRef idx="minor">
-            <a:schemeClr val="tx1"/>
-          </a:fontRef>
-        </p:style>
-        <p:txBody>
-          <a:bodyPr rtlCol="0" anchor="ctr"/>
-          <a:lstStyle/>
-          <a:p>
-            <a:pPr algn="ctr"/>
-            <a:endParaRPr lang="en-US"/>
-          </a:p>
-        </p:txBody>
-      </p:sp>
-      <p:sp>
-        <p:nvSpPr>
-          <p:cNvPr id="28" name="TextBox 17"/>
+      <p:sp>
+        <p:nvSpPr>
+          <p:cNvPr id="39" name="TextBox 38"/>
           <p:cNvSpPr txBox="1"/>
           <p:nvPr/>
         </p:nvSpPr>
         <p:spPr>
           <a:xfrm>
-            <a:off x="3691831" y="4381693"/>
-            <a:ext cx="1405202" cy="646331"/>
-          </a:xfrm>
-          <a:prstGeom prst="rect">
-            <a:avLst/>
-          </a:prstGeom>
-          <a:noFill/>
-        </p:spPr>
-        <p:txBody>
-          <a:bodyPr wrap="none" rtlCol="0">
-            <a:spAutoFit/>
-          </a:bodyPr>
-          <a:lstStyle/>
-          <a:p>
-            <a:pPr algn="ctr"/>
-            <a:r>
-              <a:rPr lang="en-US" sz="1200" dirty="0" smtClean="0">
-                <a:solidFill>
-                  <a:srgbClr val="008000"/>
-                </a:solidFill>
-              </a:rPr>
-              <a:t>Variable set </a:t>
-            </a:r>
-            <a:r>
-              <a:rPr lang="en-US" sz="1200" b="1" dirty="0">
-                <a:solidFill>
-                  <a:srgbClr val="008000"/>
-                </a:solidFill>
-              </a:rPr>
-              <a:t>Y</a:t>
-            </a:r>
-            <a:r>
-              <a:rPr lang="en-US" sz="1200" b="1" dirty="0" smtClean="0">
-                <a:solidFill>
-                  <a:srgbClr val="008000"/>
-                </a:solidFill>
-              </a:rPr>
-              <a:t> </a:t>
-            </a:r>
-          </a:p>
-          <a:p>
-            <a:pPr algn="ctr"/>
-            <a:r>
-              <a:rPr lang="en-US" sz="1200" i="1" dirty="0" smtClean="0">
-                <a:solidFill>
-                  <a:srgbClr val="008000"/>
-                </a:solidFill>
-              </a:rPr>
-              <a:t> t – 6 semesters</a:t>
-            </a:r>
-            <a:endParaRPr lang="en-US" sz="1200" i="1" dirty="0" smtClean="0">
-              <a:solidFill>
-                <a:srgbClr val="008000"/>
-              </a:solidFill>
-            </a:endParaRPr>
-          </a:p>
-          <a:p>
-            <a:pPr algn="ctr"/>
-            <a:r>
-              <a:rPr lang="en-US" sz="1200" dirty="0" smtClean="0">
-                <a:solidFill>
-                  <a:srgbClr val="008000"/>
-                </a:solidFill>
-              </a:rPr>
-              <a:t> (EVALUATION SET) </a:t>
-            </a:r>
-            <a:endParaRPr lang="en-US" sz="1200" dirty="0">
-              <a:solidFill>
-                <a:srgbClr val="008000"/>
-              </a:solidFill>
-            </a:endParaRPr>
-          </a:p>
-        </p:txBody>
-      </p:sp>
-      <p:sp>
-        <p:nvSpPr>
-          <p:cNvPr id="32" name="TextBox 22"/>
-          <p:cNvSpPr txBox="1"/>
-          <p:nvPr/>
-        </p:nvSpPr>
-        <p:spPr>
-          <a:xfrm>
-            <a:off x="6503025" y="3090902"/>
+            <a:off x="7129561" y="3085066"/>
             <a:ext cx="854508" cy="369332"/>
           </a:xfrm>
           <a:prstGeom prst="rect">
@@ -5175,14 +4872,16 @@
       </p:sp>
       <p:cxnSp>
         <p:nvCxnSpPr>
-          <p:cNvPr id="33" name="Straight Arrow Connector 24"/>
-          <p:cNvCxnSpPr/>
+          <p:cNvPr id="40" name="Straight Arrow Connector 39"/>
+          <p:cNvCxnSpPr>
+            <a:stCxn id="39" idx="3"/>
+          </p:cNvCxnSpPr>
           <p:nvPr/>
         </p:nvCxnSpPr>
         <p:spPr>
           <a:xfrm>
-            <a:off x="7357533" y="3300968"/>
-            <a:ext cx="643467" cy="1"/>
+            <a:off x="7984069" y="3269732"/>
+            <a:ext cx="1126067" cy="0"/>
           </a:xfrm>
           <a:prstGeom prst="straightConnector1">
             <a:avLst/>
@@ -5208,14 +4907,16 @@
       </p:cxnSp>
       <p:cxnSp>
         <p:nvCxnSpPr>
-          <p:cNvPr id="44" name="Straight Arrow Connector 28"/>
-          <p:cNvCxnSpPr/>
+          <p:cNvPr id="41" name="Straight Arrow Connector 40"/>
+          <p:cNvCxnSpPr>
+            <a:stCxn id="39" idx="1"/>
+          </p:cNvCxnSpPr>
           <p:nvPr/>
         </p:nvCxnSpPr>
         <p:spPr>
-          <a:xfrm flipH="1" flipV="1">
-            <a:off x="5935138" y="3294103"/>
-            <a:ext cx="567894" cy="0"/>
+          <a:xfrm flipH="1">
+            <a:off x="5935133" y="3269732"/>
+            <a:ext cx="1194428" cy="13741"/>
           </a:xfrm>
           <a:prstGeom prst="straightConnector1">
             <a:avLst/>
@@ -5239,26 +4940,20 @@
           </a:fontRef>
         </p:style>
       </p:cxnSp>
-      <p:sp>
-        <p:nvSpPr>
-          <p:cNvPr id="45" name="Left Brace 9"/>
-          <p:cNvSpPr/>
-          <p:nvPr/>
-        </p:nvSpPr>
-        <p:spPr>
-          <a:xfrm rot="5400000">
-            <a:off x="3483253" y="2204794"/>
-            <a:ext cx="203200" cy="568824"/>
-          </a:xfrm>
-          <a:prstGeom prst="leftBrace">
-            <a:avLst/>
-          </a:prstGeom>
-          <a:noFill/>
-          <a:ln>
-            <a:solidFill>
-              <a:schemeClr val="accent2"/>
-            </a:solidFill>
-          </a:ln>
+      <p:cxnSp>
+        <p:nvCxnSpPr>
+          <p:cNvPr id="43" name="Straight Connector 42"/>
+          <p:cNvCxnSpPr/>
+          <p:nvPr/>
+        </p:nvCxnSpPr>
+        <p:spPr>
+          <a:xfrm>
+            <a:off x="9110136" y="3420530"/>
+            <a:ext cx="0" cy="194732"/>
+          </a:xfrm>
+          <a:prstGeom prst="line">
+            <a:avLst/>
+          </a:prstGeom>
         </p:spPr>
         <p:style>
           <a:lnRef idx="2">
@@ -5274,170 +4969,7 @@
             <a:schemeClr val="tx1"/>
           </a:fontRef>
         </p:style>
-        <p:txBody>
-          <a:bodyPr rtlCol="0" anchor="ctr"/>
-          <a:lstStyle/>
-          <a:p>
-            <a:pPr algn="ctr"/>
-            <a:r>
-              <a:rPr lang="en-US" dirty="0" smtClean="0"/>
-              <a:t> </a:t>
-            </a:r>
-            <a:endParaRPr lang="en-US" dirty="0"/>
-          </a:p>
-        </p:txBody>
-      </p:sp>
-      <p:sp>
-        <p:nvSpPr>
-          <p:cNvPr id="46" name="Left Brace 9"/>
-          <p:cNvSpPr/>
-          <p:nvPr/>
-        </p:nvSpPr>
-        <p:spPr>
-          <a:xfrm rot="5400000">
-            <a:off x="2202151" y="1228492"/>
-            <a:ext cx="242334" cy="3091893"/>
-          </a:xfrm>
-          <a:prstGeom prst="leftBrace">
-            <a:avLst/>
-          </a:prstGeom>
-          <a:noFill/>
-          <a:ln>
-            <a:solidFill>
-              <a:schemeClr val="accent2"/>
-            </a:solidFill>
-          </a:ln>
-        </p:spPr>
-        <p:style>
-          <a:lnRef idx="2">
-            <a:schemeClr val="accent1"/>
-          </a:lnRef>
-          <a:fillRef idx="0">
-            <a:schemeClr val="accent1"/>
-          </a:fillRef>
-          <a:effectRef idx="1">
-            <a:schemeClr val="accent1"/>
-          </a:effectRef>
-          <a:fontRef idx="minor">
-            <a:schemeClr val="tx1"/>
-          </a:fontRef>
-        </p:style>
-        <p:txBody>
-          <a:bodyPr rtlCol="0" anchor="ctr"/>
-          <a:lstStyle/>
-          <a:p>
-            <a:pPr algn="ctr"/>
-            <a:r>
-              <a:rPr lang="en-US" dirty="0" smtClean="0"/>
-              <a:t> </a:t>
-            </a:r>
-            <a:endParaRPr lang="en-US" dirty="0"/>
-          </a:p>
-        </p:txBody>
-      </p:sp>
-      <p:sp>
-        <p:nvSpPr>
-          <p:cNvPr id="47" name="TextBox 15"/>
-          <p:cNvSpPr txBox="1"/>
-          <p:nvPr/>
-        </p:nvSpPr>
-        <p:spPr>
-          <a:xfrm>
-            <a:off x="1715692" y="1907569"/>
-            <a:ext cx="1154508" cy="646331"/>
-          </a:xfrm>
-          <a:prstGeom prst="rect">
-            <a:avLst/>
-          </a:prstGeom>
-          <a:noFill/>
-        </p:spPr>
-        <p:txBody>
-          <a:bodyPr wrap="none" rtlCol="0">
-            <a:spAutoFit/>
-          </a:bodyPr>
-          <a:lstStyle/>
-          <a:p>
-            <a:pPr algn="ctr"/>
-            <a:r>
-              <a:rPr lang="en-US" sz="1200" dirty="0" smtClean="0">
-                <a:solidFill>
-                  <a:schemeClr val="accent2">
-                    <a:lumMod val="75000"/>
-                  </a:schemeClr>
-                </a:solidFill>
-              </a:rPr>
-              <a:t>Variable set </a:t>
-            </a:r>
-            <a:r>
-              <a:rPr lang="en-US" sz="1200" b="1" dirty="0" smtClean="0">
-                <a:solidFill>
-                  <a:schemeClr val="accent2">
-                    <a:lumMod val="75000"/>
-                  </a:schemeClr>
-                </a:solidFill>
-              </a:rPr>
-              <a:t>Y</a:t>
-            </a:r>
-            <a:r>
-              <a:rPr lang="en-US" sz="1200" dirty="0" smtClean="0">
-                <a:solidFill>
-                  <a:schemeClr val="accent2">
-                    <a:lumMod val="75000"/>
-                  </a:schemeClr>
-                </a:solidFill>
-              </a:rPr>
-              <a:t> </a:t>
-            </a:r>
-            <a:endParaRPr lang="en-US" sz="1200" b="1" dirty="0" smtClean="0">
-              <a:solidFill>
-                <a:schemeClr val="accent2">
-                  <a:lumMod val="75000"/>
-                </a:schemeClr>
-              </a:solidFill>
-            </a:endParaRPr>
-          </a:p>
-          <a:p>
-            <a:pPr algn="ctr"/>
-            <a:r>
-              <a:rPr lang="en-US" sz="1200" i="1" dirty="0" smtClean="0">
-                <a:solidFill>
-                  <a:schemeClr val="accent2">
-                    <a:lumMod val="75000"/>
-                  </a:schemeClr>
-                </a:solidFill>
-              </a:rPr>
-              <a:t>t – 6 semesters</a:t>
-            </a:r>
-            <a:endParaRPr lang="en-US" sz="1200" i="1" dirty="0">
-              <a:solidFill>
-                <a:schemeClr val="accent2">
-                  <a:lumMod val="75000"/>
-                </a:schemeClr>
-              </a:solidFill>
-            </a:endParaRPr>
-          </a:p>
-          <a:p>
-            <a:pPr algn="ctr"/>
-            <a:r>
-              <a:rPr lang="en-US" sz="1200" dirty="0" smtClean="0">
-                <a:solidFill>
-                  <a:schemeClr val="accent2">
-                    <a:lumMod val="75000"/>
-                  </a:schemeClr>
-                </a:solidFill>
-              </a:rPr>
-              <a:t>(TRAINING SET) </a:t>
-            </a:r>
-            <a:endParaRPr lang="en-US" sz="1200" dirty="0">
-              <a:solidFill>
-                <a:schemeClr val="accent2">
-                  <a:lumMod val="75000"/>
-                </a:schemeClr>
-              </a:solidFill>
-            </a:endParaRPr>
-          </a:p>
-        </p:txBody>
-      </p:sp>
+      </p:cxnSp>
     </p:spTree>
     <p:extLst>
       <p:ext uri="{BB962C8B-B14F-4D97-AF65-F5344CB8AC3E}">
@@ -6237,15 +5769,14 @@
         <p:nvCxnSpPr>
           <p:cNvPr id="26" name="Straight Arrow Connector 25"/>
           <p:cNvCxnSpPr>
-            <a:stCxn id="19" idx="3"/>
-            <a:endCxn id="22" idx="1"/>
+            <a:endCxn id="25" idx="1"/>
           </p:cNvCxnSpPr>
           <p:nvPr/>
         </p:nvCxnSpPr>
         <p:spPr>
-          <a:xfrm>
-            <a:off x="3873500" y="3367414"/>
-            <a:ext cx="361825" cy="0"/>
+          <a:xfrm flipV="1">
+            <a:off x="3745655" y="3330015"/>
+            <a:ext cx="674539" cy="4644"/>
           </a:xfrm>
           <a:prstGeom prst="straightConnector1">
             <a:avLst/>
@@ -6274,6 +5805,7 @@
           <p:cNvPr id="4" name="Straight Arrow Connector 3"/>
           <p:cNvCxnSpPr>
             <a:stCxn id="9" idx="4"/>
+            <a:endCxn id="5" idx="0"/>
           </p:cNvCxnSpPr>
           <p:nvPr/>
         </p:nvCxnSpPr>
@@ -6304,88 +5836,25 @@
           </a:fontRef>
         </p:style>
       </p:cxnSp>
-      <p:cxnSp>
-        <p:nvCxnSpPr>
-          <p:cNvPr id="7" name="Straight Arrow Connector 6"/>
-          <p:cNvCxnSpPr/>
-          <p:nvPr/>
-        </p:nvCxnSpPr>
-        <p:spPr>
-          <a:xfrm>
-            <a:off x="7609291" y="2501079"/>
-            <a:ext cx="0" cy="656214"/>
-          </a:xfrm>
-          <a:prstGeom prst="straightConnector1">
-            <a:avLst/>
-          </a:prstGeom>
-          <a:ln>
-            <a:tailEnd type="arrow"/>
-          </a:ln>
-        </p:spPr>
-        <p:style>
-          <a:lnRef idx="2">
-            <a:schemeClr val="accent1"/>
-          </a:lnRef>
-          <a:fillRef idx="0">
-            <a:schemeClr val="accent1"/>
-          </a:fillRef>
-          <a:effectRef idx="1">
-            <a:schemeClr val="accent1"/>
-          </a:effectRef>
-          <a:fontRef idx="minor">
-            <a:schemeClr val="tx1"/>
-          </a:fontRef>
-        </p:style>
-      </p:cxnSp>
-      <p:sp>
-        <p:nvSpPr>
-          <p:cNvPr id="8" name="TextBox 7"/>
-          <p:cNvSpPr txBox="1"/>
-          <p:nvPr/>
-        </p:nvSpPr>
-        <p:spPr>
-          <a:xfrm>
-            <a:off x="6016083" y="3138049"/>
-            <a:ext cx="402311" cy="369332"/>
-          </a:xfrm>
-          <a:prstGeom prst="rect">
+      <p:sp>
+        <p:nvSpPr>
+          <p:cNvPr id="5" name="Rounded Rectangle 4"/>
+          <p:cNvSpPr/>
+          <p:nvPr/>
+        </p:nvSpPr>
+        <p:spPr>
+          <a:xfrm>
+            <a:off x="3048594" y="3152649"/>
+            <a:ext cx="697061" cy="354732"/>
+          </a:xfrm>
+          <a:prstGeom prst="roundRect">
             <a:avLst/>
           </a:prstGeom>
           <a:noFill/>
-        </p:spPr>
-        <p:txBody>
-          <a:bodyPr wrap="none" rtlCol="0">
-            <a:spAutoFit/>
-          </a:bodyPr>
-          <a:lstStyle/>
-          <a:p>
-            <a:r>
-              <a:rPr lang="en-US" dirty="0" smtClean="0"/>
-              <a:t>….</a:t>
-            </a:r>
-            <a:endParaRPr lang="en-US" dirty="0"/>
-          </a:p>
-        </p:txBody>
-      </p:sp>
-      <p:sp>
-        <p:nvSpPr>
-          <p:cNvPr id="9" name="Oval 8"/>
-          <p:cNvSpPr/>
-          <p:nvPr/>
-        </p:nvSpPr>
-        <p:spPr>
-          <a:xfrm>
-            <a:off x="2933700" y="2001182"/>
-            <a:ext cx="939800" cy="495253"/>
-          </a:xfrm>
-          <a:prstGeom prst="ellipse">
-            <a:avLst/>
-          </a:prstGeom>
           <a:ln>
             <a:solidFill>
-              <a:srgbClr val="000000"/>
+              <a:schemeClr val="tx1"/>
             </a:solidFill>
-            <a:prstDash val="solid"/>
           </a:ln>
         </p:spPr>
         <p:style>
@@ -6410,14 +5879,14 @@
           <a:p>
             <a:pPr algn="ctr"/>
             <a:r>
-              <a:rPr lang="en-US" sz="1000" dirty="0" smtClean="0">
+              <a:rPr lang="en-US" sz="1050" dirty="0" smtClean="0">
                 <a:solidFill>
                   <a:srgbClr val="000000"/>
                 </a:solidFill>
               </a:rPr>
-              <a:t>Defaulter -180</a:t>
-            </a:r>
-            <a:endParaRPr lang="en-US" sz="1000" dirty="0">
+              <a:t>Day -180</a:t>
+            </a:r>
+            <a:endParaRPr lang="en-US" sz="1050" dirty="0">
               <a:solidFill>
                 <a:srgbClr val="000000"/>
               </a:solidFill>
@@ -6425,58 +5894,25 @@
           </a:p>
         </p:txBody>
       </p:sp>
-      <p:cxnSp>
-        <p:nvCxnSpPr>
-          <p:cNvPr id="24" name="Straight Arrow Connector 23"/>
-          <p:cNvCxnSpPr/>
-          <p:nvPr/>
-        </p:nvCxnSpPr>
-        <p:spPr>
-          <a:xfrm flipH="1">
-            <a:off x="4768725" y="2496435"/>
-            <a:ext cx="6475" cy="656214"/>
-          </a:xfrm>
-          <a:prstGeom prst="straightConnector1">
-            <a:avLst/>
-          </a:prstGeom>
-          <a:ln>
-            <a:tailEnd type="arrow"/>
-          </a:ln>
-        </p:spPr>
-        <p:style>
-          <a:lnRef idx="2">
-            <a:schemeClr val="accent1"/>
-          </a:lnRef>
-          <a:fillRef idx="0">
-            <a:schemeClr val="accent1"/>
-          </a:fillRef>
-          <a:effectRef idx="1">
-            <a:schemeClr val="accent1"/>
-          </a:effectRef>
-          <a:fontRef idx="minor">
-            <a:schemeClr val="tx1"/>
-          </a:fontRef>
-        </p:style>
-      </p:cxnSp>
-      <p:sp>
-        <p:nvSpPr>
-          <p:cNvPr id="20" name="Oval 19"/>
+      <p:sp>
+        <p:nvSpPr>
+          <p:cNvPr id="6" name="Rounded Rectangle 5"/>
           <p:cNvSpPr/>
           <p:nvPr/>
         </p:nvSpPr>
         <p:spPr>
           <a:xfrm>
-            <a:off x="4292600" y="2001182"/>
-            <a:ext cx="939800" cy="495253"/>
-          </a:xfrm>
-          <a:prstGeom prst="ellipse">
-            <a:avLst/>
-          </a:prstGeom>
+            <a:off x="7260760" y="3157293"/>
+            <a:ext cx="697061" cy="354732"/>
+          </a:xfrm>
+          <a:prstGeom prst="roundRect">
+            <a:avLst/>
+          </a:prstGeom>
+          <a:noFill/>
           <a:ln>
             <a:solidFill>
-              <a:srgbClr val="000000"/>
+              <a:schemeClr val="tx1"/>
             </a:solidFill>
-            <a:prstDash val="solid"/>
           </a:ln>
         </p:spPr>
         <p:style>
@@ -6501,31 +5937,28 @@
           <a:p>
             <a:pPr algn="ctr"/>
             <a:r>
-              <a:rPr lang="en-US" sz="1000" dirty="0" smtClean="0">
+              <a:rPr lang="en-US" sz="1050" dirty="0" smtClean="0">
                 <a:solidFill>
                   <a:srgbClr val="000000"/>
                 </a:solidFill>
               </a:rPr>
-              <a:t>Defaulter -179</a:t>
-            </a:r>
-            <a:endParaRPr lang="en-US" sz="1000" dirty="0">
-              <a:solidFill>
-                <a:srgbClr val="000000"/>
-              </a:solidFill>
-            </a:endParaRPr>
+              <a:t>Day -1</a:t>
+            </a:r>
           </a:p>
         </p:txBody>
       </p:sp>
       <p:cxnSp>
         <p:nvCxnSpPr>
-          <p:cNvPr id="28" name="Straight Arrow Connector 27"/>
-          <p:cNvCxnSpPr/>
+          <p:cNvPr id="7" name="Straight Arrow Connector 6"/>
+          <p:cNvCxnSpPr>
+            <a:endCxn id="6" idx="0"/>
+          </p:cNvCxnSpPr>
           <p:nvPr/>
         </p:nvCxnSpPr>
         <p:spPr>
           <a:xfrm>
-            <a:off x="5232400" y="2243368"/>
-            <a:ext cx="419100" cy="0"/>
+            <a:off x="7609291" y="2501079"/>
+            <a:ext cx="0" cy="656214"/>
           </a:xfrm>
           <a:prstGeom prst="straightConnector1">
             <a:avLst/>
@@ -6551,13 +5984,13 @@
       </p:cxnSp>
       <p:sp>
         <p:nvSpPr>
-          <p:cNvPr id="30" name="TextBox 29"/>
+          <p:cNvPr id="8" name="TextBox 7"/>
           <p:cNvSpPr txBox="1"/>
           <p:nvPr/>
         </p:nvSpPr>
         <p:spPr>
           <a:xfrm>
-            <a:off x="6016083" y="2001182"/>
+            <a:off x="6016083" y="3138049"/>
             <a:ext cx="402311" cy="369332"/>
           </a:xfrm>
           <a:prstGeom prst="rect">
@@ -6579,50 +6012,15 @@
           </a:p>
         </p:txBody>
       </p:sp>
-      <p:cxnSp>
-        <p:nvCxnSpPr>
-          <p:cNvPr id="32" name="Straight Arrow Connector 31"/>
-          <p:cNvCxnSpPr>
-            <a:endCxn id="33" idx="2"/>
-          </p:cNvCxnSpPr>
-          <p:nvPr/>
-        </p:nvCxnSpPr>
-        <p:spPr>
-          <a:xfrm>
-            <a:off x="6720291" y="2243368"/>
-            <a:ext cx="419100" cy="0"/>
-          </a:xfrm>
-          <a:prstGeom prst="straightConnector1">
-            <a:avLst/>
-          </a:prstGeom>
-          <a:ln>
-            <a:tailEnd type="arrow"/>
-          </a:ln>
-        </p:spPr>
-        <p:style>
-          <a:lnRef idx="2">
-            <a:schemeClr val="accent1"/>
-          </a:lnRef>
-          <a:fillRef idx="0">
-            <a:schemeClr val="accent1"/>
-          </a:fillRef>
-          <a:effectRef idx="1">
-            <a:schemeClr val="accent1"/>
-          </a:effectRef>
-          <a:fontRef idx="minor">
-            <a:schemeClr val="tx1"/>
-          </a:fontRef>
-        </p:style>
-      </p:cxnSp>
-      <p:sp>
-        <p:nvSpPr>
-          <p:cNvPr id="33" name="Oval 32"/>
+      <p:sp>
+        <p:nvSpPr>
+          <p:cNvPr id="9" name="Oval 8"/>
           <p:cNvSpPr/>
           <p:nvPr/>
         </p:nvSpPr>
         <p:spPr>
           <a:xfrm>
-            <a:off x="7139391" y="1995741"/>
+            <a:off x="2933700" y="2001182"/>
             <a:ext cx="939800" cy="495253"/>
           </a:xfrm>
           <a:prstGeom prst="ellipse">
@@ -6662,7 +6060,7 @@
                   <a:srgbClr val="000000"/>
                 </a:solidFill>
               </a:rPr>
-              <a:t>Defaulter -1</a:t>
+              <a:t>Defaulter -180</a:t>
             </a:r>
             <a:endParaRPr lang="en-US" sz="1000" dirty="0">
               <a:solidFill>
@@ -6672,16 +6070,51 @@
           </a:p>
         </p:txBody>
       </p:sp>
-      <p:sp>
-        <p:nvSpPr>
-          <p:cNvPr id="19" name="Rounded Rectangle 5"/>
+      <p:cxnSp>
+        <p:nvCxnSpPr>
+          <p:cNvPr id="24" name="Straight Arrow Connector 23"/>
+          <p:cNvCxnSpPr>
+            <a:endCxn id="25" idx="0"/>
+          </p:cNvCxnSpPr>
+          <p:nvPr/>
+        </p:nvCxnSpPr>
+        <p:spPr>
+          <a:xfrm flipH="1">
+            <a:off x="4768725" y="2496435"/>
+            <a:ext cx="6475" cy="656214"/>
+          </a:xfrm>
+          <a:prstGeom prst="straightConnector1">
+            <a:avLst/>
+          </a:prstGeom>
+          <a:ln>
+            <a:tailEnd type="arrow"/>
+          </a:ln>
+        </p:spPr>
+        <p:style>
+          <a:lnRef idx="2">
+            <a:schemeClr val="accent1"/>
+          </a:lnRef>
+          <a:fillRef idx="0">
+            <a:schemeClr val="accent1"/>
+          </a:fillRef>
+          <a:effectRef idx="1">
+            <a:schemeClr val="accent1"/>
+          </a:effectRef>
+          <a:fontRef idx="minor">
+            <a:schemeClr val="tx1"/>
+          </a:fontRef>
+        </p:style>
+      </p:cxnSp>
+      <p:sp>
+        <p:nvSpPr>
+          <p:cNvPr id="25" name="Rounded Rectangle 24"/>
           <p:cNvSpPr/>
           <p:nvPr/>
         </p:nvSpPr>
         <p:spPr>
           <a:xfrm>
-            <a:off x="2806700" y="3162302"/>
-            <a:ext cx="1066800" cy="410224"/>
+            <a:off x="4420194" y="3152649"/>
+            <a:ext cx="697061" cy="354732"/>
           </a:xfrm>
           <a:prstGeom prst="roundRect">
             <a:avLst/>
@@ -6714,57 +6147,14 @@
           <a:lstStyle/>
           <a:p>
             <a:pPr algn="ctr"/>
-            <a:endParaRPr lang="en-US" sz="1050" dirty="0" smtClean="0">
-              <a:solidFill>
-                <a:srgbClr val="000000"/>
-              </a:solidFill>
-            </a:endParaRPr>
-          </a:p>
-          <a:p>
-            <a:pPr algn="ctr"/>
             <a:r>
               <a:rPr lang="en-US" sz="1050" dirty="0" smtClean="0">
                 <a:solidFill>
                   <a:srgbClr val="000000"/>
                 </a:solidFill>
               </a:rPr>
-              <a:t>Variable set </a:t>
-            </a:r>
-            <a:r>
-              <a:rPr lang="en-US" sz="1050" b="1" dirty="0" smtClean="0">
-                <a:solidFill>
-                  <a:srgbClr val="000000"/>
-                </a:solidFill>
-              </a:rPr>
-              <a:t>X</a:t>
-            </a:r>
-            <a:r>
-              <a:rPr lang="en-US" sz="1050" dirty="0" smtClean="0">
-                <a:solidFill>
-                  <a:srgbClr val="000000"/>
-                </a:solidFill>
-              </a:rPr>
-              <a:t> </a:t>
-            </a:r>
-            <a:r>
-              <a:rPr lang="en-US" sz="1050" dirty="0" smtClean="0">
-                <a:solidFill>
-                  <a:srgbClr val="000000"/>
-                </a:solidFill>
-              </a:rPr>
-              <a:t>-</a:t>
-            </a:r>
-            <a:r>
-              <a:rPr lang="en-US" sz="1050" dirty="0" smtClean="0">
-                <a:solidFill>
-                  <a:srgbClr val="000000"/>
-                </a:solidFill>
-              </a:rPr>
-              <a:t>180 days</a:t>
-            </a:r>
-          </a:p>
-          <a:p>
-            <a:pPr algn="ctr"/>
+              <a:t>Day -179</a:t>
+            </a:r>
             <a:endParaRPr lang="en-US" sz="1050" dirty="0">
               <a:solidFill>
                 <a:srgbClr val="000000"/>
@@ -6775,23 +6165,23 @@
       </p:sp>
       <p:sp>
         <p:nvSpPr>
-          <p:cNvPr id="22" name="Rounded Rectangle 5"/>
+          <p:cNvPr id="20" name="Oval 19"/>
           <p:cNvSpPr/>
           <p:nvPr/>
         </p:nvSpPr>
         <p:spPr>
           <a:xfrm>
-            <a:off x="4235325" y="3162302"/>
-            <a:ext cx="1066800" cy="410224"/>
-          </a:xfrm>
-          <a:prstGeom prst="roundRect">
-            <a:avLst/>
-          </a:prstGeom>
-          <a:noFill/>
+            <a:off x="4292600" y="2001182"/>
+            <a:ext cx="939800" cy="495253"/>
+          </a:xfrm>
+          <a:prstGeom prst="ellipse">
+            <a:avLst/>
+          </a:prstGeom>
           <a:ln>
             <a:solidFill>
-              <a:schemeClr val="tx1"/>
+              <a:srgbClr val="000000"/>
             </a:solidFill>
+            <a:prstDash val="solid"/>
           </a:ln>
         </p:spPr>
         <p:style>
@@ -6815,77 +6205,32 @@
           <a:lstStyle/>
           <a:p>
             <a:pPr algn="ctr"/>
-            <a:endParaRPr lang="en-US" sz="1050" dirty="0" smtClean="0">
+            <a:r>
+              <a:rPr lang="en-US" sz="1000" dirty="0" smtClean="0">
+                <a:solidFill>
+                  <a:srgbClr val="000000"/>
+                </a:solidFill>
+              </a:rPr>
+              <a:t>Defaulter -179</a:t>
+            </a:r>
+            <a:endParaRPr lang="en-US" sz="1000" dirty="0">
               <a:solidFill>
                 <a:srgbClr val="000000"/>
               </a:solidFill>
             </a:endParaRPr>
           </a:p>
-          <a:p>
-            <a:pPr algn="ctr"/>
-            <a:r>
-              <a:rPr lang="en-US" sz="1050" dirty="0" smtClean="0">
-                <a:solidFill>
-                  <a:srgbClr val="000000"/>
-                </a:solidFill>
-              </a:rPr>
-              <a:t>Variable set </a:t>
-            </a:r>
-            <a:r>
-              <a:rPr lang="en-US" sz="1050" b="1" dirty="0" smtClean="0">
-                <a:solidFill>
-                  <a:srgbClr val="000000"/>
-                </a:solidFill>
-              </a:rPr>
-              <a:t>X</a:t>
-            </a:r>
-            <a:r>
-              <a:rPr lang="en-US" sz="1050" dirty="0" smtClean="0">
-                <a:solidFill>
-                  <a:srgbClr val="000000"/>
-                </a:solidFill>
-              </a:rPr>
-              <a:t> </a:t>
-            </a:r>
-            <a:r>
-              <a:rPr lang="en-US" sz="1050" dirty="0" smtClean="0">
-                <a:solidFill>
-                  <a:srgbClr val="000000"/>
-                </a:solidFill>
-              </a:rPr>
-              <a:t>-179 </a:t>
-            </a:r>
-            <a:r>
-              <a:rPr lang="en-US" sz="1050" dirty="0" smtClean="0">
-                <a:solidFill>
-                  <a:srgbClr val="000000"/>
-                </a:solidFill>
-              </a:rPr>
-              <a:t>days</a:t>
-            </a:r>
-          </a:p>
-          <a:p>
-            <a:pPr algn="ctr"/>
-            <a:endParaRPr lang="en-US" sz="1050" dirty="0">
-              <a:solidFill>
-                <a:srgbClr val="000000"/>
-              </a:solidFill>
-            </a:endParaRPr>
-          </a:p>
         </p:txBody>
       </p:sp>
       <p:cxnSp>
         <p:nvCxnSpPr>
-          <p:cNvPr id="27" name="Straight Arrow Connector 25"/>
-          <p:cNvCxnSpPr>
-            <a:stCxn id="22" idx="3"/>
-          </p:cNvCxnSpPr>
+          <p:cNvPr id="28" name="Straight Arrow Connector 27"/>
+          <p:cNvCxnSpPr/>
           <p:nvPr/>
         </p:nvCxnSpPr>
         <p:spPr>
           <a:xfrm>
-            <a:off x="5302125" y="3367414"/>
-            <a:ext cx="361825" cy="0"/>
+            <a:off x="5232400" y="2243368"/>
+            <a:ext cx="419100" cy="0"/>
           </a:xfrm>
           <a:prstGeom prst="straightConnector1">
             <a:avLst/>
@@ -6911,16 +6256,14 @@
       </p:cxnSp>
       <p:cxnSp>
         <p:nvCxnSpPr>
-          <p:cNvPr id="34" name="Straight Arrow Connector 25"/>
-          <p:cNvCxnSpPr>
-            <a:endCxn id="23" idx="1"/>
-          </p:cNvCxnSpPr>
+          <p:cNvPr id="29" name="Straight Arrow Connector 28"/>
+          <p:cNvCxnSpPr/>
           <p:nvPr/>
         </p:nvCxnSpPr>
         <p:spPr>
-          <a:xfrm>
-            <a:off x="6777566" y="3367414"/>
-            <a:ext cx="361825" cy="0"/>
+          <a:xfrm flipV="1">
+            <a:off x="5125644" y="3319930"/>
+            <a:ext cx="674539" cy="4644"/>
           </a:xfrm>
           <a:prstGeom prst="straightConnector1">
             <a:avLst/>
@@ -6946,23 +6289,121 @@
       </p:cxnSp>
       <p:sp>
         <p:nvSpPr>
-          <p:cNvPr id="23" name="Rounded Rectangle 5"/>
+          <p:cNvPr id="30" name="TextBox 29"/>
+          <p:cNvSpPr txBox="1"/>
+          <p:nvPr/>
+        </p:nvSpPr>
+        <p:spPr>
+          <a:xfrm>
+            <a:off x="6016083" y="2001182"/>
+            <a:ext cx="402311" cy="369332"/>
+          </a:xfrm>
+          <a:prstGeom prst="rect">
+            <a:avLst/>
+          </a:prstGeom>
+          <a:noFill/>
+        </p:spPr>
+        <p:txBody>
+          <a:bodyPr wrap="none" rtlCol="0">
+            <a:spAutoFit/>
+          </a:bodyPr>
+          <a:lstStyle/>
+          <a:p>
+            <a:r>
+              <a:rPr lang="en-US" dirty="0" smtClean="0"/>
+              <a:t>….</a:t>
+            </a:r>
+            <a:endParaRPr lang="en-US" dirty="0"/>
+          </a:p>
+        </p:txBody>
+      </p:sp>
+      <p:cxnSp>
+        <p:nvCxnSpPr>
+          <p:cNvPr id="31" name="Straight Arrow Connector 30"/>
+          <p:cNvCxnSpPr/>
+          <p:nvPr/>
+        </p:nvCxnSpPr>
+        <p:spPr>
+          <a:xfrm flipV="1">
+            <a:off x="6586221" y="3315286"/>
+            <a:ext cx="674539" cy="4644"/>
+          </a:xfrm>
+          <a:prstGeom prst="straightConnector1">
+            <a:avLst/>
+          </a:prstGeom>
+          <a:ln>
+            <a:tailEnd type="arrow"/>
+          </a:ln>
+        </p:spPr>
+        <p:style>
+          <a:lnRef idx="2">
+            <a:schemeClr val="accent1"/>
+          </a:lnRef>
+          <a:fillRef idx="0">
+            <a:schemeClr val="accent1"/>
+          </a:fillRef>
+          <a:effectRef idx="1">
+            <a:schemeClr val="accent1"/>
+          </a:effectRef>
+          <a:fontRef idx="minor">
+            <a:schemeClr val="tx1"/>
+          </a:fontRef>
+        </p:style>
+      </p:cxnSp>
+      <p:cxnSp>
+        <p:nvCxnSpPr>
+          <p:cNvPr id="32" name="Straight Arrow Connector 31"/>
+          <p:cNvCxnSpPr>
+            <a:endCxn id="33" idx="2"/>
+          </p:cNvCxnSpPr>
+          <p:nvPr/>
+        </p:nvCxnSpPr>
+        <p:spPr>
+          <a:xfrm>
+            <a:off x="6720291" y="2243368"/>
+            <a:ext cx="419100" cy="0"/>
+          </a:xfrm>
+          <a:prstGeom prst="straightConnector1">
+            <a:avLst/>
+          </a:prstGeom>
+          <a:ln>
+            <a:tailEnd type="arrow"/>
+          </a:ln>
+        </p:spPr>
+        <p:style>
+          <a:lnRef idx="2">
+            <a:schemeClr val="accent1"/>
+          </a:lnRef>
+          <a:fillRef idx="0">
+            <a:schemeClr val="accent1"/>
+          </a:fillRef>
+          <a:effectRef idx="1">
+            <a:schemeClr val="accent1"/>
+          </a:effectRef>
+          <a:fontRef idx="minor">
+            <a:schemeClr val="tx1"/>
+          </a:fontRef>
+        </p:style>
+      </p:cxnSp>
+      <p:sp>
+        <p:nvSpPr>
+          <p:cNvPr id="33" name="Oval 32"/>
           <p:cNvSpPr/>
           <p:nvPr/>
         </p:nvSpPr>
         <p:spPr>
           <a:xfrm>
-            <a:off x="7139391" y="3162302"/>
-            <a:ext cx="1066800" cy="410224"/>
-          </a:xfrm>
-          <a:prstGeom prst="roundRect">
-            <a:avLst/>
-          </a:prstGeom>
-          <a:noFill/>
+            <a:off x="7139391" y="1995741"/>
+            <a:ext cx="939800" cy="495253"/>
+          </a:xfrm>
+          <a:prstGeom prst="ellipse">
+            <a:avLst/>
+          </a:prstGeom>
           <a:ln>
             <a:solidFill>
-              <a:schemeClr val="tx1"/>
+              <a:srgbClr val="000000"/>
             </a:solidFill>
+            <a:prstDash val="solid"/>
           </a:ln>
         </p:spPr>
         <p:style>
@@ -6986,55 +6427,15 @@
           <a:lstStyle/>
           <a:p>
             <a:pPr algn="ctr"/>
-            <a:endParaRPr lang="en-US" sz="1050" dirty="0" smtClean="0">
-              <a:solidFill>
-                <a:srgbClr val="000000"/>
-              </a:solidFill>
-            </a:endParaRPr>
-          </a:p>
-          <a:p>
-            <a:pPr algn="ctr"/>
-            <a:r>
-              <a:rPr lang="en-US" sz="1050" dirty="0" smtClean="0">
+            <a:r>
+              <a:rPr lang="en-US" sz="1000" dirty="0" smtClean="0">
                 <a:solidFill>
                   <a:srgbClr val="000000"/>
                 </a:solidFill>
               </a:rPr>
-              <a:t>Variable set </a:t>
-            </a:r>
-            <a:r>
-              <a:rPr lang="en-US" sz="1050" b="1" dirty="0" smtClean="0">
-                <a:solidFill>
-                  <a:srgbClr val="000000"/>
-                </a:solidFill>
-              </a:rPr>
-              <a:t>X</a:t>
-            </a:r>
-            <a:r>
-              <a:rPr lang="en-US" sz="1050" dirty="0" smtClean="0">
-                <a:solidFill>
-                  <a:srgbClr val="000000"/>
-                </a:solidFill>
-              </a:rPr>
-              <a:t> -1 </a:t>
-            </a:r>
-            <a:r>
-              <a:rPr lang="en-US" sz="1050" dirty="0" smtClean="0">
-                <a:solidFill>
-                  <a:srgbClr val="000000"/>
-                </a:solidFill>
-              </a:rPr>
-              <a:t>day</a:t>
-            </a:r>
-            <a:endParaRPr lang="en-US" sz="1050" dirty="0" smtClean="0">
-              <a:solidFill>
-                <a:srgbClr val="000000"/>
-              </a:solidFill>
-            </a:endParaRPr>
-          </a:p>
-          <a:p>
-            <a:pPr algn="ctr"/>
-            <a:endParaRPr lang="en-US" sz="1050" dirty="0">
+              <a:t>Defaulter -1</a:t>
+            </a:r>
+            <a:endParaRPr lang="en-US" sz="1000" dirty="0">
               <a:solidFill>
                 <a:srgbClr val="000000"/>
               </a:solidFill>

</xml_diff>

<commit_message>
Updates in Figures of Cajamar
</commit_message>
<xml_diff>
--- a/doc/D2.1_AMIDSTModelingFramework/figures/CajaMarModelsBucket.pptx
+++ b/doc/D2.1_AMIDSTModelingFramework/figures/CajaMarModelsBucket.pptx
@@ -298,7 +298,7 @@
           <a:p>
             <a:fld id="{08C0AF01-9055-0547-953E-72B2160BBA35}" type="datetimeFigureOut">
               <a:rPr lang="en-US" smtClean="0"/>
-              <a:t>10/09/14</a:t>
+              <a:t>16/09/14</a:t>
             </a:fld>
             <a:endParaRPr lang="en-US"/>
           </a:p>
@@ -468,7 +468,7 @@
           <a:p>
             <a:fld id="{08C0AF01-9055-0547-953E-72B2160BBA35}" type="datetimeFigureOut">
               <a:rPr lang="en-US" smtClean="0"/>
-              <a:t>10/09/14</a:t>
+              <a:t>16/09/14</a:t>
             </a:fld>
             <a:endParaRPr lang="en-US"/>
           </a:p>
@@ -648,7 +648,7 @@
           <a:p>
             <a:fld id="{08C0AF01-9055-0547-953E-72B2160BBA35}" type="datetimeFigureOut">
               <a:rPr lang="en-US" smtClean="0"/>
-              <a:t>10/09/14</a:t>
+              <a:t>16/09/14</a:t>
             </a:fld>
             <a:endParaRPr lang="en-US"/>
           </a:p>
@@ -818,7 +818,7 @@
           <a:p>
             <a:fld id="{08C0AF01-9055-0547-953E-72B2160BBA35}" type="datetimeFigureOut">
               <a:rPr lang="en-US" smtClean="0"/>
-              <a:t>10/09/14</a:t>
+              <a:t>16/09/14</a:t>
             </a:fld>
             <a:endParaRPr lang="en-US"/>
           </a:p>
@@ -1064,7 +1064,7 @@
           <a:p>
             <a:fld id="{08C0AF01-9055-0547-953E-72B2160BBA35}" type="datetimeFigureOut">
               <a:rPr lang="en-US" smtClean="0"/>
-              <a:t>10/09/14</a:t>
+              <a:t>16/09/14</a:t>
             </a:fld>
             <a:endParaRPr lang="en-US"/>
           </a:p>
@@ -1352,7 +1352,7 @@
           <a:p>
             <a:fld id="{08C0AF01-9055-0547-953E-72B2160BBA35}" type="datetimeFigureOut">
               <a:rPr lang="en-US" smtClean="0"/>
-              <a:t>10/09/14</a:t>
+              <a:t>16/09/14</a:t>
             </a:fld>
             <a:endParaRPr lang="en-US"/>
           </a:p>
@@ -1774,7 +1774,7 @@
           <a:p>
             <a:fld id="{08C0AF01-9055-0547-953E-72B2160BBA35}" type="datetimeFigureOut">
               <a:rPr lang="en-US" smtClean="0"/>
-              <a:t>10/09/14</a:t>
+              <a:t>16/09/14</a:t>
             </a:fld>
             <a:endParaRPr lang="en-US"/>
           </a:p>
@@ -1892,7 +1892,7 @@
           <a:p>
             <a:fld id="{08C0AF01-9055-0547-953E-72B2160BBA35}" type="datetimeFigureOut">
               <a:rPr lang="en-US" smtClean="0"/>
-              <a:t>10/09/14</a:t>
+              <a:t>16/09/14</a:t>
             </a:fld>
             <a:endParaRPr lang="en-US"/>
           </a:p>
@@ -1987,7 +1987,7 @@
           <a:p>
             <a:fld id="{08C0AF01-9055-0547-953E-72B2160BBA35}" type="datetimeFigureOut">
               <a:rPr lang="en-US" smtClean="0"/>
-              <a:t>10/09/14</a:t>
+              <a:t>16/09/14</a:t>
             </a:fld>
             <a:endParaRPr lang="en-US"/>
           </a:p>
@@ -2264,7 +2264,7 @@
           <a:p>
             <a:fld id="{08C0AF01-9055-0547-953E-72B2160BBA35}" type="datetimeFigureOut">
               <a:rPr lang="en-US" smtClean="0"/>
-              <a:t>10/09/14</a:t>
+              <a:t>16/09/14</a:t>
             </a:fld>
             <a:endParaRPr lang="en-US"/>
           </a:p>
@@ -2517,7 +2517,7 @@
           <a:p>
             <a:fld id="{08C0AF01-9055-0547-953E-72B2160BBA35}" type="datetimeFigureOut">
               <a:rPr lang="en-US" smtClean="0"/>
-              <a:t>10/09/14</a:t>
+              <a:t>16/09/14</a:t>
             </a:fld>
             <a:endParaRPr lang="en-US"/>
           </a:p>
@@ -2730,7 +2730,7 @@
           <a:p>
             <a:fld id="{08C0AF01-9055-0547-953E-72B2160BBA35}" type="datetimeFigureOut">
               <a:rPr lang="en-US" smtClean="0"/>
-              <a:t>10/09/14</a:t>
+              <a:t>16/09/14</a:t>
             </a:fld>
             <a:endParaRPr lang="en-US"/>
           </a:p>
@@ -3116,8 +3116,8 @@
         </p:nvCxnSpPr>
         <p:spPr>
           <a:xfrm flipH="1">
-            <a:off x="4210744" y="2123902"/>
-            <a:ext cx="209677" cy="1064299"/>
+            <a:off x="1507069" y="2123902"/>
+            <a:ext cx="2789054" cy="1081507"/>
           </a:xfrm>
           <a:prstGeom prst="straightConnector1">
             <a:avLst/>
@@ -3149,8 +3149,8 @@
         </p:nvSpPr>
         <p:spPr>
           <a:xfrm>
-            <a:off x="3596911" y="3188201"/>
-            <a:ext cx="1227666" cy="410224"/>
+            <a:off x="973669" y="3205409"/>
+            <a:ext cx="1066800" cy="410224"/>
           </a:xfrm>
           <a:prstGeom prst="roundRect">
             <a:avLst/>
@@ -3197,7 +3197,39 @@
                   <a:srgbClr val="000000"/>
                 </a:solidFill>
               </a:rPr>
-              <a:t>Financial activity -180 days</a:t>
+              <a:t>Variable set </a:t>
+            </a:r>
+            <a:r>
+              <a:rPr lang="en-US" sz="1050" b="1" dirty="0" smtClean="0">
+                <a:solidFill>
+                  <a:srgbClr val="000000"/>
+                </a:solidFill>
+              </a:rPr>
+              <a:t>X</a:t>
+            </a:r>
+            <a:r>
+              <a:rPr lang="en-US" sz="1050" dirty="0" smtClean="0">
+                <a:solidFill>
+                  <a:srgbClr val="000000"/>
+                </a:solidFill>
+              </a:rPr>
+              <a:t> </a:t>
+            </a:r>
+            <a:r>
+              <a:rPr lang="en-US" sz="1050" dirty="0" smtClean="0">
+                <a:solidFill>
+                  <a:srgbClr val="000000"/>
+                </a:solidFill>
+              </a:rPr>
+              <a:t>-</a:t>
+            </a:r>
+            <a:r>
+              <a:rPr lang="en-US" sz="1050" dirty="0" smtClean="0">
+                <a:solidFill>
+                  <a:srgbClr val="000000"/>
+                </a:solidFill>
+              </a:rPr>
+              <a:t>180 days</a:t>
             </a:r>
           </a:p>
           <a:p>
@@ -3218,7 +3250,7 @@
         </p:nvSpPr>
         <p:spPr>
           <a:xfrm>
-            <a:off x="4824577" y="3191812"/>
+            <a:off x="4807643" y="3191812"/>
             <a:ext cx="344039" cy="369332"/>
           </a:xfrm>
           <a:prstGeom prst="rect">
@@ -3248,7 +3280,7 @@
         </p:nvSpPr>
         <p:spPr>
           <a:xfrm>
-            <a:off x="3855398" y="1628649"/>
+            <a:off x="3731100" y="1628649"/>
             <a:ext cx="1130046" cy="495253"/>
           </a:xfrm>
           <a:prstGeom prst="ellipse">
@@ -3306,8 +3338,8 @@
         </p:nvSpPr>
         <p:spPr>
           <a:xfrm>
-            <a:off x="1050463" y="3178141"/>
-            <a:ext cx="922271" cy="420284"/>
+            <a:off x="3767668" y="3209262"/>
+            <a:ext cx="1056910" cy="420284"/>
           </a:xfrm>
           <a:prstGeom prst="roundRect">
             <a:avLst/>
@@ -3346,8 +3378,37 @@
                   <a:srgbClr val="000000"/>
                 </a:solidFill>
               </a:rPr>
-              <a:t>Payments </a:t>
-            </a:r>
+              <a:t>Variable </a:t>
+            </a:r>
+            <a:r>
+              <a:rPr lang="en-US" sz="1050" dirty="0">
+                <a:solidFill>
+                  <a:srgbClr val="000000"/>
+                </a:solidFill>
+              </a:rPr>
+              <a:t>set </a:t>
+            </a:r>
+            <a:r>
+              <a:rPr lang="en-US" sz="1050" b="1" dirty="0" smtClean="0">
+                <a:solidFill>
+                  <a:srgbClr val="000000"/>
+                </a:solidFill>
+              </a:rPr>
+              <a:t>Y</a:t>
+            </a:r>
+            <a:r>
+              <a:rPr lang="en-US" sz="1050" dirty="0" smtClean="0">
+                <a:solidFill>
+                  <a:srgbClr val="000000"/>
+                </a:solidFill>
+              </a:rPr>
+              <a:t> </a:t>
+            </a:r>
+            <a:endParaRPr lang="en-US" sz="1050" dirty="0" smtClean="0">
+              <a:solidFill>
+                <a:srgbClr val="000000"/>
+              </a:solidFill>
+            </a:endParaRPr>
           </a:p>
           <a:p>
             <a:pPr algn="ctr"/>
@@ -3377,9 +3438,9 @@
           <p:nvPr/>
         </p:nvCxnSpPr>
         <p:spPr>
-          <a:xfrm>
-            <a:off x="4420421" y="2123902"/>
-            <a:ext cx="1362028" cy="1051615"/>
+          <a:xfrm flipH="1">
+            <a:off x="2919450" y="2123902"/>
+            <a:ext cx="1376673" cy="1076893"/>
           </a:xfrm>
           <a:prstGeom prst="straightConnector1">
             <a:avLst/>
@@ -3411,8 +3472,8 @@
         </p:nvSpPr>
         <p:spPr>
           <a:xfrm>
-            <a:off x="5168616" y="3175517"/>
-            <a:ext cx="1227666" cy="410224"/>
+            <a:off x="2370664" y="3200795"/>
+            <a:ext cx="1097572" cy="410224"/>
           </a:xfrm>
           <a:prstGeom prst="roundRect">
             <a:avLst/>
@@ -3454,12 +3515,52 @@
           <a:p>
             <a:pPr algn="ctr"/>
             <a:r>
+              <a:rPr lang="en-US" sz="1050" dirty="0">
+                <a:solidFill>
+                  <a:srgbClr val="000000"/>
+                </a:solidFill>
+              </a:rPr>
+              <a:t>Variable set </a:t>
+            </a:r>
+            <a:r>
+              <a:rPr lang="en-US" sz="1050" b="1" dirty="0">
+                <a:solidFill>
+                  <a:srgbClr val="000000"/>
+                </a:solidFill>
+              </a:rPr>
+              <a:t>X</a:t>
+            </a:r>
+            <a:r>
+              <a:rPr lang="en-US" sz="1050" dirty="0">
+                <a:solidFill>
+                  <a:srgbClr val="000000"/>
+                </a:solidFill>
+              </a:rPr>
+              <a:t> </a:t>
+            </a:r>
+            <a:endParaRPr lang="en-US" sz="1050" dirty="0" smtClean="0">
+              <a:solidFill>
+                <a:srgbClr val="000000"/>
+              </a:solidFill>
+            </a:endParaRPr>
+          </a:p>
+          <a:p>
+            <a:pPr algn="ctr"/>
+            <a:r>
               <a:rPr lang="en-US" sz="1050" dirty="0" smtClean="0">
                 <a:solidFill>
                   <a:srgbClr val="000000"/>
                 </a:solidFill>
               </a:rPr>
-              <a:t>Financial activity -1 day</a:t>
+              <a:t> </a:t>
+            </a:r>
+            <a:r>
+              <a:rPr lang="en-US" sz="1050" dirty="0" smtClean="0">
+                <a:solidFill>
+                  <a:srgbClr val="000000"/>
+                </a:solidFill>
+              </a:rPr>
+              <a:t>-1 day</a:t>
             </a:r>
           </a:p>
           <a:p>
@@ -3474,14 +3575,152 @@
       </p:sp>
       <p:sp>
         <p:nvSpPr>
-          <p:cNvPr id="79" name="Rounded Rectangle 5"/>
+          <p:cNvPr id="80" name="TextBox 14"/>
+          <p:cNvSpPr txBox="1"/>
+          <p:nvPr/>
+        </p:nvSpPr>
+        <p:spPr>
+          <a:xfrm>
+            <a:off x="2032003" y="3145866"/>
+            <a:ext cx="344039" cy="369332"/>
+          </a:xfrm>
+          <a:prstGeom prst="rect">
+            <a:avLst/>
+          </a:prstGeom>
+          <a:noFill/>
+        </p:spPr>
+        <p:txBody>
+          <a:bodyPr wrap="none" rtlCol="0">
+            <a:spAutoFit/>
+          </a:bodyPr>
+          <a:lstStyle/>
+          <a:p>
+            <a:r>
+              <a:rPr lang="en-US" dirty="0" smtClean="0"/>
+              <a:t>…</a:t>
+            </a:r>
+            <a:endParaRPr lang="en-US" dirty="0"/>
+          </a:p>
+        </p:txBody>
+      </p:sp>
+      <p:cxnSp>
+        <p:nvCxnSpPr>
+          <p:cNvPr id="85" name="Straight Arrow Connector 4"/>
+          <p:cNvCxnSpPr>
+            <a:stCxn id="4" idx="4"/>
+            <a:endCxn id="84" idx="0"/>
+          </p:cNvCxnSpPr>
+          <p:nvPr/>
+        </p:nvCxnSpPr>
+        <p:spPr>
+          <a:xfrm>
+            <a:off x="4296123" y="2123902"/>
+            <a:ext cx="2731508" cy="1088501"/>
+          </a:xfrm>
+          <a:prstGeom prst="straightConnector1">
+            <a:avLst/>
+          </a:prstGeom>
+          <a:ln>
+            <a:tailEnd type="arrow"/>
+          </a:ln>
+        </p:spPr>
+        <p:style>
+          <a:lnRef idx="2">
+            <a:schemeClr val="accent1"/>
+          </a:lnRef>
+          <a:fillRef idx="0">
+            <a:schemeClr val="accent1"/>
+          </a:fillRef>
+          <a:effectRef idx="1">
+            <a:schemeClr val="accent1"/>
+          </a:effectRef>
+          <a:fontRef idx="minor">
+            <a:schemeClr val="tx1"/>
+          </a:fontRef>
+        </p:style>
+      </p:cxnSp>
+      <p:cxnSp>
+        <p:nvCxnSpPr>
+          <p:cNvPr id="92" name="Straight Arrow Connector 4"/>
+          <p:cNvCxnSpPr>
+            <a:stCxn id="4" idx="4"/>
+            <a:endCxn id="29" idx="0"/>
+          </p:cNvCxnSpPr>
+          <p:nvPr/>
+        </p:nvCxnSpPr>
+        <p:spPr>
+          <a:xfrm>
+            <a:off x="4296123" y="2123902"/>
+            <a:ext cx="1375964" cy="1097363"/>
+          </a:xfrm>
+          <a:prstGeom prst="straightConnector1">
+            <a:avLst/>
+          </a:prstGeom>
+          <a:ln>
+            <a:tailEnd type="arrow"/>
+          </a:ln>
+        </p:spPr>
+        <p:style>
+          <a:lnRef idx="2">
+            <a:schemeClr val="accent1"/>
+          </a:lnRef>
+          <a:fillRef idx="0">
+            <a:schemeClr val="accent1"/>
+          </a:fillRef>
+          <a:effectRef idx="1">
+            <a:schemeClr val="accent1"/>
+          </a:effectRef>
+          <a:fontRef idx="minor">
+            <a:schemeClr val="tx1"/>
+          </a:fontRef>
+        </p:style>
+      </p:cxnSp>
+      <p:cxnSp>
+        <p:nvCxnSpPr>
+          <p:cNvPr id="97" name="Straight Arrow Connector 4"/>
+          <p:cNvCxnSpPr>
+            <a:stCxn id="4" idx="4"/>
+            <a:endCxn id="48" idx="0"/>
+          </p:cNvCxnSpPr>
+          <p:nvPr/>
+        </p:nvCxnSpPr>
+        <p:spPr>
+          <a:xfrm>
+            <a:off x="4296123" y="2123902"/>
+            <a:ext cx="0" cy="1085360"/>
+          </a:xfrm>
+          <a:prstGeom prst="straightConnector1">
+            <a:avLst/>
+          </a:prstGeom>
+          <a:ln>
+            <a:tailEnd type="arrow"/>
+          </a:ln>
+        </p:spPr>
+        <p:style>
+          <a:lnRef idx="2">
+            <a:schemeClr val="accent1"/>
+          </a:lnRef>
+          <a:fillRef idx="0">
+            <a:schemeClr val="accent1"/>
+          </a:fillRef>
+          <a:effectRef idx="1">
+            <a:schemeClr val="accent1"/>
+          </a:effectRef>
+          <a:fontRef idx="minor">
+            <a:schemeClr val="tx1"/>
+          </a:fontRef>
+        </p:style>
+      </p:cxnSp>
+      <p:sp>
+        <p:nvSpPr>
+          <p:cNvPr id="29" name="Rounded Rectangle 5"/>
           <p:cNvSpPr/>
           <p:nvPr/>
         </p:nvSpPr>
         <p:spPr>
           <a:xfrm>
-            <a:off x="2303529" y="3175517"/>
-            <a:ext cx="905337" cy="420284"/>
+            <a:off x="5143632" y="3221265"/>
+            <a:ext cx="1056910" cy="420284"/>
           </a:xfrm>
           <a:prstGeom prst="roundRect">
             <a:avLst/>
@@ -3520,8 +3759,37 @@
                   <a:srgbClr val="000000"/>
                 </a:solidFill>
               </a:rPr>
-              <a:t>Payments </a:t>
-            </a:r>
+              <a:t>Variable </a:t>
+            </a:r>
+            <a:r>
+              <a:rPr lang="en-US" sz="1050" dirty="0">
+                <a:solidFill>
+                  <a:srgbClr val="000000"/>
+                </a:solidFill>
+              </a:rPr>
+              <a:t>set </a:t>
+            </a:r>
+            <a:r>
+              <a:rPr lang="en-US" sz="1050" b="1" dirty="0" smtClean="0">
+                <a:solidFill>
+                  <a:srgbClr val="000000"/>
+                </a:solidFill>
+              </a:rPr>
+              <a:t>Y</a:t>
+            </a:r>
+            <a:r>
+              <a:rPr lang="en-US" sz="1050" dirty="0" smtClean="0">
+                <a:solidFill>
+                  <a:srgbClr val="000000"/>
+                </a:solidFill>
+              </a:rPr>
+              <a:t> </a:t>
+            </a:r>
+            <a:endParaRPr lang="en-US" sz="1050" dirty="0" smtClean="0">
+              <a:solidFill>
+                <a:srgbClr val="000000"/>
+              </a:solidFill>
+            </a:endParaRPr>
           </a:p>
           <a:p>
             <a:pPr algn="ctr"/>
@@ -3543,43 +3811,13 @@
       </p:sp>
       <p:sp>
         <p:nvSpPr>
-          <p:cNvPr id="80" name="TextBox 14"/>
-          <p:cNvSpPr txBox="1"/>
-          <p:nvPr/>
-        </p:nvSpPr>
-        <p:spPr>
-          <a:xfrm>
-            <a:off x="1972734" y="3188201"/>
-            <a:ext cx="344039" cy="369332"/>
-          </a:xfrm>
-          <a:prstGeom prst="rect">
-            <a:avLst/>
-          </a:prstGeom>
-          <a:noFill/>
-        </p:spPr>
-        <p:txBody>
-          <a:bodyPr wrap="none" rtlCol="0">
-            <a:spAutoFit/>
-          </a:bodyPr>
-          <a:lstStyle/>
-          <a:p>
-            <a:r>
-              <a:rPr lang="en-US" dirty="0" smtClean="0"/>
-              <a:t>…</a:t>
-            </a:r>
-            <a:endParaRPr lang="en-US" dirty="0"/>
-          </a:p>
-        </p:txBody>
-      </p:sp>
-      <p:sp>
-        <p:nvSpPr>
           <p:cNvPr id="84" name="Rounded Rectangle 5"/>
           <p:cNvSpPr/>
           <p:nvPr/>
         </p:nvSpPr>
         <p:spPr>
           <a:xfrm>
-            <a:off x="6782395" y="3178141"/>
+            <a:off x="6409862" y="3212403"/>
             <a:ext cx="1235538" cy="420284"/>
           </a:xfrm>
           <a:prstGeom prst="roundRect">
@@ -3619,119 +3857,24 @@
                   <a:srgbClr val="000000"/>
                 </a:solidFill>
               </a:rPr>
-              <a:t>Sociodemography</a:t>
-            </a:r>
-          </a:p>
-        </p:txBody>
-      </p:sp>
-      <p:cxnSp>
-        <p:nvCxnSpPr>
-          <p:cNvPr id="85" name="Straight Arrow Connector 4"/>
-          <p:cNvCxnSpPr>
-            <a:stCxn id="4" idx="4"/>
-            <a:endCxn id="84" idx="0"/>
-          </p:cNvCxnSpPr>
-          <p:nvPr/>
-        </p:nvCxnSpPr>
-        <p:spPr>
-          <a:xfrm>
-            <a:off x="4420421" y="2123902"/>
-            <a:ext cx="2979743" cy="1054239"/>
-          </a:xfrm>
-          <a:prstGeom prst="straightConnector1">
-            <a:avLst/>
-          </a:prstGeom>
-          <a:ln>
-            <a:tailEnd type="arrow"/>
-          </a:ln>
-        </p:spPr>
-        <p:style>
-          <a:lnRef idx="2">
-            <a:schemeClr val="accent1"/>
-          </a:lnRef>
-          <a:fillRef idx="0">
-            <a:schemeClr val="accent1"/>
-          </a:fillRef>
-          <a:effectRef idx="1">
-            <a:schemeClr val="accent1"/>
-          </a:effectRef>
-          <a:fontRef idx="minor">
-            <a:schemeClr val="tx1"/>
-          </a:fontRef>
-        </p:style>
-      </p:cxnSp>
-      <p:cxnSp>
-        <p:nvCxnSpPr>
-          <p:cNvPr id="92" name="Straight Arrow Connector 4"/>
-          <p:cNvCxnSpPr>
-            <a:stCxn id="4" idx="4"/>
-            <a:endCxn id="79" idx="0"/>
-          </p:cNvCxnSpPr>
-          <p:nvPr/>
-        </p:nvCxnSpPr>
-        <p:spPr>
-          <a:xfrm flipH="1">
-            <a:off x="2756198" y="2123902"/>
-            <a:ext cx="1664223" cy="1051615"/>
-          </a:xfrm>
-          <a:prstGeom prst="straightConnector1">
-            <a:avLst/>
-          </a:prstGeom>
-          <a:ln>
-            <a:tailEnd type="arrow"/>
-          </a:ln>
-        </p:spPr>
-        <p:style>
-          <a:lnRef idx="2">
-            <a:schemeClr val="accent1"/>
-          </a:lnRef>
-          <a:fillRef idx="0">
-            <a:schemeClr val="accent1"/>
-          </a:fillRef>
-          <a:effectRef idx="1">
-            <a:schemeClr val="accent1"/>
-          </a:effectRef>
-          <a:fontRef idx="minor">
-            <a:schemeClr val="tx1"/>
-          </a:fontRef>
-        </p:style>
-      </p:cxnSp>
-      <p:cxnSp>
-        <p:nvCxnSpPr>
-          <p:cNvPr id="97" name="Straight Arrow Connector 4"/>
-          <p:cNvCxnSpPr>
-            <a:stCxn id="4" idx="4"/>
-            <a:endCxn id="48" idx="0"/>
-          </p:cNvCxnSpPr>
-          <p:nvPr/>
-        </p:nvCxnSpPr>
-        <p:spPr>
-          <a:xfrm flipH="1">
-            <a:off x="1511599" y="2123902"/>
-            <a:ext cx="2908822" cy="1054239"/>
-          </a:xfrm>
-          <a:prstGeom prst="straightConnector1">
-            <a:avLst/>
-          </a:prstGeom>
-          <a:ln>
-            <a:tailEnd type="arrow"/>
-          </a:ln>
-        </p:spPr>
-        <p:style>
-          <a:lnRef idx="2">
-            <a:schemeClr val="accent1"/>
-          </a:lnRef>
-          <a:fillRef idx="0">
-            <a:schemeClr val="accent1"/>
-          </a:fillRef>
-          <a:effectRef idx="1">
-            <a:schemeClr val="accent1"/>
-          </a:effectRef>
-          <a:fontRef idx="minor">
-            <a:schemeClr val="tx1"/>
-          </a:fontRef>
-        </p:style>
-      </p:cxnSp>
+              <a:t>Variable set </a:t>
+            </a:r>
+            <a:r>
+              <a:rPr lang="en-US" sz="1050" b="1" dirty="0" smtClean="0">
+                <a:solidFill>
+                  <a:srgbClr val="000000"/>
+                </a:solidFill>
+              </a:rPr>
+              <a:t>Z</a:t>
+            </a:r>
+            <a:endParaRPr lang="en-US" sz="1050" b="1" dirty="0" smtClean="0">
+              <a:solidFill>
+                <a:srgbClr val="000000"/>
+              </a:solidFill>
+            </a:endParaRPr>
+          </a:p>
+        </p:txBody>
+      </p:sp>
     </p:spTree>
     <p:extLst>
       <p:ext uri="{BB962C8B-B14F-4D97-AF65-F5344CB8AC3E}">
@@ -4133,8 +4276,8 @@
         </p:nvCxnSpPr>
         <p:spPr>
           <a:xfrm flipV="1">
-            <a:off x="973667" y="3513667"/>
-            <a:ext cx="8136469" cy="36000"/>
+            <a:off x="457200" y="3513667"/>
+            <a:ext cx="7543800" cy="36000"/>
           </a:xfrm>
           <a:prstGeom prst="straightConnector1">
             <a:avLst/>
@@ -4197,7 +4340,7 @@
         </p:nvCxnSpPr>
         <p:spPr>
           <a:xfrm>
-            <a:off x="2760131" y="3454398"/>
+            <a:off x="3869265" y="3437465"/>
             <a:ext cx="2" cy="194732"/>
           </a:xfrm>
           <a:prstGeom prst="line">
@@ -4227,8 +4370,8 @@
         </p:nvSpPr>
         <p:spPr>
           <a:xfrm rot="5400000">
-            <a:off x="4140198" y="1312334"/>
-            <a:ext cx="414869" cy="3175002"/>
+            <a:off x="4800599" y="1964272"/>
+            <a:ext cx="203198" cy="2065866"/>
           </a:xfrm>
           <a:prstGeom prst="leftBrace">
             <a:avLst/>
@@ -4259,7 +4402,11 @@
           <a:lstStyle/>
           <a:p>
             <a:pPr algn="ctr"/>
-            <a:endParaRPr lang="en-US"/>
+            <a:r>
+              <a:rPr lang="en-US" dirty="0" smtClean="0"/>
+              <a:t> </a:t>
+            </a:r>
+            <a:endParaRPr lang="en-US" dirty="0"/>
           </a:p>
         </p:txBody>
       </p:sp>
@@ -4271,7 +4418,7 @@
         </p:nvSpPr>
         <p:spPr>
           <a:xfrm>
-            <a:off x="3600745" y="2180339"/>
+            <a:off x="4168012" y="2230735"/>
             <a:ext cx="1499028" cy="461665"/>
           </a:xfrm>
           <a:prstGeom prst="rect">
@@ -4315,58 +4462,14 @@
       </p:sp>
       <p:sp>
         <p:nvSpPr>
-          <p:cNvPr id="15" name="Left Brace 14"/>
-          <p:cNvSpPr/>
-          <p:nvPr/>
-        </p:nvSpPr>
-        <p:spPr>
-          <a:xfrm rot="5400000">
-            <a:off x="1786465" y="2133603"/>
-            <a:ext cx="414869" cy="1532464"/>
-          </a:xfrm>
-          <a:prstGeom prst="leftBrace">
-            <a:avLst/>
-          </a:prstGeom>
-          <a:noFill/>
-          <a:ln>
-            <a:solidFill>
-              <a:schemeClr val="accent2"/>
-            </a:solidFill>
-          </a:ln>
-        </p:spPr>
-        <p:style>
-          <a:lnRef idx="2">
-            <a:schemeClr val="accent1"/>
-          </a:lnRef>
-          <a:fillRef idx="0">
-            <a:schemeClr val="accent1"/>
-          </a:fillRef>
-          <a:effectRef idx="1">
-            <a:schemeClr val="accent1"/>
-          </a:effectRef>
-          <a:fontRef idx="minor">
-            <a:schemeClr val="tx1"/>
-          </a:fontRef>
-        </p:style>
-        <p:txBody>
-          <a:bodyPr rtlCol="0" anchor="ctr"/>
-          <a:lstStyle/>
-          <a:p>
-            <a:pPr algn="ctr"/>
-            <a:endParaRPr lang="en-US"/>
-          </a:p>
-        </p:txBody>
-      </p:sp>
-      <p:sp>
-        <p:nvSpPr>
           <p:cNvPr id="16" name="TextBox 15"/>
           <p:cNvSpPr txBox="1"/>
           <p:nvPr/>
         </p:nvSpPr>
         <p:spPr>
           <a:xfrm>
-            <a:off x="1307677" y="1927940"/>
-            <a:ext cx="1406680" cy="646331"/>
+            <a:off x="3013504" y="1776915"/>
+            <a:ext cx="1154508" cy="646331"/>
           </a:xfrm>
           <a:prstGeom prst="rect">
             <a:avLst/>
@@ -4388,20 +4491,67 @@
                   </a:schemeClr>
                 </a:solidFill>
               </a:rPr>
-              <a:t>Financial activity </a:t>
-            </a:r>
-          </a:p>
-          <a:p>
-            <a:pPr algn="ctr"/>
-            <a:r>
-              <a:rPr lang="en-US" sz="1200" dirty="0" smtClean="0">
+              <a:t>Variable set </a:t>
+            </a:r>
+            <a:r>
+              <a:rPr lang="en-US" sz="1200" b="1" dirty="0" smtClean="0">
                 <a:solidFill>
                   <a:schemeClr val="accent2">
                     <a:lumMod val="75000"/>
                   </a:schemeClr>
                 </a:solidFill>
               </a:rPr>
-              <a:t>Payment behaviour </a:t>
+              <a:t>X</a:t>
+            </a:r>
+            <a:endParaRPr lang="en-US" sz="1200" b="1" dirty="0" smtClean="0">
+              <a:solidFill>
+                <a:schemeClr val="accent2">
+                  <a:lumMod val="75000"/>
+                </a:schemeClr>
+              </a:solidFill>
+            </a:endParaRPr>
+          </a:p>
+          <a:p>
+            <a:pPr algn="ctr"/>
+            <a:r>
+              <a:rPr lang="en-US" sz="1200" i="1" dirty="0">
+                <a:solidFill>
+                  <a:schemeClr val="accent2">
+                    <a:lumMod val="75000"/>
+                  </a:schemeClr>
+                </a:solidFill>
+              </a:rPr>
+              <a:t>k</a:t>
+            </a:r>
+            <a:r>
+              <a:rPr lang="en-US" sz="1200" i="1" dirty="0" smtClean="0">
+                <a:solidFill>
+                  <a:schemeClr val="accent2">
+                    <a:lumMod val="75000"/>
+                  </a:schemeClr>
+                </a:solidFill>
+              </a:rPr>
+              <a:t> – 180 days</a:t>
+            </a:r>
+            <a:endParaRPr lang="en-US" sz="1200" i="1" dirty="0">
+              <a:solidFill>
+                <a:schemeClr val="accent2">
+                  <a:lumMod val="75000"/>
+                </a:schemeClr>
+              </a:solidFill>
+            </a:endParaRPr>
+          </a:p>
+          <a:p>
+            <a:pPr algn="ctr"/>
+            <a:r>
+              <a:rPr lang="en-US" sz="1200" dirty="0" smtClean="0">
+                <a:solidFill>
+                  <a:schemeClr val="accent2">
+                    <a:lumMod val="75000"/>
+                  </a:schemeClr>
+                </a:solidFill>
+              </a:rPr>
+              <a:t>(TRAINING SET) </a:t>
             </a:r>
             <a:endParaRPr lang="en-US" sz="1200" dirty="0">
               <a:solidFill>
@@ -4411,70 +4561,6 @@
               </a:solidFill>
             </a:endParaRPr>
           </a:p>
-          <a:p>
-            <a:pPr algn="ctr"/>
-            <a:r>
-              <a:rPr lang="en-US" sz="1200" dirty="0" smtClean="0">
-                <a:solidFill>
-                  <a:schemeClr val="accent2">
-                    <a:lumMod val="75000"/>
-                  </a:schemeClr>
-                </a:solidFill>
-              </a:rPr>
-              <a:t>(TRAINING SET) </a:t>
-            </a:r>
-            <a:endParaRPr lang="en-US" sz="1200" dirty="0">
-              <a:solidFill>
-                <a:schemeClr val="accent2">
-                  <a:lumMod val="75000"/>
-                </a:schemeClr>
-              </a:solidFill>
-            </a:endParaRPr>
-          </a:p>
-        </p:txBody>
-      </p:sp>
-      <p:sp>
-        <p:nvSpPr>
-          <p:cNvPr id="17" name="Left Brace 16"/>
-          <p:cNvSpPr/>
-          <p:nvPr/>
-        </p:nvSpPr>
-        <p:spPr>
-          <a:xfrm rot="16200000">
-            <a:off x="4961467" y="3522145"/>
-            <a:ext cx="414869" cy="1532464"/>
-          </a:xfrm>
-          <a:prstGeom prst="leftBrace">
-            <a:avLst/>
-          </a:prstGeom>
-          <a:noFill/>
-          <a:ln>
-            <a:solidFill>
-              <a:schemeClr val="accent3"/>
-            </a:solidFill>
-          </a:ln>
-        </p:spPr>
-        <p:style>
-          <a:lnRef idx="2">
-            <a:schemeClr val="accent1"/>
-          </a:lnRef>
-          <a:fillRef idx="0">
-            <a:schemeClr val="accent1"/>
-          </a:fillRef>
-          <a:effectRef idx="1">
-            <a:schemeClr val="accent1"/>
-          </a:effectRef>
-          <a:fontRef idx="minor">
-            <a:schemeClr val="tx1"/>
-          </a:fontRef>
-        </p:style>
-        <p:txBody>
-          <a:bodyPr rtlCol="0" anchor="ctr"/>
-          <a:lstStyle/>
-          <a:p>
-            <a:pPr algn="ctr"/>
-            <a:endParaRPr lang="en-US"/>
-          </a:p>
         </p:txBody>
       </p:sp>
       <p:sp>
@@ -4485,8 +4571,8 @@
         </p:nvSpPr>
         <p:spPr>
           <a:xfrm>
-            <a:off x="4471579" y="4522236"/>
-            <a:ext cx="1406680" cy="646331"/>
+            <a:off x="4985531" y="4822469"/>
+            <a:ext cx="1387369" cy="646331"/>
           </a:xfrm>
           <a:prstGeom prst="rect">
             <a:avLst/>
@@ -4506,19 +4592,40 @@
                   <a:srgbClr val="008000"/>
                 </a:solidFill>
               </a:rPr>
-              <a:t>Financial activity</a:t>
+              <a:t>Variable set </a:t>
+            </a:r>
+            <a:r>
+              <a:rPr lang="en-US" sz="1200" b="1" dirty="0" smtClean="0">
+                <a:solidFill>
+                  <a:srgbClr val="008000"/>
+                </a:solidFill>
+              </a:rPr>
+              <a:t>X </a:t>
             </a:r>
           </a:p>
           <a:p>
             <a:pPr algn="ctr"/>
             <a:r>
-              <a:rPr lang="en-US" sz="1200" dirty="0" smtClean="0">
+              <a:rPr lang="en-US" sz="1200" i="1" dirty="0" smtClean="0">
                 <a:solidFill>
                   <a:srgbClr val="008000"/>
                 </a:solidFill>
               </a:rPr>
-              <a:t>Payment behaviour</a:t>
-            </a:r>
+              <a:t>t - </a:t>
+            </a:r>
+            <a:r>
+              <a:rPr lang="en-US" sz="1200" i="1" dirty="0" smtClean="0">
+                <a:solidFill>
+                  <a:srgbClr val="008000"/>
+                </a:solidFill>
+              </a:rPr>
+              <a:t>180 days</a:t>
+            </a:r>
+            <a:endParaRPr lang="en-US" sz="1200" i="1" dirty="0" smtClean="0">
+              <a:solidFill>
+                <a:srgbClr val="008000"/>
+              </a:solidFill>
+            </a:endParaRPr>
           </a:p>
           <a:p>
             <a:pPr algn="ctr"/>
@@ -4592,7 +4699,7 @@
         </p:nvSpPr>
         <p:spPr>
           <a:xfrm>
-            <a:off x="2406815" y="3615262"/>
+            <a:off x="3498016" y="3632197"/>
             <a:ext cx="742498" cy="369332"/>
           </a:xfrm>
           <a:prstGeom prst="rect">
@@ -4638,7 +4745,7 @@
         </p:nvSpPr>
         <p:spPr>
           <a:xfrm>
-            <a:off x="3954559" y="3093529"/>
+            <a:off x="4437159" y="3068133"/>
             <a:ext cx="854508" cy="369332"/>
           </a:xfrm>
           <a:prstGeom prst="rect">
@@ -4671,15 +4778,13 @@
       <p:cxnSp>
         <p:nvCxnSpPr>
           <p:cNvPr id="25" name="Straight Arrow Connector 24"/>
-          <p:cNvCxnSpPr>
-            <a:stCxn id="23" idx="3"/>
-          </p:cNvCxnSpPr>
+          <p:cNvCxnSpPr/>
           <p:nvPr/>
         </p:nvCxnSpPr>
         <p:spPr>
           <a:xfrm>
-            <a:off x="4809067" y="3278195"/>
-            <a:ext cx="1126067" cy="0"/>
+            <a:off x="5291667" y="3278199"/>
+            <a:ext cx="643467" cy="8463"/>
           </a:xfrm>
           <a:prstGeom prst="straightConnector1">
             <a:avLst/>
@@ -4706,15 +4811,13 @@
       <p:cxnSp>
         <p:nvCxnSpPr>
           <p:cNvPr id="29" name="Straight Arrow Connector 28"/>
-          <p:cNvCxnSpPr>
-            <a:stCxn id="23" idx="1"/>
-          </p:cNvCxnSpPr>
+          <p:cNvCxnSpPr/>
           <p:nvPr/>
         </p:nvCxnSpPr>
         <p:spPr>
-          <a:xfrm flipH="1">
-            <a:off x="2760131" y="3278195"/>
-            <a:ext cx="1194428" cy="13741"/>
+          <a:xfrm flipH="1" flipV="1">
+            <a:off x="3869265" y="3269732"/>
+            <a:ext cx="567894" cy="8468"/>
           </a:xfrm>
           <a:prstGeom prst="straightConnector1">
             <a:avLst/>
@@ -4746,8 +4849,8 @@
         </p:nvSpPr>
         <p:spPr>
           <a:xfrm rot="16200000">
-            <a:off x="7320213" y="2707499"/>
-            <a:ext cx="414869" cy="3164979"/>
+            <a:off x="6859601" y="3071792"/>
+            <a:ext cx="216931" cy="2065870"/>
           </a:xfrm>
           <a:prstGeom prst="leftBrace">
             <a:avLst/>
@@ -4790,7 +4893,7 @@
         </p:nvSpPr>
         <p:spPr>
           <a:xfrm>
-            <a:off x="6461185" y="4527737"/>
+            <a:off x="5962092" y="4264273"/>
             <a:ext cx="2121093" cy="461665"/>
           </a:xfrm>
           <a:prstGeom prst="rect">
@@ -4832,15 +4935,215 @@
           </a:p>
         </p:txBody>
       </p:sp>
-      <p:sp>
-        <p:nvSpPr>
-          <p:cNvPr id="39" name="TextBox 38"/>
+      <p:cxnSp>
+        <p:nvCxnSpPr>
+          <p:cNvPr id="43" name="Straight Connector 42"/>
+          <p:cNvCxnSpPr/>
+          <p:nvPr/>
+        </p:nvCxnSpPr>
+        <p:spPr>
+          <a:xfrm>
+            <a:off x="8001000" y="3416301"/>
+            <a:ext cx="0" cy="194732"/>
+          </a:xfrm>
+          <a:prstGeom prst="line">
+            <a:avLst/>
+          </a:prstGeom>
+        </p:spPr>
+        <p:style>
+          <a:lnRef idx="2">
+            <a:schemeClr val="accent1"/>
+          </a:lnRef>
+          <a:fillRef idx="0">
+            <a:schemeClr val="accent1"/>
+          </a:fillRef>
+          <a:effectRef idx="1">
+            <a:schemeClr val="accent1"/>
+          </a:effectRef>
+          <a:fontRef idx="minor">
+            <a:schemeClr val="tx1"/>
+          </a:fontRef>
+        </p:style>
+      </p:cxnSp>
+      <p:sp>
+        <p:nvSpPr>
+          <p:cNvPr id="24" name="Left Brace 16"/>
+          <p:cNvSpPr/>
+          <p:nvPr/>
+        </p:nvSpPr>
+        <p:spPr>
+          <a:xfrm rot="16200000">
+            <a:off x="4298952" y="2755402"/>
+            <a:ext cx="207434" cy="3064937"/>
+          </a:xfrm>
+          <a:prstGeom prst="leftBrace">
+            <a:avLst/>
+          </a:prstGeom>
+          <a:noFill/>
+          <a:ln>
+            <a:solidFill>
+              <a:schemeClr val="accent3"/>
+            </a:solidFill>
+          </a:ln>
+        </p:spPr>
+        <p:style>
+          <a:lnRef idx="2">
+            <a:schemeClr val="accent1"/>
+          </a:lnRef>
+          <a:fillRef idx="0">
+            <a:schemeClr val="accent1"/>
+          </a:fillRef>
+          <a:effectRef idx="1">
+            <a:schemeClr val="accent1"/>
+          </a:effectRef>
+          <a:fontRef idx="minor">
+            <a:schemeClr val="tx1"/>
+          </a:fontRef>
+        </p:style>
+        <p:txBody>
+          <a:bodyPr rtlCol="0" anchor="ctr"/>
+          <a:lstStyle/>
+          <a:p>
+            <a:pPr algn="ctr"/>
+            <a:endParaRPr lang="en-US"/>
+          </a:p>
+        </p:txBody>
+      </p:sp>
+      <p:sp>
+        <p:nvSpPr>
+          <p:cNvPr id="27" name="Left Brace 16"/>
+          <p:cNvSpPr/>
+          <p:nvPr/>
+        </p:nvSpPr>
+        <p:spPr>
+          <a:xfrm rot="16200000">
+            <a:off x="5574902" y="4444674"/>
+            <a:ext cx="205556" cy="568824"/>
+          </a:xfrm>
+          <a:prstGeom prst="leftBrace">
+            <a:avLst/>
+          </a:prstGeom>
+          <a:noFill/>
+          <a:ln>
+            <a:solidFill>
+              <a:schemeClr val="accent3"/>
+            </a:solidFill>
+          </a:ln>
+        </p:spPr>
+        <p:style>
+          <a:lnRef idx="2">
+            <a:schemeClr val="accent1"/>
+          </a:lnRef>
+          <a:fillRef idx="0">
+            <a:schemeClr val="accent1"/>
+          </a:fillRef>
+          <a:effectRef idx="1">
+            <a:schemeClr val="accent1"/>
+          </a:effectRef>
+          <a:fontRef idx="minor">
+            <a:schemeClr val="tx1"/>
+          </a:fontRef>
+        </p:style>
+        <p:txBody>
+          <a:bodyPr rtlCol="0" anchor="ctr"/>
+          <a:lstStyle/>
+          <a:p>
+            <a:pPr algn="ctr"/>
+            <a:endParaRPr lang="en-US"/>
+          </a:p>
+        </p:txBody>
+      </p:sp>
+      <p:sp>
+        <p:nvSpPr>
+          <p:cNvPr id="28" name="TextBox 17"/>
           <p:cNvSpPr txBox="1"/>
           <p:nvPr/>
         </p:nvSpPr>
         <p:spPr>
           <a:xfrm>
-            <a:off x="7129561" y="3085066"/>
+            <a:off x="3691831" y="4381693"/>
+            <a:ext cx="1405202" cy="646331"/>
+          </a:xfrm>
+          <a:prstGeom prst="rect">
+            <a:avLst/>
+          </a:prstGeom>
+          <a:noFill/>
+        </p:spPr>
+        <p:txBody>
+          <a:bodyPr wrap="none" rtlCol="0">
+            <a:spAutoFit/>
+          </a:bodyPr>
+          <a:lstStyle/>
+          <a:p>
+            <a:pPr algn="ctr"/>
+            <a:r>
+              <a:rPr lang="en-US" sz="1200" dirty="0" smtClean="0">
+                <a:solidFill>
+                  <a:srgbClr val="008000"/>
+                </a:solidFill>
+              </a:rPr>
+              <a:t>Variable set </a:t>
+            </a:r>
+            <a:r>
+              <a:rPr lang="en-US" sz="1200" b="1" dirty="0">
+                <a:solidFill>
+                  <a:srgbClr val="008000"/>
+                </a:solidFill>
+              </a:rPr>
+              <a:t>Y</a:t>
+            </a:r>
+            <a:r>
+              <a:rPr lang="en-US" sz="1200" b="1" dirty="0" smtClean="0">
+                <a:solidFill>
+                  <a:srgbClr val="008000"/>
+                </a:solidFill>
+              </a:rPr>
+              <a:t> </a:t>
+            </a:r>
+          </a:p>
+          <a:p>
+            <a:pPr algn="ctr"/>
+            <a:r>
+              <a:rPr lang="en-US" sz="1200" i="1" dirty="0" smtClean="0">
+                <a:solidFill>
+                  <a:srgbClr val="008000"/>
+                </a:solidFill>
+              </a:rPr>
+              <a:t> t – 6 semesters</a:t>
+            </a:r>
+            <a:endParaRPr lang="en-US" sz="1200" i="1" dirty="0" smtClean="0">
+              <a:solidFill>
+                <a:srgbClr val="008000"/>
+              </a:solidFill>
+            </a:endParaRPr>
+          </a:p>
+          <a:p>
+            <a:pPr algn="ctr"/>
+            <a:r>
+              <a:rPr lang="en-US" sz="1200" dirty="0" smtClean="0">
+                <a:solidFill>
+                  <a:srgbClr val="008000"/>
+                </a:solidFill>
+              </a:rPr>
+              <a:t> (EVALUATION SET) </a:t>
+            </a:r>
+            <a:endParaRPr lang="en-US" sz="1200" dirty="0">
+              <a:solidFill>
+                <a:srgbClr val="008000"/>
+              </a:solidFill>
+            </a:endParaRPr>
+          </a:p>
+        </p:txBody>
+      </p:sp>
+      <p:sp>
+        <p:nvSpPr>
+          <p:cNvPr id="32" name="TextBox 22"/>
+          <p:cNvSpPr txBox="1"/>
+          <p:nvPr/>
+        </p:nvSpPr>
+        <p:spPr>
+          <a:xfrm>
+            <a:off x="6503025" y="3090902"/>
             <a:ext cx="854508" cy="369332"/>
           </a:xfrm>
           <a:prstGeom prst="rect">
@@ -4872,16 +5175,14 @@
       </p:sp>
       <p:cxnSp>
         <p:nvCxnSpPr>
-          <p:cNvPr id="40" name="Straight Arrow Connector 39"/>
-          <p:cNvCxnSpPr>
-            <a:stCxn id="39" idx="3"/>
-          </p:cNvCxnSpPr>
+          <p:cNvPr id="33" name="Straight Arrow Connector 24"/>
+          <p:cNvCxnSpPr/>
           <p:nvPr/>
         </p:nvCxnSpPr>
         <p:spPr>
           <a:xfrm>
-            <a:off x="7984069" y="3269732"/>
-            <a:ext cx="1126067" cy="0"/>
+            <a:off x="7357533" y="3300968"/>
+            <a:ext cx="643467" cy="1"/>
           </a:xfrm>
           <a:prstGeom prst="straightConnector1">
             <a:avLst/>
@@ -4907,16 +5208,14 @@
       </p:cxnSp>
       <p:cxnSp>
         <p:nvCxnSpPr>
-          <p:cNvPr id="41" name="Straight Arrow Connector 40"/>
-          <p:cNvCxnSpPr>
-            <a:stCxn id="39" idx="1"/>
-          </p:cNvCxnSpPr>
+          <p:cNvPr id="44" name="Straight Arrow Connector 28"/>
+          <p:cNvCxnSpPr/>
           <p:nvPr/>
         </p:nvCxnSpPr>
         <p:spPr>
-          <a:xfrm flipH="1">
-            <a:off x="5935133" y="3269732"/>
-            <a:ext cx="1194428" cy="13741"/>
+          <a:xfrm flipH="1" flipV="1">
+            <a:off x="5935138" y="3294103"/>
+            <a:ext cx="567894" cy="0"/>
           </a:xfrm>
           <a:prstGeom prst="straightConnector1">
             <a:avLst/>
@@ -4940,20 +5239,26 @@
           </a:fontRef>
         </p:style>
       </p:cxnSp>
-      <p:cxnSp>
-        <p:nvCxnSpPr>
-          <p:cNvPr id="43" name="Straight Connector 42"/>
-          <p:cNvCxnSpPr/>
-          <p:nvPr/>
-        </p:nvCxnSpPr>
-        <p:spPr>
-          <a:xfrm>
-            <a:off x="9110136" y="3420530"/>
-            <a:ext cx="0" cy="194732"/>
-          </a:xfrm>
-          <a:prstGeom prst="line">
-            <a:avLst/>
-          </a:prstGeom>
+      <p:sp>
+        <p:nvSpPr>
+          <p:cNvPr id="45" name="Left Brace 9"/>
+          <p:cNvSpPr/>
+          <p:nvPr/>
+        </p:nvSpPr>
+        <p:spPr>
+          <a:xfrm rot="5400000">
+            <a:off x="3483253" y="2204794"/>
+            <a:ext cx="203200" cy="568824"/>
+          </a:xfrm>
+          <a:prstGeom prst="leftBrace">
+            <a:avLst/>
+          </a:prstGeom>
+          <a:noFill/>
+          <a:ln>
+            <a:solidFill>
+              <a:schemeClr val="accent2"/>
+            </a:solidFill>
+          </a:ln>
         </p:spPr>
         <p:style>
           <a:lnRef idx="2">
@@ -4969,7 +5274,170 @@
             <a:schemeClr val="tx1"/>
           </a:fontRef>
         </p:style>
-      </p:cxnSp>
+        <p:txBody>
+          <a:bodyPr rtlCol="0" anchor="ctr"/>
+          <a:lstStyle/>
+          <a:p>
+            <a:pPr algn="ctr"/>
+            <a:r>
+              <a:rPr lang="en-US" dirty="0" smtClean="0"/>
+              <a:t> </a:t>
+            </a:r>
+            <a:endParaRPr lang="en-US" dirty="0"/>
+          </a:p>
+        </p:txBody>
+      </p:sp>
+      <p:sp>
+        <p:nvSpPr>
+          <p:cNvPr id="46" name="Left Brace 9"/>
+          <p:cNvSpPr/>
+          <p:nvPr/>
+        </p:nvSpPr>
+        <p:spPr>
+          <a:xfrm rot="5400000">
+            <a:off x="2202151" y="1228492"/>
+            <a:ext cx="242334" cy="3091893"/>
+          </a:xfrm>
+          <a:prstGeom prst="leftBrace">
+            <a:avLst/>
+          </a:prstGeom>
+          <a:noFill/>
+          <a:ln>
+            <a:solidFill>
+              <a:schemeClr val="accent2"/>
+            </a:solidFill>
+          </a:ln>
+        </p:spPr>
+        <p:style>
+          <a:lnRef idx="2">
+            <a:schemeClr val="accent1"/>
+          </a:lnRef>
+          <a:fillRef idx="0">
+            <a:schemeClr val="accent1"/>
+          </a:fillRef>
+          <a:effectRef idx="1">
+            <a:schemeClr val="accent1"/>
+          </a:effectRef>
+          <a:fontRef idx="minor">
+            <a:schemeClr val="tx1"/>
+          </a:fontRef>
+        </p:style>
+        <p:txBody>
+          <a:bodyPr rtlCol="0" anchor="ctr"/>
+          <a:lstStyle/>
+          <a:p>
+            <a:pPr algn="ctr"/>
+            <a:r>
+              <a:rPr lang="en-US" dirty="0" smtClean="0"/>
+              <a:t> </a:t>
+            </a:r>
+            <a:endParaRPr lang="en-US" dirty="0"/>
+          </a:p>
+        </p:txBody>
+      </p:sp>
+      <p:sp>
+        <p:nvSpPr>
+          <p:cNvPr id="47" name="TextBox 15"/>
+          <p:cNvSpPr txBox="1"/>
+          <p:nvPr/>
+        </p:nvSpPr>
+        <p:spPr>
+          <a:xfrm>
+            <a:off x="1715692" y="1907569"/>
+            <a:ext cx="1154508" cy="646331"/>
+          </a:xfrm>
+          <a:prstGeom prst="rect">
+            <a:avLst/>
+          </a:prstGeom>
+          <a:noFill/>
+        </p:spPr>
+        <p:txBody>
+          <a:bodyPr wrap="none" rtlCol="0">
+            <a:spAutoFit/>
+          </a:bodyPr>
+          <a:lstStyle/>
+          <a:p>
+            <a:pPr algn="ctr"/>
+            <a:r>
+              <a:rPr lang="en-US" sz="1200" dirty="0" smtClean="0">
+                <a:solidFill>
+                  <a:schemeClr val="accent2">
+                    <a:lumMod val="75000"/>
+                  </a:schemeClr>
+                </a:solidFill>
+              </a:rPr>
+              <a:t>Variable set </a:t>
+            </a:r>
+            <a:r>
+              <a:rPr lang="en-US" sz="1200" b="1" dirty="0" smtClean="0">
+                <a:solidFill>
+                  <a:schemeClr val="accent2">
+                    <a:lumMod val="75000"/>
+                  </a:schemeClr>
+                </a:solidFill>
+              </a:rPr>
+              <a:t>Y</a:t>
+            </a:r>
+            <a:r>
+              <a:rPr lang="en-US" sz="1200" dirty="0" smtClean="0">
+                <a:solidFill>
+                  <a:schemeClr val="accent2">
+                    <a:lumMod val="75000"/>
+                  </a:schemeClr>
+                </a:solidFill>
+              </a:rPr>
+              <a:t> </a:t>
+            </a:r>
+            <a:endParaRPr lang="en-US" sz="1200" b="1" dirty="0" smtClean="0">
+              <a:solidFill>
+                <a:schemeClr val="accent2">
+                  <a:lumMod val="75000"/>
+                </a:schemeClr>
+              </a:solidFill>
+            </a:endParaRPr>
+          </a:p>
+          <a:p>
+            <a:pPr algn="ctr"/>
+            <a:r>
+              <a:rPr lang="en-US" sz="1200" i="1" dirty="0" smtClean="0">
+                <a:solidFill>
+                  <a:schemeClr val="accent2">
+                    <a:lumMod val="75000"/>
+                  </a:schemeClr>
+                </a:solidFill>
+              </a:rPr>
+              <a:t>t – 6 semesters</a:t>
+            </a:r>
+            <a:endParaRPr lang="en-US" sz="1200" i="1" dirty="0">
+              <a:solidFill>
+                <a:schemeClr val="accent2">
+                  <a:lumMod val="75000"/>
+                </a:schemeClr>
+              </a:solidFill>
+            </a:endParaRPr>
+          </a:p>
+          <a:p>
+            <a:pPr algn="ctr"/>
+            <a:r>
+              <a:rPr lang="en-US" sz="1200" dirty="0" smtClean="0">
+                <a:solidFill>
+                  <a:schemeClr val="accent2">
+                    <a:lumMod val="75000"/>
+                  </a:schemeClr>
+                </a:solidFill>
+              </a:rPr>
+              <a:t>(TRAINING SET) </a:t>
+            </a:r>
+            <a:endParaRPr lang="en-US" sz="1200" dirty="0">
+              <a:solidFill>
+                <a:schemeClr val="accent2">
+                  <a:lumMod val="75000"/>
+                </a:schemeClr>
+              </a:solidFill>
+            </a:endParaRPr>
+          </a:p>
+        </p:txBody>
+      </p:sp>
     </p:spTree>
     <p:extLst>
       <p:ext uri="{BB962C8B-B14F-4D97-AF65-F5344CB8AC3E}">
@@ -5769,14 +6237,15 @@
         <p:nvCxnSpPr>
           <p:cNvPr id="26" name="Straight Arrow Connector 25"/>
           <p:cNvCxnSpPr>
-            <a:endCxn id="25" idx="1"/>
+            <a:stCxn id="19" idx="3"/>
+            <a:endCxn id="22" idx="1"/>
           </p:cNvCxnSpPr>
           <p:nvPr/>
         </p:nvCxnSpPr>
         <p:spPr>
-          <a:xfrm flipV="1">
-            <a:off x="3745655" y="3330015"/>
-            <a:ext cx="674539" cy="4644"/>
+          <a:xfrm>
+            <a:off x="3873500" y="3367414"/>
+            <a:ext cx="361825" cy="0"/>
           </a:xfrm>
           <a:prstGeom prst="straightConnector1">
             <a:avLst/>
@@ -5805,7 +6274,6 @@
           <p:cNvPr id="4" name="Straight Arrow Connector 3"/>
           <p:cNvCxnSpPr>
             <a:stCxn id="9" idx="4"/>
-            <a:endCxn id="5" idx="0"/>
           </p:cNvCxnSpPr>
           <p:nvPr/>
         </p:nvCxnSpPr>
@@ -5836,25 +6304,88 @@
           </a:fontRef>
         </p:style>
       </p:cxnSp>
-      <p:sp>
-        <p:nvSpPr>
-          <p:cNvPr id="5" name="Rounded Rectangle 4"/>
+      <p:cxnSp>
+        <p:nvCxnSpPr>
+          <p:cNvPr id="7" name="Straight Arrow Connector 6"/>
+          <p:cNvCxnSpPr/>
+          <p:nvPr/>
+        </p:nvCxnSpPr>
+        <p:spPr>
+          <a:xfrm>
+            <a:off x="7609291" y="2501079"/>
+            <a:ext cx="0" cy="656214"/>
+          </a:xfrm>
+          <a:prstGeom prst="straightConnector1">
+            <a:avLst/>
+          </a:prstGeom>
+          <a:ln>
+            <a:tailEnd type="arrow"/>
+          </a:ln>
+        </p:spPr>
+        <p:style>
+          <a:lnRef idx="2">
+            <a:schemeClr val="accent1"/>
+          </a:lnRef>
+          <a:fillRef idx="0">
+            <a:schemeClr val="accent1"/>
+          </a:fillRef>
+          <a:effectRef idx="1">
+            <a:schemeClr val="accent1"/>
+          </a:effectRef>
+          <a:fontRef idx="minor">
+            <a:schemeClr val="tx1"/>
+          </a:fontRef>
+        </p:style>
+      </p:cxnSp>
+      <p:sp>
+        <p:nvSpPr>
+          <p:cNvPr id="8" name="TextBox 7"/>
+          <p:cNvSpPr txBox="1"/>
+          <p:nvPr/>
+        </p:nvSpPr>
+        <p:spPr>
+          <a:xfrm>
+            <a:off x="6016083" y="3138049"/>
+            <a:ext cx="402311" cy="369332"/>
+          </a:xfrm>
+          <a:prstGeom prst="rect">
+            <a:avLst/>
+          </a:prstGeom>
+          <a:noFill/>
+        </p:spPr>
+        <p:txBody>
+          <a:bodyPr wrap="none" rtlCol="0">
+            <a:spAutoFit/>
+          </a:bodyPr>
+          <a:lstStyle/>
+          <a:p>
+            <a:r>
+              <a:rPr lang="en-US" dirty="0" smtClean="0"/>
+              <a:t>….</a:t>
+            </a:r>
+            <a:endParaRPr lang="en-US" dirty="0"/>
+          </a:p>
+        </p:txBody>
+      </p:sp>
+      <p:sp>
+        <p:nvSpPr>
+          <p:cNvPr id="9" name="Oval 8"/>
           <p:cNvSpPr/>
           <p:nvPr/>
         </p:nvSpPr>
         <p:spPr>
           <a:xfrm>
-            <a:off x="3048594" y="3152649"/>
-            <a:ext cx="697061" cy="354732"/>
-          </a:xfrm>
-          <a:prstGeom prst="roundRect">
-            <a:avLst/>
-          </a:prstGeom>
-          <a:noFill/>
+            <a:off x="2933700" y="2001182"/>
+            <a:ext cx="939800" cy="495253"/>
+          </a:xfrm>
+          <a:prstGeom prst="ellipse">
+            <a:avLst/>
+          </a:prstGeom>
           <a:ln>
             <a:solidFill>
-              <a:schemeClr val="tx1"/>
+              <a:srgbClr val="000000"/>
             </a:solidFill>
+            <a:prstDash val="solid"/>
           </a:ln>
         </p:spPr>
         <p:style>
@@ -5879,14 +6410,14 @@
           <a:p>
             <a:pPr algn="ctr"/>
             <a:r>
-              <a:rPr lang="en-US" sz="1050" dirty="0" smtClean="0">
+              <a:rPr lang="en-US" sz="1000" dirty="0" smtClean="0">
                 <a:solidFill>
                   <a:srgbClr val="000000"/>
                 </a:solidFill>
               </a:rPr>
-              <a:t>Day -180</a:t>
-            </a:r>
-            <a:endParaRPr lang="en-US" sz="1050" dirty="0">
+              <a:t>Defaulter -180</a:t>
+            </a:r>
+            <a:endParaRPr lang="en-US" sz="1000" dirty="0">
               <a:solidFill>
                 <a:srgbClr val="000000"/>
               </a:solidFill>
@@ -5894,25 +6425,58 @@
           </a:p>
         </p:txBody>
       </p:sp>
-      <p:sp>
-        <p:nvSpPr>
-          <p:cNvPr id="6" name="Rounded Rectangle 5"/>
+      <p:cxnSp>
+        <p:nvCxnSpPr>
+          <p:cNvPr id="24" name="Straight Arrow Connector 23"/>
+          <p:cNvCxnSpPr/>
+          <p:nvPr/>
+        </p:nvCxnSpPr>
+        <p:spPr>
+          <a:xfrm flipH="1">
+            <a:off x="4768725" y="2496435"/>
+            <a:ext cx="6475" cy="656214"/>
+          </a:xfrm>
+          <a:prstGeom prst="straightConnector1">
+            <a:avLst/>
+          </a:prstGeom>
+          <a:ln>
+            <a:tailEnd type="arrow"/>
+          </a:ln>
+        </p:spPr>
+        <p:style>
+          <a:lnRef idx="2">
+            <a:schemeClr val="accent1"/>
+          </a:lnRef>
+          <a:fillRef idx="0">
+            <a:schemeClr val="accent1"/>
+          </a:fillRef>
+          <a:effectRef idx="1">
+            <a:schemeClr val="accent1"/>
+          </a:effectRef>
+          <a:fontRef idx="minor">
+            <a:schemeClr val="tx1"/>
+          </a:fontRef>
+        </p:style>
+      </p:cxnSp>
+      <p:sp>
+        <p:nvSpPr>
+          <p:cNvPr id="20" name="Oval 19"/>
           <p:cNvSpPr/>
           <p:nvPr/>
         </p:nvSpPr>
         <p:spPr>
           <a:xfrm>
-            <a:off x="7260760" y="3157293"/>
-            <a:ext cx="697061" cy="354732"/>
-          </a:xfrm>
-          <a:prstGeom prst="roundRect">
-            <a:avLst/>
-          </a:prstGeom>
-          <a:noFill/>
+            <a:off x="4292600" y="2001182"/>
+            <a:ext cx="939800" cy="495253"/>
+          </a:xfrm>
+          <a:prstGeom prst="ellipse">
+            <a:avLst/>
+          </a:prstGeom>
           <a:ln>
             <a:solidFill>
-              <a:schemeClr val="tx1"/>
+              <a:srgbClr val="000000"/>
             </a:solidFill>
+            <a:prstDash val="solid"/>
           </a:ln>
         </p:spPr>
         <p:style>
@@ -5937,28 +6501,31 @@
           <a:p>
             <a:pPr algn="ctr"/>
             <a:r>
-              <a:rPr lang="en-US" sz="1050" dirty="0" smtClean="0">
+              <a:rPr lang="en-US" sz="1000" dirty="0" smtClean="0">
                 <a:solidFill>
                   <a:srgbClr val="000000"/>
                 </a:solidFill>
               </a:rPr>
-              <a:t>Day -1</a:t>
-            </a:r>
+              <a:t>Defaulter -179</a:t>
+            </a:r>
+            <a:endParaRPr lang="en-US" sz="1000" dirty="0">
+              <a:solidFill>
+                <a:srgbClr val="000000"/>
+              </a:solidFill>
+            </a:endParaRPr>
           </a:p>
         </p:txBody>
       </p:sp>
       <p:cxnSp>
         <p:nvCxnSpPr>
-          <p:cNvPr id="7" name="Straight Arrow Connector 6"/>
-          <p:cNvCxnSpPr>
-            <a:endCxn id="6" idx="0"/>
-          </p:cNvCxnSpPr>
+          <p:cNvPr id="28" name="Straight Arrow Connector 27"/>
+          <p:cNvCxnSpPr/>
           <p:nvPr/>
         </p:nvCxnSpPr>
         <p:spPr>
           <a:xfrm>
-            <a:off x="7609291" y="2501079"/>
-            <a:ext cx="0" cy="656214"/>
+            <a:off x="5232400" y="2243368"/>
+            <a:ext cx="419100" cy="0"/>
           </a:xfrm>
           <a:prstGeom prst="straightConnector1">
             <a:avLst/>
@@ -5984,13 +6551,13 @@
       </p:cxnSp>
       <p:sp>
         <p:nvSpPr>
-          <p:cNvPr id="8" name="TextBox 7"/>
+          <p:cNvPr id="30" name="TextBox 29"/>
           <p:cNvSpPr txBox="1"/>
           <p:nvPr/>
         </p:nvSpPr>
         <p:spPr>
           <a:xfrm>
-            <a:off x="6016083" y="3138049"/>
+            <a:off x="6016083" y="2001182"/>
             <a:ext cx="402311" cy="369332"/>
           </a:xfrm>
           <a:prstGeom prst="rect">
@@ -6012,15 +6579,50 @@
           </a:p>
         </p:txBody>
       </p:sp>
-      <p:sp>
-        <p:nvSpPr>
-          <p:cNvPr id="9" name="Oval 8"/>
+      <p:cxnSp>
+        <p:nvCxnSpPr>
+          <p:cNvPr id="32" name="Straight Arrow Connector 31"/>
+          <p:cNvCxnSpPr>
+            <a:endCxn id="33" idx="2"/>
+          </p:cNvCxnSpPr>
+          <p:nvPr/>
+        </p:nvCxnSpPr>
+        <p:spPr>
+          <a:xfrm>
+            <a:off x="6720291" y="2243368"/>
+            <a:ext cx="419100" cy="0"/>
+          </a:xfrm>
+          <a:prstGeom prst="straightConnector1">
+            <a:avLst/>
+          </a:prstGeom>
+          <a:ln>
+            <a:tailEnd type="arrow"/>
+          </a:ln>
+        </p:spPr>
+        <p:style>
+          <a:lnRef idx="2">
+            <a:schemeClr val="accent1"/>
+          </a:lnRef>
+          <a:fillRef idx="0">
+            <a:schemeClr val="accent1"/>
+          </a:fillRef>
+          <a:effectRef idx="1">
+            <a:schemeClr val="accent1"/>
+          </a:effectRef>
+          <a:fontRef idx="minor">
+            <a:schemeClr val="tx1"/>
+          </a:fontRef>
+        </p:style>
+      </p:cxnSp>
+      <p:sp>
+        <p:nvSpPr>
+          <p:cNvPr id="33" name="Oval 32"/>
           <p:cNvSpPr/>
           <p:nvPr/>
         </p:nvSpPr>
         <p:spPr>
           <a:xfrm>
-            <a:off x="2933700" y="2001182"/>
+            <a:off x="7139391" y="1995741"/>
             <a:ext cx="939800" cy="495253"/>
           </a:xfrm>
           <a:prstGeom prst="ellipse">
@@ -6060,7 +6662,7 @@
                   <a:srgbClr val="000000"/>
                 </a:solidFill>
               </a:rPr>
-              <a:t>Defaulter -180</a:t>
+              <a:t>Defaulter -1</a:t>
             </a:r>
             <a:endParaRPr lang="en-US" sz="1000" dirty="0">
               <a:solidFill>
@@ -6070,51 +6672,16 @@
           </a:p>
         </p:txBody>
       </p:sp>
-      <p:cxnSp>
-        <p:nvCxnSpPr>
-          <p:cNvPr id="24" name="Straight Arrow Connector 23"/>
-          <p:cNvCxnSpPr>
-            <a:endCxn id="25" idx="0"/>
-          </p:cNvCxnSpPr>
-          <p:nvPr/>
-        </p:nvCxnSpPr>
-        <p:spPr>
-          <a:xfrm flipH="1">
-            <a:off x="4768725" y="2496435"/>
-            <a:ext cx="6475" cy="656214"/>
-          </a:xfrm>
-          <a:prstGeom prst="straightConnector1">
-            <a:avLst/>
-          </a:prstGeom>
-          <a:ln>
-            <a:tailEnd type="arrow"/>
-          </a:ln>
-        </p:spPr>
-        <p:style>
-          <a:lnRef idx="2">
-            <a:schemeClr val="accent1"/>
-          </a:lnRef>
-          <a:fillRef idx="0">
-            <a:schemeClr val="accent1"/>
-          </a:fillRef>
-          <a:effectRef idx="1">
-            <a:schemeClr val="accent1"/>
-          </a:effectRef>
-          <a:fontRef idx="minor">
-            <a:schemeClr val="tx1"/>
-          </a:fontRef>
-        </p:style>
-      </p:cxnSp>
-      <p:sp>
-        <p:nvSpPr>
-          <p:cNvPr id="25" name="Rounded Rectangle 24"/>
+      <p:sp>
+        <p:nvSpPr>
+          <p:cNvPr id="19" name="Rounded Rectangle 5"/>
           <p:cNvSpPr/>
           <p:nvPr/>
         </p:nvSpPr>
         <p:spPr>
           <a:xfrm>
-            <a:off x="4420194" y="3152649"/>
-            <a:ext cx="697061" cy="354732"/>
+            <a:off x="2806700" y="3162302"/>
+            <a:ext cx="1066800" cy="410224"/>
           </a:xfrm>
           <a:prstGeom prst="roundRect">
             <a:avLst/>
@@ -6147,14 +6714,57 @@
           <a:lstStyle/>
           <a:p>
             <a:pPr algn="ctr"/>
+            <a:endParaRPr lang="en-US" sz="1050" dirty="0" smtClean="0">
+              <a:solidFill>
+                <a:srgbClr val="000000"/>
+              </a:solidFill>
+            </a:endParaRPr>
+          </a:p>
+          <a:p>
+            <a:pPr algn="ctr"/>
             <a:r>
               <a:rPr lang="en-US" sz="1050" dirty="0" smtClean="0">
                 <a:solidFill>
                   <a:srgbClr val="000000"/>
                 </a:solidFill>
               </a:rPr>
-              <a:t>Day -179</a:t>
-            </a:r>
+              <a:t>Variable set </a:t>
+            </a:r>
+            <a:r>
+              <a:rPr lang="en-US" sz="1050" b="1" dirty="0" smtClean="0">
+                <a:solidFill>
+                  <a:srgbClr val="000000"/>
+                </a:solidFill>
+              </a:rPr>
+              <a:t>X</a:t>
+            </a:r>
+            <a:r>
+              <a:rPr lang="en-US" sz="1050" dirty="0" smtClean="0">
+                <a:solidFill>
+                  <a:srgbClr val="000000"/>
+                </a:solidFill>
+              </a:rPr>
+              <a:t> </a:t>
+            </a:r>
+            <a:r>
+              <a:rPr lang="en-US" sz="1050" dirty="0" smtClean="0">
+                <a:solidFill>
+                  <a:srgbClr val="000000"/>
+                </a:solidFill>
+              </a:rPr>
+              <a:t>-</a:t>
+            </a:r>
+            <a:r>
+              <a:rPr lang="en-US" sz="1050" dirty="0" smtClean="0">
+                <a:solidFill>
+                  <a:srgbClr val="000000"/>
+                </a:solidFill>
+              </a:rPr>
+              <a:t>180 days</a:t>
+            </a:r>
+          </a:p>
+          <a:p>
+            <a:pPr algn="ctr"/>
             <a:endParaRPr lang="en-US" sz="1050" dirty="0">
               <a:solidFill>
                 <a:srgbClr val="000000"/>
@@ -6165,23 +6775,23 @@
       </p:sp>
       <p:sp>
         <p:nvSpPr>
-          <p:cNvPr id="20" name="Oval 19"/>
+          <p:cNvPr id="22" name="Rounded Rectangle 5"/>
           <p:cNvSpPr/>
           <p:nvPr/>
         </p:nvSpPr>
         <p:spPr>
           <a:xfrm>
-            <a:off x="4292600" y="2001182"/>
-            <a:ext cx="939800" cy="495253"/>
-          </a:xfrm>
-          <a:prstGeom prst="ellipse">
-            <a:avLst/>
-          </a:prstGeom>
+            <a:off x="4235325" y="3162302"/>
+            <a:ext cx="1066800" cy="410224"/>
+          </a:xfrm>
+          <a:prstGeom prst="roundRect">
+            <a:avLst/>
+          </a:prstGeom>
+          <a:noFill/>
           <a:ln>
             <a:solidFill>
-              <a:srgbClr val="000000"/>
+              <a:schemeClr val="tx1"/>
             </a:solidFill>
-            <a:prstDash val="solid"/>
           </a:ln>
         </p:spPr>
         <p:style>
@@ -6205,32 +6815,77 @@
           <a:lstStyle/>
           <a:p>
             <a:pPr algn="ctr"/>
-            <a:r>
-              <a:rPr lang="en-US" sz="1000" dirty="0" smtClean="0">
-                <a:solidFill>
-                  <a:srgbClr val="000000"/>
-                </a:solidFill>
-              </a:rPr>
-              <a:t>Defaulter -179</a:t>
-            </a:r>
-            <a:endParaRPr lang="en-US" sz="1000" dirty="0">
+            <a:endParaRPr lang="en-US" sz="1050" dirty="0" smtClean="0">
               <a:solidFill>
                 <a:srgbClr val="000000"/>
               </a:solidFill>
             </a:endParaRPr>
           </a:p>
+          <a:p>
+            <a:pPr algn="ctr"/>
+            <a:r>
+              <a:rPr lang="en-US" sz="1050" dirty="0" smtClean="0">
+                <a:solidFill>
+                  <a:srgbClr val="000000"/>
+                </a:solidFill>
+              </a:rPr>
+              <a:t>Variable set </a:t>
+            </a:r>
+            <a:r>
+              <a:rPr lang="en-US" sz="1050" b="1" dirty="0" smtClean="0">
+                <a:solidFill>
+                  <a:srgbClr val="000000"/>
+                </a:solidFill>
+              </a:rPr>
+              <a:t>X</a:t>
+            </a:r>
+            <a:r>
+              <a:rPr lang="en-US" sz="1050" dirty="0" smtClean="0">
+                <a:solidFill>
+                  <a:srgbClr val="000000"/>
+                </a:solidFill>
+              </a:rPr>
+              <a:t> </a:t>
+            </a:r>
+            <a:r>
+              <a:rPr lang="en-US" sz="1050" dirty="0" smtClean="0">
+                <a:solidFill>
+                  <a:srgbClr val="000000"/>
+                </a:solidFill>
+              </a:rPr>
+              <a:t>-179 </a:t>
+            </a:r>
+            <a:r>
+              <a:rPr lang="en-US" sz="1050" dirty="0" smtClean="0">
+                <a:solidFill>
+                  <a:srgbClr val="000000"/>
+                </a:solidFill>
+              </a:rPr>
+              <a:t>days</a:t>
+            </a:r>
+          </a:p>
+          <a:p>
+            <a:pPr algn="ctr"/>
+            <a:endParaRPr lang="en-US" sz="1050" dirty="0">
+              <a:solidFill>
+                <a:srgbClr val="000000"/>
+              </a:solidFill>
+            </a:endParaRPr>
+          </a:p>
         </p:txBody>
       </p:sp>
       <p:cxnSp>
         <p:nvCxnSpPr>
-          <p:cNvPr id="28" name="Straight Arrow Connector 27"/>
-          <p:cNvCxnSpPr/>
+          <p:cNvPr id="27" name="Straight Arrow Connector 25"/>
+          <p:cNvCxnSpPr>
+            <a:stCxn id="22" idx="3"/>
+          </p:cNvCxnSpPr>
           <p:nvPr/>
         </p:nvCxnSpPr>
         <p:spPr>
           <a:xfrm>
-            <a:off x="5232400" y="2243368"/>
-            <a:ext cx="419100" cy="0"/>
+            <a:off x="5302125" y="3367414"/>
+            <a:ext cx="361825" cy="0"/>
           </a:xfrm>
           <a:prstGeom prst="straightConnector1">
             <a:avLst/>
@@ -6256,14 +6911,16 @@
       </p:cxnSp>
       <p:cxnSp>
         <p:nvCxnSpPr>
-          <p:cNvPr id="29" name="Straight Arrow Connector 28"/>
-          <p:cNvCxnSpPr/>
+          <p:cNvPr id="34" name="Straight Arrow Connector 25"/>
+          <p:cNvCxnSpPr>
+            <a:endCxn id="23" idx="1"/>
+          </p:cNvCxnSpPr>
           <p:nvPr/>
         </p:nvCxnSpPr>
         <p:spPr>
-          <a:xfrm flipV="1">
-            <a:off x="5125644" y="3319930"/>
-            <a:ext cx="674539" cy="4644"/>
+          <a:xfrm>
+            <a:off x="6777566" y="3367414"/>
+            <a:ext cx="361825" cy="0"/>
           </a:xfrm>
           <a:prstGeom prst="straightConnector1">
             <a:avLst/>
@@ -6289,121 +6946,23 @@
       </p:cxnSp>
       <p:sp>
         <p:nvSpPr>
-          <p:cNvPr id="30" name="TextBox 29"/>
-          <p:cNvSpPr txBox="1"/>
-          <p:nvPr/>
-        </p:nvSpPr>
-        <p:spPr>
-          <a:xfrm>
-            <a:off x="6016083" y="2001182"/>
-            <a:ext cx="402311" cy="369332"/>
-          </a:xfrm>
-          <a:prstGeom prst="rect">
+          <p:cNvPr id="23" name="Rounded Rectangle 5"/>
+          <p:cNvSpPr/>
+          <p:nvPr/>
+        </p:nvSpPr>
+        <p:spPr>
+          <a:xfrm>
+            <a:off x="7139391" y="3162302"/>
+            <a:ext cx="1066800" cy="410224"/>
+          </a:xfrm>
+          <a:prstGeom prst="roundRect">
             <a:avLst/>
           </a:prstGeom>
           <a:noFill/>
-        </p:spPr>
-        <p:txBody>
-          <a:bodyPr wrap="none" rtlCol="0">
-            <a:spAutoFit/>
-          </a:bodyPr>
-          <a:lstStyle/>
-          <a:p>
-            <a:r>
-              <a:rPr lang="en-US" dirty="0" smtClean="0"/>
-              <a:t>….</a:t>
-            </a:r>
-            <a:endParaRPr lang="en-US" dirty="0"/>
-          </a:p>
-        </p:txBody>
-      </p:sp>
-      <p:cxnSp>
-        <p:nvCxnSpPr>
-          <p:cNvPr id="31" name="Straight Arrow Connector 30"/>
-          <p:cNvCxnSpPr/>
-          <p:nvPr/>
-        </p:nvCxnSpPr>
-        <p:spPr>
-          <a:xfrm flipV="1">
-            <a:off x="6586221" y="3315286"/>
-            <a:ext cx="674539" cy="4644"/>
-          </a:xfrm>
-          <a:prstGeom prst="straightConnector1">
-            <a:avLst/>
-          </a:prstGeom>
-          <a:ln>
-            <a:tailEnd type="arrow"/>
-          </a:ln>
-        </p:spPr>
-        <p:style>
-          <a:lnRef idx="2">
-            <a:schemeClr val="accent1"/>
-          </a:lnRef>
-          <a:fillRef idx="0">
-            <a:schemeClr val="accent1"/>
-          </a:fillRef>
-          <a:effectRef idx="1">
-            <a:schemeClr val="accent1"/>
-          </a:effectRef>
-          <a:fontRef idx="minor">
-            <a:schemeClr val="tx1"/>
-          </a:fontRef>
-        </p:style>
-      </p:cxnSp>
-      <p:cxnSp>
-        <p:nvCxnSpPr>
-          <p:cNvPr id="32" name="Straight Arrow Connector 31"/>
-          <p:cNvCxnSpPr>
-            <a:endCxn id="33" idx="2"/>
-          </p:cNvCxnSpPr>
-          <p:nvPr/>
-        </p:nvCxnSpPr>
-        <p:spPr>
-          <a:xfrm>
-            <a:off x="6720291" y="2243368"/>
-            <a:ext cx="419100" cy="0"/>
-          </a:xfrm>
-          <a:prstGeom prst="straightConnector1">
-            <a:avLst/>
-          </a:prstGeom>
-          <a:ln>
-            <a:tailEnd type="arrow"/>
-          </a:ln>
-        </p:spPr>
-        <p:style>
-          <a:lnRef idx="2">
-            <a:schemeClr val="accent1"/>
-          </a:lnRef>
-          <a:fillRef idx="0">
-            <a:schemeClr val="accent1"/>
-          </a:fillRef>
-          <a:effectRef idx="1">
-            <a:schemeClr val="accent1"/>
-          </a:effectRef>
-          <a:fontRef idx="minor">
-            <a:schemeClr val="tx1"/>
-          </a:fontRef>
-        </p:style>
-      </p:cxnSp>
-      <p:sp>
-        <p:nvSpPr>
-          <p:cNvPr id="33" name="Oval 32"/>
-          <p:cNvSpPr/>
-          <p:nvPr/>
-        </p:nvSpPr>
-        <p:spPr>
-          <a:xfrm>
-            <a:off x="7139391" y="1995741"/>
-            <a:ext cx="939800" cy="495253"/>
-          </a:xfrm>
-          <a:prstGeom prst="ellipse">
-            <a:avLst/>
-          </a:prstGeom>
           <a:ln>
             <a:solidFill>
-              <a:srgbClr val="000000"/>
+              <a:schemeClr val="tx1"/>
             </a:solidFill>
-            <a:prstDash val="solid"/>
           </a:ln>
         </p:spPr>
         <p:style>
@@ -6427,15 +6986,55 @@
           <a:lstStyle/>
           <a:p>
             <a:pPr algn="ctr"/>
-            <a:r>
-              <a:rPr lang="en-US" sz="1000" dirty="0" smtClean="0">
+            <a:endParaRPr lang="en-US" sz="1050" dirty="0" smtClean="0">
+              <a:solidFill>
+                <a:srgbClr val="000000"/>
+              </a:solidFill>
+            </a:endParaRPr>
+          </a:p>
+          <a:p>
+            <a:pPr algn="ctr"/>
+            <a:r>
+              <a:rPr lang="en-US" sz="1050" dirty="0" smtClean="0">
                 <a:solidFill>
                   <a:srgbClr val="000000"/>
                 </a:solidFill>
               </a:rPr>
-              <a:t>Defaulter -1</a:t>
-            </a:r>
-            <a:endParaRPr lang="en-US" sz="1000" dirty="0">
+              <a:t>Variable set </a:t>
+            </a:r>
+            <a:r>
+              <a:rPr lang="en-US" sz="1050" b="1" dirty="0" smtClean="0">
+                <a:solidFill>
+                  <a:srgbClr val="000000"/>
+                </a:solidFill>
+              </a:rPr>
+              <a:t>X</a:t>
+            </a:r>
+            <a:r>
+              <a:rPr lang="en-US" sz="1050" dirty="0" smtClean="0">
+                <a:solidFill>
+                  <a:srgbClr val="000000"/>
+                </a:solidFill>
+              </a:rPr>
+              <a:t> -1 </a:t>
+            </a:r>
+            <a:r>
+              <a:rPr lang="en-US" sz="1050" dirty="0" smtClean="0">
+                <a:solidFill>
+                  <a:srgbClr val="000000"/>
+                </a:solidFill>
+              </a:rPr>
+              <a:t>day</a:t>
+            </a:r>
+            <a:endParaRPr lang="en-US" sz="1050" dirty="0" smtClean="0">
+              <a:solidFill>
+                <a:srgbClr val="000000"/>
+              </a:solidFill>
+            </a:endParaRPr>
+          </a:p>
+          <a:p>
+            <a:pPr algn="ctr"/>
+            <a:endParaRPr lang="en-US" sz="1050" dirty="0">
               <a:solidFill>
                 <a:srgbClr val="000000"/>
               </a:solidFill>

</xml_diff>

<commit_message>
Some more changes in Cajamar
</commit_message>
<xml_diff>
--- a/doc/D2.1_AMIDSTModelingFramework/figures/CajaMarModelsBucket.pptx
+++ b/doc/D2.1_AMIDSTModelingFramework/figures/CajaMarModelsBucket.pptx
@@ -299,7 +299,7 @@
           <a:p>
             <a:fld id="{08C0AF01-9055-0547-953E-72B2160BBA35}" type="datetimeFigureOut">
               <a:rPr lang="en-US" smtClean="0"/>
-              <a:t>19/09/14</a:t>
+              <a:t>20/09/14</a:t>
             </a:fld>
             <a:endParaRPr lang="en-US"/>
           </a:p>
@@ -469,7 +469,7 @@
           <a:p>
             <a:fld id="{08C0AF01-9055-0547-953E-72B2160BBA35}" type="datetimeFigureOut">
               <a:rPr lang="en-US" smtClean="0"/>
-              <a:t>19/09/14</a:t>
+              <a:t>20/09/14</a:t>
             </a:fld>
             <a:endParaRPr lang="en-US"/>
           </a:p>
@@ -649,7 +649,7 @@
           <a:p>
             <a:fld id="{08C0AF01-9055-0547-953E-72B2160BBA35}" type="datetimeFigureOut">
               <a:rPr lang="en-US" smtClean="0"/>
-              <a:t>19/09/14</a:t>
+              <a:t>20/09/14</a:t>
             </a:fld>
             <a:endParaRPr lang="en-US"/>
           </a:p>
@@ -819,7 +819,7 @@
           <a:p>
             <a:fld id="{08C0AF01-9055-0547-953E-72B2160BBA35}" type="datetimeFigureOut">
               <a:rPr lang="en-US" smtClean="0"/>
-              <a:t>19/09/14</a:t>
+              <a:t>20/09/14</a:t>
             </a:fld>
             <a:endParaRPr lang="en-US"/>
           </a:p>
@@ -1065,7 +1065,7 @@
           <a:p>
             <a:fld id="{08C0AF01-9055-0547-953E-72B2160BBA35}" type="datetimeFigureOut">
               <a:rPr lang="en-US" smtClean="0"/>
-              <a:t>19/09/14</a:t>
+              <a:t>20/09/14</a:t>
             </a:fld>
             <a:endParaRPr lang="en-US"/>
           </a:p>
@@ -1353,7 +1353,7 @@
           <a:p>
             <a:fld id="{08C0AF01-9055-0547-953E-72B2160BBA35}" type="datetimeFigureOut">
               <a:rPr lang="en-US" smtClean="0"/>
-              <a:t>19/09/14</a:t>
+              <a:t>20/09/14</a:t>
             </a:fld>
             <a:endParaRPr lang="en-US"/>
           </a:p>
@@ -1775,7 +1775,7 @@
           <a:p>
             <a:fld id="{08C0AF01-9055-0547-953E-72B2160BBA35}" type="datetimeFigureOut">
               <a:rPr lang="en-US" smtClean="0"/>
-              <a:t>19/09/14</a:t>
+              <a:t>20/09/14</a:t>
             </a:fld>
             <a:endParaRPr lang="en-US"/>
           </a:p>
@@ -1893,7 +1893,7 @@
           <a:p>
             <a:fld id="{08C0AF01-9055-0547-953E-72B2160BBA35}" type="datetimeFigureOut">
               <a:rPr lang="en-US" smtClean="0"/>
-              <a:t>19/09/14</a:t>
+              <a:t>20/09/14</a:t>
             </a:fld>
             <a:endParaRPr lang="en-US"/>
           </a:p>
@@ -1988,7 +1988,7 @@
           <a:p>
             <a:fld id="{08C0AF01-9055-0547-953E-72B2160BBA35}" type="datetimeFigureOut">
               <a:rPr lang="en-US" smtClean="0"/>
-              <a:t>19/09/14</a:t>
+              <a:t>20/09/14</a:t>
             </a:fld>
             <a:endParaRPr lang="en-US"/>
           </a:p>
@@ -2265,7 +2265,7 @@
           <a:p>
             <a:fld id="{08C0AF01-9055-0547-953E-72B2160BBA35}" type="datetimeFigureOut">
               <a:rPr lang="en-US" smtClean="0"/>
-              <a:t>19/09/14</a:t>
+              <a:t>20/09/14</a:t>
             </a:fld>
             <a:endParaRPr lang="en-US"/>
           </a:p>
@@ -2518,7 +2518,7 @@
           <a:p>
             <a:fld id="{08C0AF01-9055-0547-953E-72B2160BBA35}" type="datetimeFigureOut">
               <a:rPr lang="en-US" smtClean="0"/>
-              <a:t>19/09/14</a:t>
+              <a:t>20/09/14</a:t>
             </a:fld>
             <a:endParaRPr lang="en-US"/>
           </a:p>
@@ -2731,7 +2731,7 @@
           <a:p>
             <a:fld id="{08C0AF01-9055-0547-953E-72B2160BBA35}" type="datetimeFigureOut">
               <a:rPr lang="en-US" smtClean="0"/>
-              <a:t>19/09/14</a:t>
+              <a:t>20/09/14</a:t>
             </a:fld>
             <a:endParaRPr lang="en-US"/>
           </a:p>
@@ -10845,30 +10845,6 @@
       </p:sp>
       <p:pic>
         <p:nvPicPr>
-          <p:cNvPr id="44" name="Picture 43"/>
-          <p:cNvPicPr>
-            <a:picLocks noChangeAspect="1"/>
-          </p:cNvPicPr>
-          <p:nvPr/>
-        </p:nvPicPr>
-        <p:blipFill>
-          <a:blip r:embed="rId2"/>
-          <a:stretch>
-            <a:fillRect/>
-          </a:stretch>
-        </p:blipFill>
-        <p:spPr>
-          <a:xfrm>
-            <a:off x="3113176" y="3744426"/>
-            <a:ext cx="295097" cy="234565"/>
-          </a:xfrm>
-          <a:prstGeom prst="rect">
-            <a:avLst/>
-          </a:prstGeom>
-        </p:spPr>
-      </p:pic>
-      <p:pic>
-        <p:nvPicPr>
           <p:cNvPr id="46" name="Picture 45"/>
           <p:cNvPicPr>
             <a:picLocks noChangeAspect="1"/>
@@ -11492,6 +11468,63 @@
           </a:prstGeom>
         </p:spPr>
       </p:pic>
+      <p:graphicFrame>
+        <p:nvGraphicFramePr>
+          <p:cNvPr id="3" name="Objeto 2"/>
+          <p:cNvGraphicFramePr>
+            <a:graphicFrameLocks noChangeAspect="1"/>
+          </p:cNvGraphicFramePr>
+          <p:nvPr>
+            <p:extLst>
+              <p:ext uri="{D42A27DB-BD31-4B8C-83A1-F6EECF244321}">
+                <p14:modId xmlns:p14="http://schemas.microsoft.com/office/powerpoint/2010/main" val="3016401939"/>
+              </p:ext>
+            </p:extLst>
+          </p:nvPr>
+        </p:nvGraphicFramePr>
+        <p:xfrm>
+          <a:off x="3055938" y="3668713"/>
+          <a:ext cx="374650" cy="425450"/>
+        </p:xfrm>
+        <a:graphic>
+          <a:graphicData uri="http://schemas.openxmlformats.org/presentationml/2006/ole">
+            <mc:AlternateContent xmlns:mc="http://schemas.openxmlformats.org/markup-compatibility/2006">
+              <mc:Choice xmlns:v="urn:schemas-microsoft-com:vml" Requires="v">
+                <p:oleObj spid="_x0000_s1025" name="EcuaciÛn" r:id="rId12" imgW="190500" imgH="215900" progId="Equation.3">
+                  <p:embed/>
+                </p:oleObj>
+              </mc:Choice>
+              <mc:Fallback>
+                <p:oleObj name="EcuaciÛn" r:id="rId12" imgW="190500" imgH="215900" progId="Equation.3">
+                  <p:embed/>
+                  <p:pic>
+                    <p:nvPicPr>
+                      <p:cNvPr id="0" name=""/>
+                      <p:cNvPicPr/>
+                      <p:nvPr/>
+                    </p:nvPicPr>
+                    <p:blipFill>
+                      <a:blip r:embed="rId13"/>
+                      <a:stretch>
+                        <a:fillRect/>
+                      </a:stretch>
+                    </p:blipFill>
+                    <p:spPr>
+                      <a:xfrm>
+                        <a:off x="3055938" y="3668713"/>
+                        <a:ext cx="374650" cy="425450"/>
+                      </a:xfrm>
+                      <a:prstGeom prst="rect">
+                        <a:avLst/>
+                      </a:prstGeom>
+                    </p:spPr>
+                  </p:pic>
+                </p:oleObj>
+              </mc:Fallback>
+            </mc:AlternateContent>
+          </a:graphicData>
+        </a:graphic>
+      </p:graphicFrame>
     </p:spTree>
     <p:extLst>
       <p:ext uri="{BB962C8B-B14F-4D97-AF65-F5344CB8AC3E}">

</xml_diff>

<commit_message>
Modification in Cajamar dynamic model
</commit_message>
<xml_diff>
--- a/doc/D2.1_AMIDSTModelingFramework/figures/CajaMarModelsBucket.pptx
+++ b/doc/D2.1_AMIDSTModelingFramework/figures/CajaMarModelsBucket.pptx
@@ -299,7 +299,7 @@
           <a:p>
             <a:fld id="{08C0AF01-9055-0547-953E-72B2160BBA35}" type="datetimeFigureOut">
               <a:rPr lang="en-US" smtClean="0"/>
-              <a:t>20/09/14</a:t>
+              <a:t>21/09/14</a:t>
             </a:fld>
             <a:endParaRPr lang="en-US"/>
           </a:p>
@@ -469,7 +469,7 @@
           <a:p>
             <a:fld id="{08C0AF01-9055-0547-953E-72B2160BBA35}" type="datetimeFigureOut">
               <a:rPr lang="en-US" smtClean="0"/>
-              <a:t>20/09/14</a:t>
+              <a:t>21/09/14</a:t>
             </a:fld>
             <a:endParaRPr lang="en-US"/>
           </a:p>
@@ -649,7 +649,7 @@
           <a:p>
             <a:fld id="{08C0AF01-9055-0547-953E-72B2160BBA35}" type="datetimeFigureOut">
               <a:rPr lang="en-US" smtClean="0"/>
-              <a:t>20/09/14</a:t>
+              <a:t>21/09/14</a:t>
             </a:fld>
             <a:endParaRPr lang="en-US"/>
           </a:p>
@@ -819,7 +819,7 @@
           <a:p>
             <a:fld id="{08C0AF01-9055-0547-953E-72B2160BBA35}" type="datetimeFigureOut">
               <a:rPr lang="en-US" smtClean="0"/>
-              <a:t>20/09/14</a:t>
+              <a:t>21/09/14</a:t>
             </a:fld>
             <a:endParaRPr lang="en-US"/>
           </a:p>
@@ -1065,7 +1065,7 @@
           <a:p>
             <a:fld id="{08C0AF01-9055-0547-953E-72B2160BBA35}" type="datetimeFigureOut">
               <a:rPr lang="en-US" smtClean="0"/>
-              <a:t>20/09/14</a:t>
+              <a:t>21/09/14</a:t>
             </a:fld>
             <a:endParaRPr lang="en-US"/>
           </a:p>
@@ -1353,7 +1353,7 @@
           <a:p>
             <a:fld id="{08C0AF01-9055-0547-953E-72B2160BBA35}" type="datetimeFigureOut">
               <a:rPr lang="en-US" smtClean="0"/>
-              <a:t>20/09/14</a:t>
+              <a:t>21/09/14</a:t>
             </a:fld>
             <a:endParaRPr lang="en-US"/>
           </a:p>
@@ -1775,7 +1775,7 @@
           <a:p>
             <a:fld id="{08C0AF01-9055-0547-953E-72B2160BBA35}" type="datetimeFigureOut">
               <a:rPr lang="en-US" smtClean="0"/>
-              <a:t>20/09/14</a:t>
+              <a:t>21/09/14</a:t>
             </a:fld>
             <a:endParaRPr lang="en-US"/>
           </a:p>
@@ -1893,7 +1893,7 @@
           <a:p>
             <a:fld id="{08C0AF01-9055-0547-953E-72B2160BBA35}" type="datetimeFigureOut">
               <a:rPr lang="en-US" smtClean="0"/>
-              <a:t>20/09/14</a:t>
+              <a:t>21/09/14</a:t>
             </a:fld>
             <a:endParaRPr lang="en-US"/>
           </a:p>
@@ -1988,7 +1988,7 @@
           <a:p>
             <a:fld id="{08C0AF01-9055-0547-953E-72B2160BBA35}" type="datetimeFigureOut">
               <a:rPr lang="en-US" smtClean="0"/>
-              <a:t>20/09/14</a:t>
+              <a:t>21/09/14</a:t>
             </a:fld>
             <a:endParaRPr lang="en-US"/>
           </a:p>
@@ -2265,7 +2265,7 @@
           <a:p>
             <a:fld id="{08C0AF01-9055-0547-953E-72B2160BBA35}" type="datetimeFigureOut">
               <a:rPr lang="en-US" smtClean="0"/>
-              <a:t>20/09/14</a:t>
+              <a:t>21/09/14</a:t>
             </a:fld>
             <a:endParaRPr lang="en-US"/>
           </a:p>
@@ -2518,7 +2518,7 @@
           <a:p>
             <a:fld id="{08C0AF01-9055-0547-953E-72B2160BBA35}" type="datetimeFigureOut">
               <a:rPr lang="en-US" smtClean="0"/>
-              <a:t>20/09/14</a:t>
+              <a:t>21/09/14</a:t>
             </a:fld>
             <a:endParaRPr lang="en-US"/>
           </a:p>
@@ -2731,7 +2731,7 @@
           <a:p>
             <a:fld id="{08C0AF01-9055-0547-953E-72B2160BBA35}" type="datetimeFigureOut">
               <a:rPr lang="en-US" smtClean="0"/>
-              <a:t>20/09/14</a:t>
+              <a:t>21/09/14</a:t>
             </a:fld>
             <a:endParaRPr lang="en-US"/>
           </a:p>
@@ -10256,8 +10256,8 @@
         </p:nvCxnSpPr>
         <p:spPr>
           <a:xfrm>
-            <a:off x="5435600" y="2496435"/>
-            <a:ext cx="1276225" cy="1119764"/>
+            <a:off x="5475816" y="2496436"/>
+            <a:ext cx="1236009" cy="1119763"/>
           </a:xfrm>
           <a:prstGeom prst="straightConnector1">
             <a:avLst/>
@@ -10293,7 +10293,7 @@
         <p:spPr>
           <a:xfrm flipH="1">
             <a:off x="1889029" y="2496435"/>
-            <a:ext cx="1371696" cy="1124541"/>
+            <a:ext cx="1334655" cy="1124541"/>
           </a:xfrm>
           <a:prstGeom prst="straightConnector1">
             <a:avLst/>
@@ -10399,8 +10399,8 @@
         </p:nvCxnSpPr>
         <p:spPr>
           <a:xfrm>
-            <a:off x="3873500" y="2248809"/>
-            <a:ext cx="990600" cy="0"/>
+            <a:off x="3873500" y="2217652"/>
+            <a:ext cx="990599" cy="0"/>
           </a:xfrm>
           <a:prstGeom prst="straightConnector1">
             <a:avLst/>
@@ -10435,8 +10435,8 @@
         </p:nvCxnSpPr>
         <p:spPr>
           <a:xfrm>
-            <a:off x="3260725" y="2496435"/>
-            <a:ext cx="0" cy="1119764"/>
+            <a:off x="3223684" y="2496435"/>
+            <a:ext cx="37041" cy="1119764"/>
           </a:xfrm>
           <a:prstGeom prst="straightConnector1">
             <a:avLst/>
@@ -10679,8 +10679,8 @@
         </p:nvSpPr>
         <p:spPr>
           <a:xfrm>
-            <a:off x="4864100" y="2001182"/>
-            <a:ext cx="1143000" cy="495253"/>
+            <a:off x="4864099" y="1938868"/>
+            <a:ext cx="1223433" cy="557568"/>
           </a:xfrm>
           <a:prstGeom prst="ellipse">
             <a:avLst/>
@@ -10852,7 +10852,7 @@
           <p:nvPr/>
         </p:nvPicPr>
         <p:blipFill>
-          <a:blip r:embed="rId3"/>
+          <a:blip r:embed="rId2"/>
           <a:stretch>
             <a:fillRect/>
           </a:stretch>
@@ -10906,7 +10906,6 @@
         <p:nvCxnSpPr>
           <p:cNvPr id="27" name="Straight Arrow Connector 26"/>
           <p:cNvCxnSpPr>
-            <a:stCxn id="42" idx="3"/>
             <a:endCxn id="9" idx="0"/>
           </p:cNvCxnSpPr>
           <p:nvPr/>
@@ -11007,8 +11006,8 @@
         </p:nvSpPr>
         <p:spPr>
           <a:xfrm>
-            <a:off x="2647950" y="2001182"/>
-            <a:ext cx="1225550" cy="495253"/>
+            <a:off x="2573867" y="1938868"/>
+            <a:ext cx="1299633" cy="557567"/>
           </a:xfrm>
           <a:prstGeom prst="ellipse">
             <a:avLst/>
@@ -11146,174 +11145,6 @@
           </a:p>
         </p:txBody>
       </p:sp>
-      <p:pic>
-        <p:nvPicPr>
-          <p:cNvPr id="39" name="Picture 38"/>
-          <p:cNvPicPr>
-            <a:picLocks noChangeAspect="1"/>
-          </p:cNvPicPr>
-          <p:nvPr/>
-        </p:nvPicPr>
-        <p:blipFill>
-          <a:blip r:embed="rId4"/>
-          <a:stretch>
-            <a:fillRect/>
-          </a:stretch>
-        </p:blipFill>
-        <p:spPr>
-          <a:xfrm>
-            <a:off x="1991474" y="4735893"/>
-            <a:ext cx="375969" cy="279977"/>
-          </a:xfrm>
-          <a:prstGeom prst="rect">
-            <a:avLst/>
-          </a:prstGeom>
-        </p:spPr>
-      </p:pic>
-      <p:pic>
-        <p:nvPicPr>
-          <p:cNvPr id="40" name="Picture 39"/>
-          <p:cNvPicPr>
-            <a:picLocks noChangeAspect="1"/>
-          </p:cNvPicPr>
-          <p:nvPr/>
-        </p:nvPicPr>
-        <p:blipFill>
-          <a:blip r:embed="rId3"/>
-          <a:stretch>
-            <a:fillRect/>
-          </a:stretch>
-        </p:blipFill>
-        <p:spPr>
-          <a:xfrm>
-            <a:off x="3122612" y="2120763"/>
-            <a:ext cx="276226" cy="219564"/>
-          </a:xfrm>
-          <a:prstGeom prst="rect">
-            <a:avLst/>
-          </a:prstGeom>
-        </p:spPr>
-      </p:pic>
-      <p:pic>
-        <p:nvPicPr>
-          <p:cNvPr id="2" name="Picture 1"/>
-          <p:cNvPicPr>
-            <a:picLocks noChangeAspect="1"/>
-          </p:cNvPicPr>
-          <p:nvPr/>
-        </p:nvPicPr>
-        <p:blipFill>
-          <a:blip r:embed="rId5"/>
-          <a:stretch>
-            <a:fillRect/>
-          </a:stretch>
-        </p:blipFill>
-        <p:spPr>
-          <a:xfrm>
-            <a:off x="5206875" y="2120763"/>
-            <a:ext cx="469900" cy="215900"/>
-          </a:xfrm>
-          <a:prstGeom prst="rect">
-            <a:avLst/>
-          </a:prstGeom>
-        </p:spPr>
-      </p:pic>
-      <p:pic>
-        <p:nvPicPr>
-          <p:cNvPr id="42" name="Picture 41"/>
-          <p:cNvPicPr>
-            <a:picLocks noChangeAspect="1"/>
-          </p:cNvPicPr>
-          <p:nvPr/>
-        </p:nvPicPr>
-        <p:blipFill>
-          <a:blip r:embed="rId6"/>
-          <a:stretch>
-            <a:fillRect/>
-          </a:stretch>
-        </p:blipFill>
-        <p:spPr>
-          <a:xfrm>
-            <a:off x="1764271" y="2828391"/>
-            <a:ext cx="501651" cy="240792"/>
-          </a:xfrm>
-          <a:prstGeom prst="rect">
-            <a:avLst/>
-          </a:prstGeom>
-        </p:spPr>
-      </p:pic>
-      <p:pic>
-        <p:nvPicPr>
-          <p:cNvPr id="10" name="Picture 9"/>
-          <p:cNvPicPr>
-            <a:picLocks noChangeAspect="1"/>
-          </p:cNvPicPr>
-          <p:nvPr/>
-        </p:nvPicPr>
-        <p:blipFill>
-          <a:blip r:embed="rId7"/>
-          <a:stretch>
-            <a:fillRect/>
-          </a:stretch>
-        </p:blipFill>
-        <p:spPr>
-          <a:xfrm>
-            <a:off x="4171244" y="2877943"/>
-            <a:ext cx="293511" cy="270933"/>
-          </a:xfrm>
-          <a:prstGeom prst="rect">
-            <a:avLst/>
-          </a:prstGeom>
-        </p:spPr>
-      </p:pic>
-      <p:pic>
-        <p:nvPicPr>
-          <p:cNvPr id="11" name="Picture 10"/>
-          <p:cNvPicPr>
-            <a:picLocks noChangeAspect="1"/>
-          </p:cNvPicPr>
-          <p:nvPr/>
-        </p:nvPicPr>
-        <p:blipFill>
-          <a:blip r:embed="rId8"/>
-          <a:stretch>
-            <a:fillRect/>
-          </a:stretch>
-        </p:blipFill>
-        <p:spPr>
-          <a:xfrm>
-            <a:off x="5183342" y="3741068"/>
-            <a:ext cx="533525" cy="237923"/>
-          </a:xfrm>
-          <a:prstGeom prst="rect">
-            <a:avLst/>
-          </a:prstGeom>
-        </p:spPr>
-      </p:pic>
-      <p:pic>
-        <p:nvPicPr>
-          <p:cNvPr id="12" name="Picture 11"/>
-          <p:cNvPicPr>
-            <a:picLocks noChangeAspect="1"/>
-          </p:cNvPicPr>
-          <p:nvPr/>
-        </p:nvPicPr>
-        <p:blipFill>
-          <a:blip r:embed="rId9"/>
-          <a:stretch>
-            <a:fillRect/>
-          </a:stretch>
-        </p:blipFill>
-        <p:spPr>
-          <a:xfrm>
-            <a:off x="4233749" y="4738325"/>
-            <a:ext cx="579551" cy="286012"/>
-          </a:xfrm>
-          <a:prstGeom prst="rect">
-            <a:avLst/>
-          </a:prstGeom>
-        </p:spPr>
-      </p:pic>
       <p:sp>
         <p:nvSpPr>
           <p:cNvPr id="48" name="Oval 47"/>
@@ -11422,7 +11253,175 @@
       </p:sp>
       <p:pic>
         <p:nvPicPr>
-          <p:cNvPr id="20" name="Picture 19"/>
+          <p:cNvPr id="16" name="Imagen 15"/>
+          <p:cNvPicPr>
+            <a:picLocks noChangeAspect="1"/>
+          </p:cNvPicPr>
+          <p:nvPr/>
+        </p:nvPicPr>
+        <p:blipFill>
+          <a:blip r:embed="rId3"/>
+          <a:stretch>
+            <a:fillRect/>
+          </a:stretch>
+        </p:blipFill>
+        <p:spPr>
+          <a:xfrm>
+            <a:off x="3100795" y="3754098"/>
+            <a:ext cx="336261" cy="260602"/>
+          </a:xfrm>
+          <a:prstGeom prst="rect">
+            <a:avLst/>
+          </a:prstGeom>
+        </p:spPr>
+      </p:pic>
+      <p:pic>
+        <p:nvPicPr>
+          <p:cNvPr id="17" name="Imagen 16"/>
+          <p:cNvPicPr>
+            <a:picLocks noChangeAspect="1"/>
+          </p:cNvPicPr>
+          <p:nvPr/>
+        </p:nvPicPr>
+        <p:blipFill>
+          <a:blip r:embed="rId4"/>
+          <a:stretch>
+            <a:fillRect/>
+          </a:stretch>
+        </p:blipFill>
+        <p:spPr>
+          <a:xfrm>
+            <a:off x="1698359" y="3760053"/>
+            <a:ext cx="355871" cy="262666"/>
+          </a:xfrm>
+          <a:prstGeom prst="rect">
+            <a:avLst/>
+          </a:prstGeom>
+        </p:spPr>
+      </p:pic>
+      <p:pic>
+        <p:nvPicPr>
+          <p:cNvPr id="18" name="Imagen 17"/>
+          <p:cNvPicPr>
+            <a:picLocks noChangeAspect="1"/>
+          </p:cNvPicPr>
+          <p:nvPr/>
+        </p:nvPicPr>
+        <p:blipFill>
+          <a:blip r:embed="rId5"/>
+          <a:stretch>
+            <a:fillRect/>
+          </a:stretch>
+        </p:blipFill>
+        <p:spPr>
+          <a:xfrm>
+            <a:off x="6399209" y="3745943"/>
+            <a:ext cx="604307" cy="266837"/>
+          </a:xfrm>
+          <a:prstGeom prst="rect">
+            <a:avLst/>
+          </a:prstGeom>
+        </p:spPr>
+      </p:pic>
+      <p:pic>
+        <p:nvPicPr>
+          <p:cNvPr id="19" name="Imagen 18"/>
+          <p:cNvPicPr>
+            <a:picLocks noChangeAspect="1"/>
+          </p:cNvPicPr>
+          <p:nvPr/>
+        </p:nvPicPr>
+        <p:blipFill>
+          <a:blip r:embed="rId6"/>
+          <a:stretch>
+            <a:fillRect/>
+          </a:stretch>
+        </p:blipFill>
+        <p:spPr>
+          <a:xfrm>
+            <a:off x="5150467" y="3743677"/>
+            <a:ext cx="591427" cy="268114"/>
+          </a:xfrm>
+          <a:prstGeom prst="rect">
+            <a:avLst/>
+          </a:prstGeom>
+        </p:spPr>
+      </p:pic>
+      <p:pic>
+        <p:nvPicPr>
+          <p:cNvPr id="21" name="Imagen 20"/>
+          <p:cNvPicPr>
+            <a:picLocks noChangeAspect="1"/>
+          </p:cNvPicPr>
+          <p:nvPr/>
+        </p:nvPicPr>
+        <p:blipFill>
+          <a:blip r:embed="rId7"/>
+          <a:stretch>
+            <a:fillRect/>
+          </a:stretch>
+        </p:blipFill>
+        <p:spPr>
+          <a:xfrm>
+            <a:off x="1754573" y="2762512"/>
+            <a:ext cx="599314" cy="291771"/>
+          </a:xfrm>
+          <a:prstGeom prst="rect">
+            <a:avLst/>
+          </a:prstGeom>
+        </p:spPr>
+      </p:pic>
+      <p:pic>
+        <p:nvPicPr>
+          <p:cNvPr id="24" name="Imagen 23"/>
+          <p:cNvPicPr>
+            <a:picLocks noChangeAspect="1"/>
+          </p:cNvPicPr>
+          <p:nvPr/>
+        </p:nvPicPr>
+        <p:blipFill>
+          <a:blip r:embed="rId8"/>
+          <a:stretch>
+            <a:fillRect/>
+          </a:stretch>
+        </p:blipFill>
+        <p:spPr>
+          <a:xfrm>
+            <a:off x="4194154" y="2848411"/>
+            <a:ext cx="315428" cy="291771"/>
+          </a:xfrm>
+          <a:prstGeom prst="rect">
+            <a:avLst/>
+          </a:prstGeom>
+        </p:spPr>
+      </p:pic>
+      <p:pic>
+        <p:nvPicPr>
+          <p:cNvPr id="25" name="Imagen 24"/>
+          <p:cNvPicPr>
+            <a:picLocks noChangeAspect="1"/>
+          </p:cNvPicPr>
+          <p:nvPr/>
+        </p:nvPicPr>
+        <p:blipFill>
+          <a:blip r:embed="rId9"/>
+          <a:stretch>
+            <a:fillRect/>
+          </a:stretch>
+        </p:blipFill>
+        <p:spPr>
+          <a:xfrm>
+            <a:off x="1950334" y="4711077"/>
+            <a:ext cx="408595" cy="306446"/>
+          </a:xfrm>
+          <a:prstGeom prst="rect">
+            <a:avLst/>
+          </a:prstGeom>
+        </p:spPr>
+      </p:pic>
+      <p:pic>
+        <p:nvPicPr>
+          <p:cNvPr id="31" name="Imagen 30"/>
           <p:cNvPicPr>
             <a:picLocks noChangeAspect="1"/>
           </p:cNvPicPr>
@@ -11436,8 +11435,8 @@
         </p:blipFill>
         <p:spPr>
           <a:xfrm>
-            <a:off x="1742556" y="3748085"/>
-            <a:ext cx="248918" cy="257215"/>
+            <a:off x="4188255" y="4725165"/>
+            <a:ext cx="615085" cy="299657"/>
           </a:xfrm>
           <a:prstGeom prst="rect">
             <a:avLst/>
@@ -11446,7 +11445,7 @@
       </p:pic>
       <p:pic>
         <p:nvPicPr>
-          <p:cNvPr id="51" name="Picture 50"/>
+          <p:cNvPr id="32" name="Imagen 31"/>
           <p:cNvPicPr>
             <a:picLocks noChangeAspect="1"/>
           </p:cNvPicPr>
@@ -11460,71 +11459,38 @@
         </p:blipFill>
         <p:spPr>
           <a:xfrm>
-            <a:off x="6464300" y="3744426"/>
-            <a:ext cx="509040" cy="254520"/>
+            <a:off x="2840599" y="2128132"/>
+            <a:ext cx="758942" cy="156685"/>
           </a:xfrm>
           <a:prstGeom prst="rect">
             <a:avLst/>
           </a:prstGeom>
         </p:spPr>
       </p:pic>
-      <p:graphicFrame>
-        <p:nvGraphicFramePr>
-          <p:cNvPr id="3" name="Objeto 2"/>
-          <p:cNvGraphicFramePr>
-            <a:graphicFrameLocks noChangeAspect="1"/>
-          </p:cNvGraphicFramePr>
-          <p:nvPr>
-            <p:extLst>
-              <p:ext uri="{D42A27DB-BD31-4B8C-83A1-F6EECF244321}">
-                <p14:modId xmlns:p14="http://schemas.microsoft.com/office/powerpoint/2010/main" val="3016401939"/>
-              </p:ext>
-            </p:extLst>
-          </p:nvPr>
-        </p:nvGraphicFramePr>
-        <p:xfrm>
-          <a:off x="3055938" y="3668713"/>
-          <a:ext cx="374650" cy="425450"/>
-        </p:xfrm>
-        <a:graphic>
-          <a:graphicData uri="http://schemas.openxmlformats.org/presentationml/2006/ole">
-            <mc:AlternateContent xmlns:mc="http://schemas.openxmlformats.org/markup-compatibility/2006">
-              <mc:Choice xmlns:v="urn:schemas-microsoft-com:vml" Requires="v">
-                <p:oleObj spid="_x0000_s1025" name="EcuaciÛn" r:id="rId12" imgW="190500" imgH="215900" progId="Equation.3">
-                  <p:embed/>
-                </p:oleObj>
-              </mc:Choice>
-              <mc:Fallback>
-                <p:oleObj name="EcuaciÛn" r:id="rId12" imgW="190500" imgH="215900" progId="Equation.3">
-                  <p:embed/>
-                  <p:pic>
-                    <p:nvPicPr>
-                      <p:cNvPr id="0" name=""/>
-                      <p:cNvPicPr/>
-                      <p:nvPr/>
-                    </p:nvPicPr>
-                    <p:blipFill>
-                      <a:blip r:embed="rId13"/>
-                      <a:stretch>
-                        <a:fillRect/>
-                      </a:stretch>
-                    </p:blipFill>
-                    <p:spPr>
-                      <a:xfrm>
-                        <a:off x="3055938" y="3668713"/>
-                        <a:ext cx="374650" cy="425450"/>
-                      </a:xfrm>
-                      <a:prstGeom prst="rect">
-                        <a:avLst/>
-                      </a:prstGeom>
-                    </p:spPr>
-                  </p:pic>
-                </p:oleObj>
-              </mc:Fallback>
-            </mc:AlternateContent>
-          </a:graphicData>
-        </a:graphic>
-      </p:graphicFrame>
+      <p:pic>
+        <p:nvPicPr>
+          <p:cNvPr id="43" name="Imagen 42"/>
+          <p:cNvPicPr>
+            <a:picLocks noChangeAspect="1"/>
+          </p:cNvPicPr>
+          <p:nvPr/>
+        </p:nvPicPr>
+        <p:blipFill>
+          <a:blip r:embed="rId12"/>
+          <a:stretch>
+            <a:fillRect/>
+          </a:stretch>
+        </p:blipFill>
+        <p:spPr>
+          <a:xfrm>
+            <a:off x="5033436" y="2120786"/>
+            <a:ext cx="930316" cy="171375"/>
+          </a:xfrm>
+          <a:prstGeom prst="rect">
+            <a:avLst/>
+          </a:prstGeom>
+        </p:spPr>
+      </p:pic>
     </p:spTree>
     <p:extLst>
       <p:ext uri="{BB962C8B-B14F-4D97-AF65-F5344CB8AC3E}">

</xml_diff>

<commit_message>
D2.1 - Minor updates - model class
</commit_message>
<xml_diff>
--- a/doc/D2.1_AMIDSTModelingFramework/figures/CajaMarModelsBucket.pptx
+++ b/doc/D2.1_AMIDSTModelingFramework/figures/CajaMarModelsBucket.pptx
@@ -299,7 +299,7 @@
           <a:p>
             <a:fld id="{08C0AF01-9055-0547-953E-72B2160BBA35}" type="datetimeFigureOut">
               <a:rPr lang="en-US" smtClean="0"/>
-              <a:t>21/09/14</a:t>
+              <a:t>22/09/14</a:t>
             </a:fld>
             <a:endParaRPr lang="en-US"/>
           </a:p>
@@ -341,7 +341,7 @@
           <a:p>
             <a:fld id="{288BB61C-8C70-E740-8F17-FCDBEBCDA5B9}" type="slidenum">
               <a:rPr lang="en-US" smtClean="0"/>
-              <a:t>‹Nr.›</a:t>
+              <a:t>‹#›</a:t>
             </a:fld>
             <a:endParaRPr lang="en-US"/>
           </a:p>
@@ -469,7 +469,7 @@
           <a:p>
             <a:fld id="{08C0AF01-9055-0547-953E-72B2160BBA35}" type="datetimeFigureOut">
               <a:rPr lang="en-US" smtClean="0"/>
-              <a:t>21/09/14</a:t>
+              <a:t>22/09/14</a:t>
             </a:fld>
             <a:endParaRPr lang="en-US"/>
           </a:p>
@@ -511,7 +511,7 @@
           <a:p>
             <a:fld id="{288BB61C-8C70-E740-8F17-FCDBEBCDA5B9}" type="slidenum">
               <a:rPr lang="en-US" smtClean="0"/>
-              <a:t>‹Nr.›</a:t>
+              <a:t>‹#›</a:t>
             </a:fld>
             <a:endParaRPr lang="en-US"/>
           </a:p>
@@ -649,7 +649,7 @@
           <a:p>
             <a:fld id="{08C0AF01-9055-0547-953E-72B2160BBA35}" type="datetimeFigureOut">
               <a:rPr lang="en-US" smtClean="0"/>
-              <a:t>21/09/14</a:t>
+              <a:t>22/09/14</a:t>
             </a:fld>
             <a:endParaRPr lang="en-US"/>
           </a:p>
@@ -691,7 +691,7 @@
           <a:p>
             <a:fld id="{288BB61C-8C70-E740-8F17-FCDBEBCDA5B9}" type="slidenum">
               <a:rPr lang="en-US" smtClean="0"/>
-              <a:t>‹Nr.›</a:t>
+              <a:t>‹#›</a:t>
             </a:fld>
             <a:endParaRPr lang="en-US"/>
           </a:p>
@@ -819,7 +819,7 @@
           <a:p>
             <a:fld id="{08C0AF01-9055-0547-953E-72B2160BBA35}" type="datetimeFigureOut">
               <a:rPr lang="en-US" smtClean="0"/>
-              <a:t>21/09/14</a:t>
+              <a:t>22/09/14</a:t>
             </a:fld>
             <a:endParaRPr lang="en-US"/>
           </a:p>
@@ -861,7 +861,7 @@
           <a:p>
             <a:fld id="{288BB61C-8C70-E740-8F17-FCDBEBCDA5B9}" type="slidenum">
               <a:rPr lang="en-US" smtClean="0"/>
-              <a:t>‹Nr.›</a:t>
+              <a:t>‹#›</a:t>
             </a:fld>
             <a:endParaRPr lang="en-US"/>
           </a:p>
@@ -1065,7 +1065,7 @@
           <a:p>
             <a:fld id="{08C0AF01-9055-0547-953E-72B2160BBA35}" type="datetimeFigureOut">
               <a:rPr lang="en-US" smtClean="0"/>
-              <a:t>21/09/14</a:t>
+              <a:t>22/09/14</a:t>
             </a:fld>
             <a:endParaRPr lang="en-US"/>
           </a:p>
@@ -1107,7 +1107,7 @@
           <a:p>
             <a:fld id="{288BB61C-8C70-E740-8F17-FCDBEBCDA5B9}" type="slidenum">
               <a:rPr lang="en-US" smtClean="0"/>
-              <a:t>‹Nr.›</a:t>
+              <a:t>‹#›</a:t>
             </a:fld>
             <a:endParaRPr lang="en-US"/>
           </a:p>
@@ -1353,7 +1353,7 @@
           <a:p>
             <a:fld id="{08C0AF01-9055-0547-953E-72B2160BBA35}" type="datetimeFigureOut">
               <a:rPr lang="en-US" smtClean="0"/>
-              <a:t>21/09/14</a:t>
+              <a:t>22/09/14</a:t>
             </a:fld>
             <a:endParaRPr lang="en-US"/>
           </a:p>
@@ -1395,7 +1395,7 @@
           <a:p>
             <a:fld id="{288BB61C-8C70-E740-8F17-FCDBEBCDA5B9}" type="slidenum">
               <a:rPr lang="en-US" smtClean="0"/>
-              <a:t>‹Nr.›</a:t>
+              <a:t>‹#›</a:t>
             </a:fld>
             <a:endParaRPr lang="en-US"/>
           </a:p>
@@ -1775,7 +1775,7 @@
           <a:p>
             <a:fld id="{08C0AF01-9055-0547-953E-72B2160BBA35}" type="datetimeFigureOut">
               <a:rPr lang="en-US" smtClean="0"/>
-              <a:t>21/09/14</a:t>
+              <a:t>22/09/14</a:t>
             </a:fld>
             <a:endParaRPr lang="en-US"/>
           </a:p>
@@ -1817,7 +1817,7 @@
           <a:p>
             <a:fld id="{288BB61C-8C70-E740-8F17-FCDBEBCDA5B9}" type="slidenum">
               <a:rPr lang="en-US" smtClean="0"/>
-              <a:t>‹Nr.›</a:t>
+              <a:t>‹#›</a:t>
             </a:fld>
             <a:endParaRPr lang="en-US"/>
           </a:p>
@@ -1893,7 +1893,7 @@
           <a:p>
             <a:fld id="{08C0AF01-9055-0547-953E-72B2160BBA35}" type="datetimeFigureOut">
               <a:rPr lang="en-US" smtClean="0"/>
-              <a:t>21/09/14</a:t>
+              <a:t>22/09/14</a:t>
             </a:fld>
             <a:endParaRPr lang="en-US"/>
           </a:p>
@@ -1935,7 +1935,7 @@
           <a:p>
             <a:fld id="{288BB61C-8C70-E740-8F17-FCDBEBCDA5B9}" type="slidenum">
               <a:rPr lang="en-US" smtClean="0"/>
-              <a:t>‹Nr.›</a:t>
+              <a:t>‹#›</a:t>
             </a:fld>
             <a:endParaRPr lang="en-US"/>
           </a:p>
@@ -1988,7 +1988,7 @@
           <a:p>
             <a:fld id="{08C0AF01-9055-0547-953E-72B2160BBA35}" type="datetimeFigureOut">
               <a:rPr lang="en-US" smtClean="0"/>
-              <a:t>21/09/14</a:t>
+              <a:t>22/09/14</a:t>
             </a:fld>
             <a:endParaRPr lang="en-US"/>
           </a:p>
@@ -2030,7 +2030,7 @@
           <a:p>
             <a:fld id="{288BB61C-8C70-E740-8F17-FCDBEBCDA5B9}" type="slidenum">
               <a:rPr lang="en-US" smtClean="0"/>
-              <a:t>‹Nr.›</a:t>
+              <a:t>‹#›</a:t>
             </a:fld>
             <a:endParaRPr lang="en-US"/>
           </a:p>
@@ -2265,7 +2265,7 @@
           <a:p>
             <a:fld id="{08C0AF01-9055-0547-953E-72B2160BBA35}" type="datetimeFigureOut">
               <a:rPr lang="en-US" smtClean="0"/>
-              <a:t>21/09/14</a:t>
+              <a:t>22/09/14</a:t>
             </a:fld>
             <a:endParaRPr lang="en-US"/>
           </a:p>
@@ -2307,7 +2307,7 @@
           <a:p>
             <a:fld id="{288BB61C-8C70-E740-8F17-FCDBEBCDA5B9}" type="slidenum">
               <a:rPr lang="en-US" smtClean="0"/>
-              <a:t>‹Nr.›</a:t>
+              <a:t>‹#›</a:t>
             </a:fld>
             <a:endParaRPr lang="en-US"/>
           </a:p>
@@ -2518,7 +2518,7 @@
           <a:p>
             <a:fld id="{08C0AF01-9055-0547-953E-72B2160BBA35}" type="datetimeFigureOut">
               <a:rPr lang="en-US" smtClean="0"/>
-              <a:t>21/09/14</a:t>
+              <a:t>22/09/14</a:t>
             </a:fld>
             <a:endParaRPr lang="en-US"/>
           </a:p>
@@ -2560,7 +2560,7 @@
           <a:p>
             <a:fld id="{288BB61C-8C70-E740-8F17-FCDBEBCDA5B9}" type="slidenum">
               <a:rPr lang="en-US" smtClean="0"/>
-              <a:t>‹Nr.›</a:t>
+              <a:t>‹#›</a:t>
             </a:fld>
             <a:endParaRPr lang="en-US"/>
           </a:p>
@@ -2731,7 +2731,7 @@
           <a:p>
             <a:fld id="{08C0AF01-9055-0547-953E-72B2160BBA35}" type="datetimeFigureOut">
               <a:rPr lang="en-US" smtClean="0"/>
-              <a:t>21/09/14</a:t>
+              <a:t>22/09/14</a:t>
             </a:fld>
             <a:endParaRPr lang="en-US"/>
           </a:p>
@@ -2809,7 +2809,7 @@
           <a:p>
             <a:fld id="{288BB61C-8C70-E740-8F17-FCDBEBCDA5B9}" type="slidenum">
               <a:rPr lang="en-US" smtClean="0"/>
-              <a:t>‹Nr.›</a:t>
+              <a:t>‹#›</a:t>
             </a:fld>
             <a:endParaRPr lang="en-US"/>
           </a:p>
@@ -4927,6 +4927,13 @@
   <p:clrMapOvr>
     <a:masterClrMapping/>
   </p:clrMapOvr>
+  <p:timing>
+    <p:tnLst>
+      <p:par>
+        <p:cTn xmlns:p14="http://schemas.microsoft.com/office/powerpoint/2010/main" id="1" dur="indefinite" restart="never" nodeType="tmRoot"/>
+      </p:par>
+    </p:tnLst>
+  </p:timing>
 </p:sld>
 </file>
 
@@ -6016,8 +6023,8 @@
         </p:nvSpPr>
         <p:spPr>
           <a:xfrm>
-            <a:off x="1715692" y="1907569"/>
-            <a:ext cx="1154508" cy="646331"/>
+            <a:off x="1705085" y="1907569"/>
+            <a:ext cx="1175723" cy="646331"/>
           </a:xfrm>
           <a:prstGeom prst="rect">
             <a:avLst/>
@@ -6079,7 +6086,17 @@
                   </a:schemeClr>
                 </a:solidFill>
               </a:rPr>
-              <a:t>t – 6 semesters</a:t>
+              <a:t>k </a:t>
+            </a:r>
+            <a:r>
+              <a:rPr lang="en-US" sz="1200" i="1" dirty="0" smtClean="0">
+                <a:solidFill>
+                  <a:schemeClr val="accent2">
+                    <a:lumMod val="75000"/>
+                  </a:schemeClr>
+                </a:solidFill>
+              </a:rPr>
+              <a:t>– 6 semesters</a:t>
             </a:r>
             <a:endParaRPr lang="en-US" sz="1200" i="1" dirty="0">
               <a:solidFill>
@@ -6121,6 +6138,13 @@
   <p:clrMapOvr>
     <a:masterClrMapping/>
   </p:clrMapOvr>
+  <p:timing>
+    <p:tnLst>
+      <p:par>
+        <p:cTn xmlns:p14="http://schemas.microsoft.com/office/powerpoint/2010/main" id="1" dur="indefinite" restart="never" nodeType="tmRoot"/>
+      </p:par>
+    </p:tnLst>
+  </p:timing>
 </p:sld>
 </file>
 

</xml_diff>